<commit_message>
Updated ppt and added stopwords.
</commit_message>
<xml_diff>
--- a/docs/Presentation.pptx
+++ b/docs/Presentation.pptx
@@ -107,7 +107,2937 @@
       </a:defRPr>
     </a:lvl9pPr>
   </p:defaultTextStyle>
+  <p:extLst>
+    <p:ext uri="{EFAFB233-063F-42B5-8137-9DF3F51BA10A}">
+      <p15:sldGuideLst xmlns:p15="http://schemas.microsoft.com/office/powerpoint/2012/main"/>
+    </p:ext>
+  </p:extLst>
 </p:presentation>
+</file>
+
+<file path=ppt/diagrams/colors1.xml><?xml version="1.0" encoding="utf-8"?>
+<dgm:colorsDef xmlns:dgm="http://schemas.openxmlformats.org/drawingml/2006/diagram" xmlns:a="http://schemas.openxmlformats.org/drawingml/2006/main" uniqueId="urn:microsoft.com/office/officeart/2005/8/colors/accent1_2">
+  <dgm:title val=""/>
+  <dgm:desc val=""/>
+  <dgm:catLst>
+    <dgm:cat type="accent1" pri="11200"/>
+  </dgm:catLst>
+  <dgm:styleLbl name="node0">
+    <dgm:fillClrLst meth="repeat">
+      <a:schemeClr val="accent1"/>
+    </dgm:fillClrLst>
+    <dgm:linClrLst meth="repeat">
+      <a:schemeClr val="lt1"/>
+    </dgm:linClrLst>
+    <dgm:effectClrLst/>
+    <dgm:txLinClrLst/>
+    <dgm:txFillClrLst/>
+    <dgm:txEffectClrLst/>
+  </dgm:styleLbl>
+  <dgm:styleLbl name="alignNode1">
+    <dgm:fillClrLst meth="repeat">
+      <a:schemeClr val="accent1"/>
+    </dgm:fillClrLst>
+    <dgm:linClrLst meth="repeat">
+      <a:schemeClr val="accent1"/>
+    </dgm:linClrLst>
+    <dgm:effectClrLst/>
+    <dgm:txLinClrLst/>
+    <dgm:txFillClrLst/>
+    <dgm:txEffectClrLst/>
+  </dgm:styleLbl>
+  <dgm:styleLbl name="node1">
+    <dgm:fillClrLst meth="repeat">
+      <a:schemeClr val="accent1"/>
+    </dgm:fillClrLst>
+    <dgm:linClrLst meth="repeat">
+      <a:schemeClr val="lt1"/>
+    </dgm:linClrLst>
+    <dgm:effectClrLst/>
+    <dgm:txLinClrLst/>
+    <dgm:txFillClrLst/>
+    <dgm:txEffectClrLst/>
+  </dgm:styleLbl>
+  <dgm:styleLbl name="lnNode1">
+    <dgm:fillClrLst meth="repeat">
+      <a:schemeClr val="accent1"/>
+    </dgm:fillClrLst>
+    <dgm:linClrLst meth="repeat">
+      <a:schemeClr val="lt1"/>
+    </dgm:linClrLst>
+    <dgm:effectClrLst/>
+    <dgm:txLinClrLst/>
+    <dgm:txFillClrLst/>
+    <dgm:txEffectClrLst/>
+  </dgm:styleLbl>
+  <dgm:styleLbl name="vennNode1">
+    <dgm:fillClrLst meth="repeat">
+      <a:schemeClr val="accent1">
+        <a:alpha val="50000"/>
+      </a:schemeClr>
+    </dgm:fillClrLst>
+    <dgm:linClrLst meth="repeat">
+      <a:schemeClr val="lt1"/>
+    </dgm:linClrLst>
+    <dgm:effectClrLst/>
+    <dgm:txLinClrLst/>
+    <dgm:txFillClrLst/>
+    <dgm:txEffectClrLst/>
+  </dgm:styleLbl>
+  <dgm:styleLbl name="node2">
+    <dgm:fillClrLst meth="repeat">
+      <a:schemeClr val="accent1"/>
+    </dgm:fillClrLst>
+    <dgm:linClrLst meth="repeat">
+      <a:schemeClr val="lt1"/>
+    </dgm:linClrLst>
+    <dgm:effectClrLst/>
+    <dgm:txLinClrLst/>
+    <dgm:txFillClrLst/>
+    <dgm:txEffectClrLst/>
+  </dgm:styleLbl>
+  <dgm:styleLbl name="node3">
+    <dgm:fillClrLst meth="repeat">
+      <a:schemeClr val="accent1"/>
+    </dgm:fillClrLst>
+    <dgm:linClrLst meth="repeat">
+      <a:schemeClr val="lt1"/>
+    </dgm:linClrLst>
+    <dgm:effectClrLst/>
+    <dgm:txLinClrLst/>
+    <dgm:txFillClrLst/>
+    <dgm:txEffectClrLst/>
+  </dgm:styleLbl>
+  <dgm:styleLbl name="node4">
+    <dgm:fillClrLst meth="repeat">
+      <a:schemeClr val="accent1"/>
+    </dgm:fillClrLst>
+    <dgm:linClrLst meth="repeat">
+      <a:schemeClr val="lt1"/>
+    </dgm:linClrLst>
+    <dgm:effectClrLst/>
+    <dgm:txLinClrLst/>
+    <dgm:txFillClrLst/>
+    <dgm:txEffectClrLst/>
+  </dgm:styleLbl>
+  <dgm:styleLbl name="fgImgPlace1">
+    <dgm:fillClrLst meth="repeat">
+      <a:schemeClr val="accent1">
+        <a:tint val="50000"/>
+      </a:schemeClr>
+    </dgm:fillClrLst>
+    <dgm:linClrLst meth="repeat">
+      <a:schemeClr val="lt1"/>
+    </dgm:linClrLst>
+    <dgm:effectClrLst/>
+    <dgm:txLinClrLst/>
+    <dgm:txFillClrLst meth="repeat">
+      <a:schemeClr val="lt1"/>
+    </dgm:txFillClrLst>
+    <dgm:txEffectClrLst/>
+  </dgm:styleLbl>
+  <dgm:styleLbl name="alignImgPlace1">
+    <dgm:fillClrLst meth="repeat">
+      <a:schemeClr val="accent1">
+        <a:tint val="50000"/>
+      </a:schemeClr>
+    </dgm:fillClrLst>
+    <dgm:linClrLst meth="repeat">
+      <a:schemeClr val="lt1"/>
+    </dgm:linClrLst>
+    <dgm:effectClrLst/>
+    <dgm:txLinClrLst/>
+    <dgm:txFillClrLst meth="repeat">
+      <a:schemeClr val="lt1"/>
+    </dgm:txFillClrLst>
+    <dgm:txEffectClrLst/>
+  </dgm:styleLbl>
+  <dgm:styleLbl name="bgImgPlace1">
+    <dgm:fillClrLst meth="repeat">
+      <a:schemeClr val="accent1">
+        <a:tint val="50000"/>
+      </a:schemeClr>
+    </dgm:fillClrLst>
+    <dgm:linClrLst meth="repeat">
+      <a:schemeClr val="lt1"/>
+    </dgm:linClrLst>
+    <dgm:effectClrLst/>
+    <dgm:txLinClrLst/>
+    <dgm:txFillClrLst meth="repeat">
+      <a:schemeClr val="lt1"/>
+    </dgm:txFillClrLst>
+    <dgm:txEffectClrLst/>
+  </dgm:styleLbl>
+  <dgm:styleLbl name="sibTrans2D1">
+    <dgm:fillClrLst meth="repeat">
+      <a:schemeClr val="accent1">
+        <a:tint val="60000"/>
+      </a:schemeClr>
+    </dgm:fillClrLst>
+    <dgm:linClrLst meth="repeat">
+      <a:schemeClr val="accent1">
+        <a:tint val="60000"/>
+      </a:schemeClr>
+    </dgm:linClrLst>
+    <dgm:effectClrLst/>
+    <dgm:txLinClrLst/>
+    <dgm:txFillClrLst/>
+    <dgm:txEffectClrLst/>
+  </dgm:styleLbl>
+  <dgm:styleLbl name="fgSibTrans2D1">
+    <dgm:fillClrLst meth="repeat">
+      <a:schemeClr val="accent1">
+        <a:tint val="60000"/>
+      </a:schemeClr>
+    </dgm:fillClrLst>
+    <dgm:linClrLst meth="repeat">
+      <a:schemeClr val="accent1">
+        <a:tint val="60000"/>
+      </a:schemeClr>
+    </dgm:linClrLst>
+    <dgm:effectClrLst/>
+    <dgm:txLinClrLst/>
+    <dgm:txFillClrLst/>
+    <dgm:txEffectClrLst/>
+  </dgm:styleLbl>
+  <dgm:styleLbl name="bgSibTrans2D1">
+    <dgm:fillClrLst meth="repeat">
+      <a:schemeClr val="accent1">
+        <a:tint val="60000"/>
+      </a:schemeClr>
+    </dgm:fillClrLst>
+    <dgm:linClrLst meth="repeat">
+      <a:schemeClr val="accent1">
+        <a:tint val="60000"/>
+      </a:schemeClr>
+    </dgm:linClrLst>
+    <dgm:effectClrLst/>
+    <dgm:txLinClrLst/>
+    <dgm:txFillClrLst/>
+    <dgm:txEffectClrLst/>
+  </dgm:styleLbl>
+  <dgm:styleLbl name="sibTrans1D1">
+    <dgm:fillClrLst meth="repeat">
+      <a:schemeClr val="accent1"/>
+    </dgm:fillClrLst>
+    <dgm:linClrLst meth="repeat">
+      <a:schemeClr val="accent1"/>
+    </dgm:linClrLst>
+    <dgm:effectClrLst/>
+    <dgm:txLinClrLst/>
+    <dgm:txFillClrLst meth="repeat">
+      <a:schemeClr val="tx1"/>
+    </dgm:txFillClrLst>
+    <dgm:txEffectClrLst/>
+  </dgm:styleLbl>
+  <dgm:styleLbl name="callout">
+    <dgm:fillClrLst meth="repeat">
+      <a:schemeClr val="accent1"/>
+    </dgm:fillClrLst>
+    <dgm:linClrLst meth="repeat">
+      <a:schemeClr val="accent1">
+        <a:tint val="50000"/>
+      </a:schemeClr>
+    </dgm:linClrLst>
+    <dgm:effectClrLst/>
+    <dgm:txLinClrLst/>
+    <dgm:txFillClrLst meth="repeat">
+      <a:schemeClr val="tx1"/>
+    </dgm:txFillClrLst>
+    <dgm:txEffectClrLst/>
+  </dgm:styleLbl>
+  <dgm:styleLbl name="asst0">
+    <dgm:fillClrLst meth="repeat">
+      <a:schemeClr val="accent1"/>
+    </dgm:fillClrLst>
+    <dgm:linClrLst meth="repeat">
+      <a:schemeClr val="lt1"/>
+    </dgm:linClrLst>
+    <dgm:effectClrLst/>
+    <dgm:txLinClrLst/>
+    <dgm:txFillClrLst/>
+    <dgm:txEffectClrLst/>
+  </dgm:styleLbl>
+  <dgm:styleLbl name="asst1">
+    <dgm:fillClrLst meth="repeat">
+      <a:schemeClr val="accent1"/>
+    </dgm:fillClrLst>
+    <dgm:linClrLst meth="repeat">
+      <a:schemeClr val="lt1"/>
+    </dgm:linClrLst>
+    <dgm:effectClrLst/>
+    <dgm:txLinClrLst/>
+    <dgm:txFillClrLst/>
+    <dgm:txEffectClrLst/>
+  </dgm:styleLbl>
+  <dgm:styleLbl name="asst2">
+    <dgm:fillClrLst meth="repeat">
+      <a:schemeClr val="accent1"/>
+    </dgm:fillClrLst>
+    <dgm:linClrLst meth="repeat">
+      <a:schemeClr val="lt1"/>
+    </dgm:linClrLst>
+    <dgm:effectClrLst/>
+    <dgm:txLinClrLst/>
+    <dgm:txFillClrLst/>
+    <dgm:txEffectClrLst/>
+  </dgm:styleLbl>
+  <dgm:styleLbl name="asst3">
+    <dgm:fillClrLst meth="repeat">
+      <a:schemeClr val="accent1"/>
+    </dgm:fillClrLst>
+    <dgm:linClrLst meth="repeat">
+      <a:schemeClr val="lt1"/>
+    </dgm:linClrLst>
+    <dgm:effectClrLst/>
+    <dgm:txLinClrLst/>
+    <dgm:txFillClrLst/>
+    <dgm:txEffectClrLst/>
+  </dgm:styleLbl>
+  <dgm:styleLbl name="asst4">
+    <dgm:fillClrLst meth="repeat">
+      <a:schemeClr val="accent1"/>
+    </dgm:fillClrLst>
+    <dgm:linClrLst meth="repeat">
+      <a:schemeClr val="lt1"/>
+    </dgm:linClrLst>
+    <dgm:effectClrLst/>
+    <dgm:txLinClrLst/>
+    <dgm:txFillClrLst/>
+    <dgm:txEffectClrLst/>
+  </dgm:styleLbl>
+  <dgm:styleLbl name="parChTrans2D1">
+    <dgm:fillClrLst meth="repeat">
+      <a:schemeClr val="accent1">
+        <a:tint val="60000"/>
+      </a:schemeClr>
+    </dgm:fillClrLst>
+    <dgm:linClrLst meth="repeat">
+      <a:schemeClr val="accent1">
+        <a:tint val="60000"/>
+      </a:schemeClr>
+    </dgm:linClrLst>
+    <dgm:effectClrLst/>
+    <dgm:txLinClrLst/>
+    <dgm:txFillClrLst meth="repeat">
+      <a:schemeClr val="lt1"/>
+    </dgm:txFillClrLst>
+    <dgm:txEffectClrLst/>
+  </dgm:styleLbl>
+  <dgm:styleLbl name="parChTrans2D2">
+    <dgm:fillClrLst meth="repeat">
+      <a:schemeClr val="accent1"/>
+    </dgm:fillClrLst>
+    <dgm:linClrLst meth="repeat">
+      <a:schemeClr val="accent1"/>
+    </dgm:linClrLst>
+    <dgm:effectClrLst/>
+    <dgm:txLinClrLst/>
+    <dgm:txFillClrLst meth="repeat">
+      <a:schemeClr val="lt1"/>
+    </dgm:txFillClrLst>
+    <dgm:txEffectClrLst/>
+  </dgm:styleLbl>
+  <dgm:styleLbl name="parChTrans2D3">
+    <dgm:fillClrLst meth="repeat">
+      <a:schemeClr val="accent1"/>
+    </dgm:fillClrLst>
+    <dgm:linClrLst meth="repeat">
+      <a:schemeClr val="accent1"/>
+    </dgm:linClrLst>
+    <dgm:effectClrLst/>
+    <dgm:txLinClrLst/>
+    <dgm:txFillClrLst meth="repeat">
+      <a:schemeClr val="lt1"/>
+    </dgm:txFillClrLst>
+    <dgm:txEffectClrLst/>
+  </dgm:styleLbl>
+  <dgm:styleLbl name="parChTrans2D4">
+    <dgm:fillClrLst meth="repeat">
+      <a:schemeClr val="accent1"/>
+    </dgm:fillClrLst>
+    <dgm:linClrLst meth="repeat">
+      <a:schemeClr val="accent1"/>
+    </dgm:linClrLst>
+    <dgm:effectClrLst/>
+    <dgm:txLinClrLst/>
+    <dgm:txFillClrLst meth="repeat">
+      <a:schemeClr val="lt1"/>
+    </dgm:txFillClrLst>
+    <dgm:txEffectClrLst/>
+  </dgm:styleLbl>
+  <dgm:styleLbl name="parChTrans1D1">
+    <dgm:fillClrLst meth="repeat">
+      <a:schemeClr val="accent1"/>
+    </dgm:fillClrLst>
+    <dgm:linClrLst meth="repeat">
+      <a:schemeClr val="accent1">
+        <a:shade val="60000"/>
+      </a:schemeClr>
+    </dgm:linClrLst>
+    <dgm:effectClrLst/>
+    <dgm:txLinClrLst/>
+    <dgm:txFillClrLst meth="repeat">
+      <a:schemeClr val="tx1"/>
+    </dgm:txFillClrLst>
+    <dgm:txEffectClrLst/>
+  </dgm:styleLbl>
+  <dgm:styleLbl name="parChTrans1D2">
+    <dgm:fillClrLst meth="repeat">
+      <a:schemeClr val="accent1"/>
+    </dgm:fillClrLst>
+    <dgm:linClrLst meth="repeat">
+      <a:schemeClr val="accent1">
+        <a:shade val="60000"/>
+      </a:schemeClr>
+    </dgm:linClrLst>
+    <dgm:effectClrLst/>
+    <dgm:txLinClrLst/>
+    <dgm:txFillClrLst meth="repeat">
+      <a:schemeClr val="tx1"/>
+    </dgm:txFillClrLst>
+    <dgm:txEffectClrLst/>
+  </dgm:styleLbl>
+  <dgm:styleLbl name="parChTrans1D3">
+    <dgm:fillClrLst meth="repeat">
+      <a:schemeClr val="accent1"/>
+    </dgm:fillClrLst>
+    <dgm:linClrLst meth="repeat">
+      <a:schemeClr val="accent1">
+        <a:shade val="80000"/>
+      </a:schemeClr>
+    </dgm:linClrLst>
+    <dgm:effectClrLst/>
+    <dgm:txLinClrLst/>
+    <dgm:txFillClrLst meth="repeat">
+      <a:schemeClr val="tx1"/>
+    </dgm:txFillClrLst>
+    <dgm:txEffectClrLst/>
+  </dgm:styleLbl>
+  <dgm:styleLbl name="parChTrans1D4">
+    <dgm:fillClrLst meth="repeat">
+      <a:schemeClr val="accent1"/>
+    </dgm:fillClrLst>
+    <dgm:linClrLst meth="repeat">
+      <a:schemeClr val="accent1">
+        <a:shade val="80000"/>
+      </a:schemeClr>
+    </dgm:linClrLst>
+    <dgm:effectClrLst/>
+    <dgm:txLinClrLst/>
+    <dgm:txFillClrLst meth="repeat">
+      <a:schemeClr val="tx1"/>
+    </dgm:txFillClrLst>
+    <dgm:txEffectClrLst/>
+  </dgm:styleLbl>
+  <dgm:styleLbl name="fgAcc1">
+    <dgm:fillClrLst meth="repeat">
+      <a:schemeClr val="lt1">
+        <a:alpha val="90000"/>
+      </a:schemeClr>
+    </dgm:fillClrLst>
+    <dgm:linClrLst meth="repeat">
+      <a:schemeClr val="accent1"/>
+    </dgm:linClrLst>
+    <dgm:effectClrLst/>
+    <dgm:txLinClrLst/>
+    <dgm:txFillClrLst meth="repeat">
+      <a:schemeClr val="dk1"/>
+    </dgm:txFillClrLst>
+    <dgm:txEffectClrLst/>
+  </dgm:styleLbl>
+  <dgm:styleLbl name="conFgAcc1">
+    <dgm:fillClrLst meth="repeat">
+      <a:schemeClr val="lt1">
+        <a:alpha val="90000"/>
+      </a:schemeClr>
+    </dgm:fillClrLst>
+    <dgm:linClrLst meth="repeat">
+      <a:schemeClr val="accent1"/>
+    </dgm:linClrLst>
+    <dgm:effectClrLst/>
+    <dgm:txLinClrLst/>
+    <dgm:txFillClrLst meth="repeat">
+      <a:schemeClr val="dk1"/>
+    </dgm:txFillClrLst>
+    <dgm:txEffectClrLst/>
+  </dgm:styleLbl>
+  <dgm:styleLbl name="alignAcc1">
+    <dgm:fillClrLst meth="repeat">
+      <a:schemeClr val="lt1">
+        <a:alpha val="90000"/>
+      </a:schemeClr>
+    </dgm:fillClrLst>
+    <dgm:linClrLst meth="repeat">
+      <a:schemeClr val="accent1"/>
+    </dgm:linClrLst>
+    <dgm:effectClrLst/>
+    <dgm:txLinClrLst/>
+    <dgm:txFillClrLst meth="repeat">
+      <a:schemeClr val="dk1"/>
+    </dgm:txFillClrLst>
+    <dgm:txEffectClrLst/>
+  </dgm:styleLbl>
+  <dgm:styleLbl name="trAlignAcc1">
+    <dgm:fillClrLst meth="repeat">
+      <a:schemeClr val="lt1">
+        <a:alpha val="40000"/>
+      </a:schemeClr>
+    </dgm:fillClrLst>
+    <dgm:linClrLst meth="repeat">
+      <a:schemeClr val="accent1"/>
+    </dgm:linClrLst>
+    <dgm:effectClrLst/>
+    <dgm:txLinClrLst/>
+    <dgm:txFillClrLst meth="repeat">
+      <a:schemeClr val="dk1"/>
+    </dgm:txFillClrLst>
+    <dgm:txEffectClrLst/>
+  </dgm:styleLbl>
+  <dgm:styleLbl name="bgAcc1">
+    <dgm:fillClrLst meth="repeat">
+      <a:schemeClr val="lt1">
+        <a:alpha val="90000"/>
+      </a:schemeClr>
+    </dgm:fillClrLst>
+    <dgm:linClrLst meth="repeat">
+      <a:schemeClr val="accent1"/>
+    </dgm:linClrLst>
+    <dgm:effectClrLst/>
+    <dgm:txLinClrLst/>
+    <dgm:txFillClrLst meth="repeat">
+      <a:schemeClr val="dk1"/>
+    </dgm:txFillClrLst>
+    <dgm:txEffectClrLst/>
+  </dgm:styleLbl>
+  <dgm:styleLbl name="solidFgAcc1">
+    <dgm:fillClrLst meth="repeat">
+      <a:schemeClr val="lt1"/>
+    </dgm:fillClrLst>
+    <dgm:linClrLst meth="repeat">
+      <a:schemeClr val="accent1"/>
+    </dgm:linClrLst>
+    <dgm:effectClrLst/>
+    <dgm:txLinClrLst/>
+    <dgm:txFillClrLst meth="repeat">
+      <a:schemeClr val="dk1"/>
+    </dgm:txFillClrLst>
+    <dgm:txEffectClrLst/>
+  </dgm:styleLbl>
+  <dgm:styleLbl name="solidAlignAcc1">
+    <dgm:fillClrLst meth="repeat">
+      <a:schemeClr val="lt1"/>
+    </dgm:fillClrLst>
+    <dgm:linClrLst meth="repeat">
+      <a:schemeClr val="accent1"/>
+    </dgm:linClrLst>
+    <dgm:effectClrLst/>
+    <dgm:txLinClrLst/>
+    <dgm:txFillClrLst meth="repeat">
+      <a:schemeClr val="dk1"/>
+    </dgm:txFillClrLst>
+    <dgm:txEffectClrLst/>
+  </dgm:styleLbl>
+  <dgm:styleLbl name="solidBgAcc1">
+    <dgm:fillClrLst meth="repeat">
+      <a:schemeClr val="lt1"/>
+    </dgm:fillClrLst>
+    <dgm:linClrLst meth="repeat">
+      <a:schemeClr val="accent1"/>
+    </dgm:linClrLst>
+    <dgm:effectClrLst/>
+    <dgm:txLinClrLst/>
+    <dgm:txFillClrLst meth="repeat">
+      <a:schemeClr val="dk1"/>
+    </dgm:txFillClrLst>
+    <dgm:txEffectClrLst/>
+  </dgm:styleLbl>
+  <dgm:styleLbl name="fgAccFollowNode1">
+    <dgm:fillClrLst meth="repeat">
+      <a:schemeClr val="accent1">
+        <a:alpha val="90000"/>
+        <a:tint val="40000"/>
+      </a:schemeClr>
+    </dgm:fillClrLst>
+    <dgm:linClrLst meth="repeat">
+      <a:schemeClr val="accent1">
+        <a:alpha val="90000"/>
+        <a:tint val="40000"/>
+      </a:schemeClr>
+    </dgm:linClrLst>
+    <dgm:effectClrLst/>
+    <dgm:txLinClrLst/>
+    <dgm:txFillClrLst meth="repeat">
+      <a:schemeClr val="dk1"/>
+    </dgm:txFillClrLst>
+    <dgm:txEffectClrLst/>
+  </dgm:styleLbl>
+  <dgm:styleLbl name="alignAccFollowNode1">
+    <dgm:fillClrLst meth="repeat">
+      <a:schemeClr val="accent1">
+        <a:alpha val="90000"/>
+        <a:tint val="40000"/>
+      </a:schemeClr>
+    </dgm:fillClrLst>
+    <dgm:linClrLst meth="repeat">
+      <a:schemeClr val="accent1">
+        <a:alpha val="90000"/>
+        <a:tint val="40000"/>
+      </a:schemeClr>
+    </dgm:linClrLst>
+    <dgm:effectClrLst/>
+    <dgm:txLinClrLst/>
+    <dgm:txFillClrLst meth="repeat">
+      <a:schemeClr val="dk1"/>
+    </dgm:txFillClrLst>
+    <dgm:txEffectClrLst/>
+  </dgm:styleLbl>
+  <dgm:styleLbl name="bgAccFollowNode1">
+    <dgm:fillClrLst meth="repeat">
+      <a:schemeClr val="accent1">
+        <a:alpha val="90000"/>
+        <a:tint val="40000"/>
+      </a:schemeClr>
+    </dgm:fillClrLst>
+    <dgm:linClrLst meth="repeat">
+      <a:schemeClr val="accent1">
+        <a:alpha val="90000"/>
+        <a:tint val="40000"/>
+      </a:schemeClr>
+    </dgm:linClrLst>
+    <dgm:effectClrLst/>
+    <dgm:txLinClrLst/>
+    <dgm:txFillClrLst meth="repeat">
+      <a:schemeClr val="dk1"/>
+    </dgm:txFillClrLst>
+    <dgm:txEffectClrLst/>
+  </dgm:styleLbl>
+  <dgm:styleLbl name="fgAcc0">
+    <dgm:fillClrLst meth="repeat">
+      <a:schemeClr val="lt1">
+        <a:alpha val="90000"/>
+      </a:schemeClr>
+    </dgm:fillClrLst>
+    <dgm:linClrLst meth="repeat">
+      <a:schemeClr val="accent1"/>
+    </dgm:linClrLst>
+    <dgm:effectClrLst/>
+    <dgm:txLinClrLst/>
+    <dgm:txFillClrLst meth="repeat">
+      <a:schemeClr val="dk1"/>
+    </dgm:txFillClrLst>
+    <dgm:txEffectClrLst/>
+  </dgm:styleLbl>
+  <dgm:styleLbl name="fgAcc2">
+    <dgm:fillClrLst meth="repeat">
+      <a:schemeClr val="lt1">
+        <a:alpha val="90000"/>
+      </a:schemeClr>
+    </dgm:fillClrLst>
+    <dgm:linClrLst meth="repeat">
+      <a:schemeClr val="accent1"/>
+    </dgm:linClrLst>
+    <dgm:effectClrLst/>
+    <dgm:txLinClrLst/>
+    <dgm:txFillClrLst meth="repeat">
+      <a:schemeClr val="dk1"/>
+    </dgm:txFillClrLst>
+    <dgm:txEffectClrLst/>
+  </dgm:styleLbl>
+  <dgm:styleLbl name="fgAcc3">
+    <dgm:fillClrLst meth="repeat">
+      <a:schemeClr val="lt1">
+        <a:alpha val="90000"/>
+      </a:schemeClr>
+    </dgm:fillClrLst>
+    <dgm:linClrLst meth="repeat">
+      <a:schemeClr val="accent1"/>
+    </dgm:linClrLst>
+    <dgm:effectClrLst/>
+    <dgm:txLinClrLst/>
+    <dgm:txFillClrLst meth="repeat">
+      <a:schemeClr val="dk1"/>
+    </dgm:txFillClrLst>
+    <dgm:txEffectClrLst/>
+  </dgm:styleLbl>
+  <dgm:styleLbl name="fgAcc4">
+    <dgm:fillClrLst meth="repeat">
+      <a:schemeClr val="lt1">
+        <a:alpha val="90000"/>
+      </a:schemeClr>
+    </dgm:fillClrLst>
+    <dgm:linClrLst meth="repeat">
+      <a:schemeClr val="accent1"/>
+    </dgm:linClrLst>
+    <dgm:effectClrLst/>
+    <dgm:txLinClrLst/>
+    <dgm:txFillClrLst meth="repeat">
+      <a:schemeClr val="dk1"/>
+    </dgm:txFillClrLst>
+    <dgm:txEffectClrLst/>
+  </dgm:styleLbl>
+  <dgm:styleLbl name="bgShp">
+    <dgm:fillClrLst meth="repeat">
+      <a:schemeClr val="accent1">
+        <a:tint val="40000"/>
+      </a:schemeClr>
+    </dgm:fillClrLst>
+    <dgm:linClrLst meth="repeat">
+      <a:schemeClr val="accent1"/>
+    </dgm:linClrLst>
+    <dgm:effectClrLst/>
+    <dgm:txLinClrLst/>
+    <dgm:txFillClrLst meth="repeat">
+      <a:schemeClr val="dk1"/>
+    </dgm:txFillClrLst>
+    <dgm:txEffectClrLst/>
+  </dgm:styleLbl>
+  <dgm:styleLbl name="dkBgShp">
+    <dgm:fillClrLst meth="repeat">
+      <a:schemeClr val="accent1">
+        <a:shade val="80000"/>
+      </a:schemeClr>
+    </dgm:fillClrLst>
+    <dgm:linClrLst meth="repeat">
+      <a:schemeClr val="accent1"/>
+    </dgm:linClrLst>
+    <dgm:effectClrLst/>
+    <dgm:txLinClrLst/>
+    <dgm:txFillClrLst meth="repeat">
+      <a:schemeClr val="lt1"/>
+    </dgm:txFillClrLst>
+    <dgm:txEffectClrLst/>
+  </dgm:styleLbl>
+  <dgm:styleLbl name="trBgShp">
+    <dgm:fillClrLst meth="repeat">
+      <a:schemeClr val="accent1">
+        <a:tint val="50000"/>
+        <a:alpha val="40000"/>
+      </a:schemeClr>
+    </dgm:fillClrLst>
+    <dgm:linClrLst meth="repeat">
+      <a:schemeClr val="accent1"/>
+    </dgm:linClrLst>
+    <dgm:effectClrLst/>
+    <dgm:txLinClrLst/>
+    <dgm:txFillClrLst meth="repeat">
+      <a:schemeClr val="lt1"/>
+    </dgm:txFillClrLst>
+    <dgm:txEffectClrLst/>
+  </dgm:styleLbl>
+  <dgm:styleLbl name="fgShp">
+    <dgm:fillClrLst meth="repeat">
+      <a:schemeClr val="accent1">
+        <a:tint val="60000"/>
+      </a:schemeClr>
+    </dgm:fillClrLst>
+    <dgm:linClrLst meth="repeat">
+      <a:schemeClr val="lt1"/>
+    </dgm:linClrLst>
+    <dgm:effectClrLst/>
+    <dgm:txLinClrLst/>
+    <dgm:txFillClrLst meth="repeat">
+      <a:schemeClr val="dk1"/>
+    </dgm:txFillClrLst>
+    <dgm:txEffectClrLst/>
+  </dgm:styleLbl>
+  <dgm:styleLbl name="revTx">
+    <dgm:fillClrLst meth="repeat">
+      <a:schemeClr val="lt1">
+        <a:alpha val="0"/>
+      </a:schemeClr>
+    </dgm:fillClrLst>
+    <dgm:linClrLst meth="repeat">
+      <a:schemeClr val="dk1">
+        <a:alpha val="0"/>
+      </a:schemeClr>
+    </dgm:linClrLst>
+    <dgm:effectClrLst/>
+    <dgm:txLinClrLst/>
+    <dgm:txFillClrLst meth="repeat">
+      <a:schemeClr val="tx1"/>
+    </dgm:txFillClrLst>
+    <dgm:txEffectClrLst/>
+  </dgm:styleLbl>
+</dgm:colorsDef>
+</file>
+
+<file path=ppt/diagrams/data1.xml><?xml version="1.0" encoding="utf-8"?>
+<dgm:dataModel xmlns:dgm="http://schemas.openxmlformats.org/drawingml/2006/diagram" xmlns:a="http://schemas.openxmlformats.org/drawingml/2006/main">
+  <dgm:ptLst>
+    <dgm:pt modelId="{B2F7D82C-91B6-4B86-89BF-0E95CE5B4972}" type="doc">
+      <dgm:prSet loTypeId="urn:microsoft.com/office/officeart/2005/8/layout/process3" loCatId="process" qsTypeId="urn:microsoft.com/office/officeart/2005/8/quickstyle/simple1" qsCatId="simple" csTypeId="urn:microsoft.com/office/officeart/2005/8/colors/accent1_2" csCatId="accent1" phldr="1"/>
+      <dgm:spPr/>
+    </dgm:pt>
+    <dgm:pt modelId="{85B25A58-A07C-478A-ADA7-F457C97E78A2}">
+      <dgm:prSet phldrT="[Text]"/>
+      <dgm:spPr/>
+      <dgm:t>
+        <a:bodyPr/>
+        <a:lstStyle/>
+        <a:p>
+          <a:r>
+            <a:rPr lang="en-US" dirty="0"/>
+            <a:t>Obama [7198]</a:t>
+          </a:r>
+          <a:br>
+            <a:rPr lang="en-US" dirty="0"/>
+          </a:br>
+          <a:r>
+            <a:rPr lang="en-US" dirty="0"/>
+            <a:t>Romney [7200]</a:t>
+          </a:r>
+        </a:p>
+      </dgm:t>
+    </dgm:pt>
+    <dgm:pt modelId="{16BFD6AE-908D-4183-8520-87A0C5EF951A}" type="parTrans" cxnId="{4C817E82-31BC-4020-8E37-CF2DBB63541B}">
+      <dgm:prSet/>
+      <dgm:spPr/>
+      <dgm:t>
+        <a:bodyPr/>
+        <a:lstStyle/>
+        <a:p>
+          <a:endParaRPr lang="en-US"/>
+        </a:p>
+      </dgm:t>
+    </dgm:pt>
+    <dgm:pt modelId="{2C01D0D7-4878-496A-B9DA-DDE6ED7E80FD}" type="sibTrans" cxnId="{4C817E82-31BC-4020-8E37-CF2DBB63541B}">
+      <dgm:prSet/>
+      <dgm:spPr/>
+      <dgm:t>
+        <a:bodyPr/>
+        <a:lstStyle/>
+        <a:p>
+          <a:endParaRPr lang="en-US"/>
+        </a:p>
+      </dgm:t>
+    </dgm:pt>
+    <dgm:pt modelId="{7146A275-B4C9-4BE0-A382-5063854756BE}">
+      <dgm:prSet phldrT="[Text]"/>
+      <dgm:spPr/>
+      <dgm:t>
+        <a:bodyPr/>
+        <a:lstStyle/>
+        <a:p>
+          <a:r>
+            <a:rPr lang="en-US" dirty="0"/>
+            <a:t>Obama [5624]</a:t>
+          </a:r>
+          <a:br>
+            <a:rPr lang="en-US" dirty="0"/>
+          </a:br>
+          <a:r>
+            <a:rPr lang="en-US" dirty="0"/>
+            <a:t>Romney [5657]</a:t>
+          </a:r>
+        </a:p>
+      </dgm:t>
+    </dgm:pt>
+    <dgm:pt modelId="{B4287982-FDCB-4279-AFC1-C7A3C976A184}" type="parTrans" cxnId="{FEE97AEB-BA60-498C-8AB2-B2DD760472D4}">
+      <dgm:prSet/>
+      <dgm:spPr/>
+      <dgm:t>
+        <a:bodyPr/>
+        <a:lstStyle/>
+        <a:p>
+          <a:endParaRPr lang="en-US"/>
+        </a:p>
+      </dgm:t>
+    </dgm:pt>
+    <dgm:pt modelId="{736FC6C5-3312-4A4F-B174-51FA4EFDC651}" type="sibTrans" cxnId="{FEE97AEB-BA60-498C-8AB2-B2DD760472D4}">
+      <dgm:prSet/>
+      <dgm:spPr/>
+      <dgm:t>
+        <a:bodyPr/>
+        <a:lstStyle/>
+        <a:p>
+          <a:endParaRPr lang="en-US"/>
+        </a:p>
+      </dgm:t>
+    </dgm:pt>
+    <dgm:pt modelId="{C6779839-DF7B-45BA-ACC4-5CD3B2A7E733}">
+      <dgm:prSet phldrT="[Text]"/>
+      <dgm:spPr/>
+      <dgm:t>
+        <a:bodyPr/>
+        <a:lstStyle/>
+        <a:p>
+          <a:r>
+            <a:rPr lang="en-US" dirty="0"/>
+            <a:t>Obama [5189]</a:t>
+          </a:r>
+          <a:br>
+            <a:rPr lang="en-US" dirty="0"/>
+          </a:br>
+          <a:r>
+            <a:rPr lang="en-US" dirty="0"/>
+            <a:t>Romney [5270]</a:t>
+          </a:r>
+        </a:p>
+      </dgm:t>
+    </dgm:pt>
+    <dgm:pt modelId="{261D195D-EF4C-48B8-BD26-FBB105991CAC}" type="parTrans" cxnId="{BE653A55-BA20-49FA-AF8F-3499842A68D1}">
+      <dgm:prSet/>
+      <dgm:spPr/>
+      <dgm:t>
+        <a:bodyPr/>
+        <a:lstStyle/>
+        <a:p>
+          <a:endParaRPr lang="en-US"/>
+        </a:p>
+      </dgm:t>
+    </dgm:pt>
+    <dgm:pt modelId="{BC0FEE63-A93A-4B85-9E9C-8059203BDA2E}" type="sibTrans" cxnId="{BE653A55-BA20-49FA-AF8F-3499842A68D1}">
+      <dgm:prSet/>
+      <dgm:spPr/>
+      <dgm:t>
+        <a:bodyPr/>
+        <a:lstStyle/>
+        <a:p>
+          <a:endParaRPr lang="en-US"/>
+        </a:p>
+      </dgm:t>
+    </dgm:pt>
+    <dgm:pt modelId="{A2F83816-0985-4A54-A4E6-656D6035374B}" type="pres">
+      <dgm:prSet presAssocID="{B2F7D82C-91B6-4B86-89BF-0E95CE5B4972}" presName="linearFlow" presStyleCnt="0">
+        <dgm:presLayoutVars>
+          <dgm:dir/>
+          <dgm:animLvl val="lvl"/>
+          <dgm:resizeHandles val="exact"/>
+        </dgm:presLayoutVars>
+      </dgm:prSet>
+      <dgm:spPr/>
+    </dgm:pt>
+    <dgm:pt modelId="{3A335C5B-BAB0-49DE-9C2F-BEBF1CEB294C}" type="pres">
+      <dgm:prSet presAssocID="{85B25A58-A07C-478A-ADA7-F457C97E78A2}" presName="composite" presStyleCnt="0"/>
+      <dgm:spPr/>
+    </dgm:pt>
+    <dgm:pt modelId="{E6E0337C-52ED-4ED0-AA4A-51D00E91FA59}" type="pres">
+      <dgm:prSet presAssocID="{85B25A58-A07C-478A-ADA7-F457C97E78A2}" presName="parTx" presStyleLbl="node1" presStyleIdx="0" presStyleCnt="3">
+        <dgm:presLayoutVars>
+          <dgm:chMax val="0"/>
+          <dgm:chPref val="0"/>
+          <dgm:bulletEnabled val="1"/>
+        </dgm:presLayoutVars>
+      </dgm:prSet>
+      <dgm:spPr/>
+    </dgm:pt>
+    <dgm:pt modelId="{95B20BE6-42EC-4F7B-A406-6B991CC9F9CC}" type="pres">
+      <dgm:prSet presAssocID="{85B25A58-A07C-478A-ADA7-F457C97E78A2}" presName="parSh" presStyleLbl="node1" presStyleIdx="0" presStyleCnt="3"/>
+      <dgm:spPr/>
+    </dgm:pt>
+    <dgm:pt modelId="{9A97EF04-B94A-41E1-942D-AE1128BFA2C6}" type="pres">
+      <dgm:prSet presAssocID="{85B25A58-A07C-478A-ADA7-F457C97E78A2}" presName="desTx" presStyleLbl="fgAcc1" presStyleIdx="0" presStyleCnt="3">
+        <dgm:presLayoutVars>
+          <dgm:bulletEnabled val="1"/>
+        </dgm:presLayoutVars>
+      </dgm:prSet>
+      <dgm:spPr/>
+    </dgm:pt>
+    <dgm:pt modelId="{3BD54D01-6E2A-459C-8065-3410443A61DF}" type="pres">
+      <dgm:prSet presAssocID="{2C01D0D7-4878-496A-B9DA-DDE6ED7E80FD}" presName="sibTrans" presStyleLbl="sibTrans2D1" presStyleIdx="0" presStyleCnt="2"/>
+      <dgm:spPr/>
+    </dgm:pt>
+    <dgm:pt modelId="{2BC79FE6-30E5-447E-93BD-AC415A3E9385}" type="pres">
+      <dgm:prSet presAssocID="{2C01D0D7-4878-496A-B9DA-DDE6ED7E80FD}" presName="connTx" presStyleLbl="sibTrans2D1" presStyleIdx="0" presStyleCnt="2"/>
+      <dgm:spPr/>
+    </dgm:pt>
+    <dgm:pt modelId="{1392DC75-1F3F-423F-9533-1660668DB6BE}" type="pres">
+      <dgm:prSet presAssocID="{7146A275-B4C9-4BE0-A382-5063854756BE}" presName="composite" presStyleCnt="0"/>
+      <dgm:spPr/>
+    </dgm:pt>
+    <dgm:pt modelId="{634834C5-3468-4F36-9BC1-8A54FDB76729}" type="pres">
+      <dgm:prSet presAssocID="{7146A275-B4C9-4BE0-A382-5063854756BE}" presName="parTx" presStyleLbl="node1" presStyleIdx="0" presStyleCnt="3">
+        <dgm:presLayoutVars>
+          <dgm:chMax val="0"/>
+          <dgm:chPref val="0"/>
+          <dgm:bulletEnabled val="1"/>
+        </dgm:presLayoutVars>
+      </dgm:prSet>
+      <dgm:spPr/>
+    </dgm:pt>
+    <dgm:pt modelId="{593213D4-8D55-4809-B960-070754C23366}" type="pres">
+      <dgm:prSet presAssocID="{7146A275-B4C9-4BE0-A382-5063854756BE}" presName="parSh" presStyleLbl="node1" presStyleIdx="1" presStyleCnt="3"/>
+      <dgm:spPr/>
+    </dgm:pt>
+    <dgm:pt modelId="{496FD8CA-A16A-4C5A-AAC2-02E243043BBA}" type="pres">
+      <dgm:prSet presAssocID="{7146A275-B4C9-4BE0-A382-5063854756BE}" presName="desTx" presStyleLbl="fgAcc1" presStyleIdx="1" presStyleCnt="3">
+        <dgm:presLayoutVars>
+          <dgm:bulletEnabled val="1"/>
+        </dgm:presLayoutVars>
+      </dgm:prSet>
+      <dgm:spPr/>
+    </dgm:pt>
+    <dgm:pt modelId="{D5EE5AB4-A215-4CF0-8A04-E64D9D3EEF42}" type="pres">
+      <dgm:prSet presAssocID="{736FC6C5-3312-4A4F-B174-51FA4EFDC651}" presName="sibTrans" presStyleLbl="sibTrans2D1" presStyleIdx="1" presStyleCnt="2"/>
+      <dgm:spPr/>
+    </dgm:pt>
+    <dgm:pt modelId="{40009A36-2D09-4DB0-B124-17C21CBB9F23}" type="pres">
+      <dgm:prSet presAssocID="{736FC6C5-3312-4A4F-B174-51FA4EFDC651}" presName="connTx" presStyleLbl="sibTrans2D1" presStyleIdx="1" presStyleCnt="2"/>
+      <dgm:spPr/>
+    </dgm:pt>
+    <dgm:pt modelId="{283649D3-C58A-4B1F-8061-7383388C6913}" type="pres">
+      <dgm:prSet presAssocID="{C6779839-DF7B-45BA-ACC4-5CD3B2A7E733}" presName="composite" presStyleCnt="0"/>
+      <dgm:spPr/>
+    </dgm:pt>
+    <dgm:pt modelId="{92D0ABE0-31B1-40C4-841F-1C2069D7800C}" type="pres">
+      <dgm:prSet presAssocID="{C6779839-DF7B-45BA-ACC4-5CD3B2A7E733}" presName="parTx" presStyleLbl="node1" presStyleIdx="1" presStyleCnt="3">
+        <dgm:presLayoutVars>
+          <dgm:chMax val="0"/>
+          <dgm:chPref val="0"/>
+          <dgm:bulletEnabled val="1"/>
+        </dgm:presLayoutVars>
+      </dgm:prSet>
+      <dgm:spPr/>
+    </dgm:pt>
+    <dgm:pt modelId="{0F5E11F4-EED4-43D1-8543-55227FF71419}" type="pres">
+      <dgm:prSet presAssocID="{C6779839-DF7B-45BA-ACC4-5CD3B2A7E733}" presName="parSh" presStyleLbl="node1" presStyleIdx="2" presStyleCnt="3"/>
+      <dgm:spPr/>
+    </dgm:pt>
+    <dgm:pt modelId="{1C0F89DE-F069-449D-828A-179EFE292046}" type="pres">
+      <dgm:prSet presAssocID="{C6779839-DF7B-45BA-ACC4-5CD3B2A7E733}" presName="desTx" presStyleLbl="fgAcc1" presStyleIdx="2" presStyleCnt="3">
+        <dgm:presLayoutVars>
+          <dgm:bulletEnabled val="1"/>
+        </dgm:presLayoutVars>
+      </dgm:prSet>
+      <dgm:spPr/>
+    </dgm:pt>
+  </dgm:ptLst>
+  <dgm:cxnLst>
+    <dgm:cxn modelId="{7FCD3965-329C-48D0-BF40-425769C37B9F}" type="presOf" srcId="{7146A275-B4C9-4BE0-A382-5063854756BE}" destId="{593213D4-8D55-4809-B960-070754C23366}" srcOrd="1" destOrd="0" presId="urn:microsoft.com/office/officeart/2005/8/layout/process3"/>
+    <dgm:cxn modelId="{D376A7DC-6574-4C14-AA78-BDD20CD8A967}" type="presOf" srcId="{736FC6C5-3312-4A4F-B174-51FA4EFDC651}" destId="{D5EE5AB4-A215-4CF0-8A04-E64D9D3EEF42}" srcOrd="0" destOrd="0" presId="urn:microsoft.com/office/officeart/2005/8/layout/process3"/>
+    <dgm:cxn modelId="{7A14188E-CA7E-4AF8-AEEB-1A78858A5C57}" type="presOf" srcId="{85B25A58-A07C-478A-ADA7-F457C97E78A2}" destId="{95B20BE6-42EC-4F7B-A406-6B991CC9F9CC}" srcOrd="1" destOrd="0" presId="urn:microsoft.com/office/officeart/2005/8/layout/process3"/>
+    <dgm:cxn modelId="{BE653A55-BA20-49FA-AF8F-3499842A68D1}" srcId="{B2F7D82C-91B6-4B86-89BF-0E95CE5B4972}" destId="{C6779839-DF7B-45BA-ACC4-5CD3B2A7E733}" srcOrd="2" destOrd="0" parTransId="{261D195D-EF4C-48B8-BD26-FBB105991CAC}" sibTransId="{BC0FEE63-A93A-4B85-9E9C-8059203BDA2E}"/>
+    <dgm:cxn modelId="{4C817E82-31BC-4020-8E37-CF2DBB63541B}" srcId="{B2F7D82C-91B6-4B86-89BF-0E95CE5B4972}" destId="{85B25A58-A07C-478A-ADA7-F457C97E78A2}" srcOrd="0" destOrd="0" parTransId="{16BFD6AE-908D-4183-8520-87A0C5EF951A}" sibTransId="{2C01D0D7-4878-496A-B9DA-DDE6ED7E80FD}"/>
+    <dgm:cxn modelId="{60C80876-14A2-4736-B90A-89565A37720D}" type="presOf" srcId="{7146A275-B4C9-4BE0-A382-5063854756BE}" destId="{634834C5-3468-4F36-9BC1-8A54FDB76729}" srcOrd="0" destOrd="0" presId="urn:microsoft.com/office/officeart/2005/8/layout/process3"/>
+    <dgm:cxn modelId="{0BE34142-EE72-4C56-8BE4-FA0F0034D968}" type="presOf" srcId="{B2F7D82C-91B6-4B86-89BF-0E95CE5B4972}" destId="{A2F83816-0985-4A54-A4E6-656D6035374B}" srcOrd="0" destOrd="0" presId="urn:microsoft.com/office/officeart/2005/8/layout/process3"/>
+    <dgm:cxn modelId="{2090C34E-64F6-418E-92C9-FAF3A2277DB6}" type="presOf" srcId="{C6779839-DF7B-45BA-ACC4-5CD3B2A7E733}" destId="{0F5E11F4-EED4-43D1-8543-55227FF71419}" srcOrd="1" destOrd="0" presId="urn:microsoft.com/office/officeart/2005/8/layout/process3"/>
+    <dgm:cxn modelId="{FEE97AEB-BA60-498C-8AB2-B2DD760472D4}" srcId="{B2F7D82C-91B6-4B86-89BF-0E95CE5B4972}" destId="{7146A275-B4C9-4BE0-A382-5063854756BE}" srcOrd="1" destOrd="0" parTransId="{B4287982-FDCB-4279-AFC1-C7A3C976A184}" sibTransId="{736FC6C5-3312-4A4F-B174-51FA4EFDC651}"/>
+    <dgm:cxn modelId="{5DB01A95-6F1A-4C1E-A20A-8AD3365ADA36}" type="presOf" srcId="{2C01D0D7-4878-496A-B9DA-DDE6ED7E80FD}" destId="{2BC79FE6-30E5-447E-93BD-AC415A3E9385}" srcOrd="1" destOrd="0" presId="urn:microsoft.com/office/officeart/2005/8/layout/process3"/>
+    <dgm:cxn modelId="{2CAB1BF7-8163-4277-88F6-3F2B8DF69C9F}" type="presOf" srcId="{C6779839-DF7B-45BA-ACC4-5CD3B2A7E733}" destId="{92D0ABE0-31B1-40C4-841F-1C2069D7800C}" srcOrd="0" destOrd="0" presId="urn:microsoft.com/office/officeart/2005/8/layout/process3"/>
+    <dgm:cxn modelId="{A6A7F92B-17D3-4203-937B-BD949B2F6E3F}" type="presOf" srcId="{736FC6C5-3312-4A4F-B174-51FA4EFDC651}" destId="{40009A36-2D09-4DB0-B124-17C21CBB9F23}" srcOrd="1" destOrd="0" presId="urn:microsoft.com/office/officeart/2005/8/layout/process3"/>
+    <dgm:cxn modelId="{AE20E544-92D2-4E00-9C84-F912B38AD615}" type="presOf" srcId="{85B25A58-A07C-478A-ADA7-F457C97E78A2}" destId="{E6E0337C-52ED-4ED0-AA4A-51D00E91FA59}" srcOrd="0" destOrd="0" presId="urn:microsoft.com/office/officeart/2005/8/layout/process3"/>
+    <dgm:cxn modelId="{5D9A9371-5D1A-4FEA-ADB1-B58636F2D2B2}" type="presOf" srcId="{2C01D0D7-4878-496A-B9DA-DDE6ED7E80FD}" destId="{3BD54D01-6E2A-459C-8065-3410443A61DF}" srcOrd="0" destOrd="0" presId="urn:microsoft.com/office/officeart/2005/8/layout/process3"/>
+    <dgm:cxn modelId="{A6D6AACE-453F-4B42-9168-3E60DD25109F}" type="presParOf" srcId="{A2F83816-0985-4A54-A4E6-656D6035374B}" destId="{3A335C5B-BAB0-49DE-9C2F-BEBF1CEB294C}" srcOrd="0" destOrd="0" presId="urn:microsoft.com/office/officeart/2005/8/layout/process3"/>
+    <dgm:cxn modelId="{EABE69F8-8364-4EF2-9F04-05E1FE6B5D32}" type="presParOf" srcId="{3A335C5B-BAB0-49DE-9C2F-BEBF1CEB294C}" destId="{E6E0337C-52ED-4ED0-AA4A-51D00E91FA59}" srcOrd="0" destOrd="0" presId="urn:microsoft.com/office/officeart/2005/8/layout/process3"/>
+    <dgm:cxn modelId="{3E7DF816-FE40-4F82-A319-020C548A9D6F}" type="presParOf" srcId="{3A335C5B-BAB0-49DE-9C2F-BEBF1CEB294C}" destId="{95B20BE6-42EC-4F7B-A406-6B991CC9F9CC}" srcOrd="1" destOrd="0" presId="urn:microsoft.com/office/officeart/2005/8/layout/process3"/>
+    <dgm:cxn modelId="{46D1E5E0-4912-4D12-A90C-94A1BB419A68}" type="presParOf" srcId="{3A335C5B-BAB0-49DE-9C2F-BEBF1CEB294C}" destId="{9A97EF04-B94A-41E1-942D-AE1128BFA2C6}" srcOrd="2" destOrd="0" presId="urn:microsoft.com/office/officeart/2005/8/layout/process3"/>
+    <dgm:cxn modelId="{526A576B-E42A-4555-9FC2-BB604143D27F}" type="presParOf" srcId="{A2F83816-0985-4A54-A4E6-656D6035374B}" destId="{3BD54D01-6E2A-459C-8065-3410443A61DF}" srcOrd="1" destOrd="0" presId="urn:microsoft.com/office/officeart/2005/8/layout/process3"/>
+    <dgm:cxn modelId="{96C07487-43A7-4C64-9DA3-ADB0323D93F3}" type="presParOf" srcId="{3BD54D01-6E2A-459C-8065-3410443A61DF}" destId="{2BC79FE6-30E5-447E-93BD-AC415A3E9385}" srcOrd="0" destOrd="0" presId="urn:microsoft.com/office/officeart/2005/8/layout/process3"/>
+    <dgm:cxn modelId="{248047AA-C994-45B5-84C5-7E24B6DA8B1C}" type="presParOf" srcId="{A2F83816-0985-4A54-A4E6-656D6035374B}" destId="{1392DC75-1F3F-423F-9533-1660668DB6BE}" srcOrd="2" destOrd="0" presId="urn:microsoft.com/office/officeart/2005/8/layout/process3"/>
+    <dgm:cxn modelId="{9882E8BC-667C-4F65-96F2-399D3829C7E5}" type="presParOf" srcId="{1392DC75-1F3F-423F-9533-1660668DB6BE}" destId="{634834C5-3468-4F36-9BC1-8A54FDB76729}" srcOrd="0" destOrd="0" presId="urn:microsoft.com/office/officeart/2005/8/layout/process3"/>
+    <dgm:cxn modelId="{F4D3E726-65F3-45F4-9517-7478B45E642C}" type="presParOf" srcId="{1392DC75-1F3F-423F-9533-1660668DB6BE}" destId="{593213D4-8D55-4809-B960-070754C23366}" srcOrd="1" destOrd="0" presId="urn:microsoft.com/office/officeart/2005/8/layout/process3"/>
+    <dgm:cxn modelId="{36F75E61-BEE2-4AA0-BA9F-D0D76BF77603}" type="presParOf" srcId="{1392DC75-1F3F-423F-9533-1660668DB6BE}" destId="{496FD8CA-A16A-4C5A-AAC2-02E243043BBA}" srcOrd="2" destOrd="0" presId="urn:microsoft.com/office/officeart/2005/8/layout/process3"/>
+    <dgm:cxn modelId="{347CC0E0-A1D4-4331-AF95-84BE73B37927}" type="presParOf" srcId="{A2F83816-0985-4A54-A4E6-656D6035374B}" destId="{D5EE5AB4-A215-4CF0-8A04-E64D9D3EEF42}" srcOrd="3" destOrd="0" presId="urn:microsoft.com/office/officeart/2005/8/layout/process3"/>
+    <dgm:cxn modelId="{4F02C239-EB82-4EAF-B048-D54AB679D58C}" type="presParOf" srcId="{D5EE5AB4-A215-4CF0-8A04-E64D9D3EEF42}" destId="{40009A36-2D09-4DB0-B124-17C21CBB9F23}" srcOrd="0" destOrd="0" presId="urn:microsoft.com/office/officeart/2005/8/layout/process3"/>
+    <dgm:cxn modelId="{5340CF8B-9FA4-4763-B9C1-F0A7DEEA2BCA}" type="presParOf" srcId="{A2F83816-0985-4A54-A4E6-656D6035374B}" destId="{283649D3-C58A-4B1F-8061-7383388C6913}" srcOrd="4" destOrd="0" presId="urn:microsoft.com/office/officeart/2005/8/layout/process3"/>
+    <dgm:cxn modelId="{90F37A9F-1499-409D-849B-BB4DB5489C68}" type="presParOf" srcId="{283649D3-C58A-4B1F-8061-7383388C6913}" destId="{92D0ABE0-31B1-40C4-841F-1C2069D7800C}" srcOrd="0" destOrd="0" presId="urn:microsoft.com/office/officeart/2005/8/layout/process3"/>
+    <dgm:cxn modelId="{163B64B7-22E3-4E0C-8E1A-48F9609C5898}" type="presParOf" srcId="{283649D3-C58A-4B1F-8061-7383388C6913}" destId="{0F5E11F4-EED4-43D1-8543-55227FF71419}" srcOrd="1" destOrd="0" presId="urn:microsoft.com/office/officeart/2005/8/layout/process3"/>
+    <dgm:cxn modelId="{BF52B622-90BF-44C8-BD6C-84AB2176DF2F}" type="presParOf" srcId="{283649D3-C58A-4B1F-8061-7383388C6913}" destId="{1C0F89DE-F069-449D-828A-179EFE292046}" srcOrd="2" destOrd="0" presId="urn:microsoft.com/office/officeart/2005/8/layout/process3"/>
+  </dgm:cxnLst>
+  <dgm:bg/>
+  <dgm:whole/>
+  <dgm:extLst>
+    <a:ext uri="http://schemas.microsoft.com/office/drawing/2008/diagram">
+      <dsp:dataModelExt xmlns:dsp="http://schemas.microsoft.com/office/drawing/2008/diagram" relId="rId6" minVer="http://schemas.openxmlformats.org/drawingml/2006/diagram"/>
+    </a:ext>
+  </dgm:extLst>
+</dgm:dataModel>
+</file>
+
+<file path=ppt/diagrams/drawing1.xml><?xml version="1.0" encoding="utf-8"?>
+<dsp:drawing xmlns:dgm="http://schemas.openxmlformats.org/drawingml/2006/diagram" xmlns:dsp="http://schemas.microsoft.com/office/drawing/2008/diagram" xmlns:a="http://schemas.openxmlformats.org/drawingml/2006/main">
+  <dsp:spTree>
+    <dsp:nvGrpSpPr>
+      <dsp:cNvPr id="0" name=""/>
+      <dsp:cNvGrpSpPr/>
+    </dsp:nvGrpSpPr>
+    <dsp:grpSpPr/>
+    <dsp:sp modelId="{95B20BE6-42EC-4F7B-A406-6B991CC9F9CC}">
+      <dsp:nvSpPr>
+        <dsp:cNvPr id="0" name=""/>
+        <dsp:cNvSpPr/>
+      </dsp:nvSpPr>
+      <dsp:spPr>
+        <a:xfrm>
+          <a:off x="3414" y="1108034"/>
+          <a:ext cx="1552438" cy="819172"/>
+        </a:xfrm>
+        <a:prstGeom prst="roundRect">
+          <a:avLst>
+            <a:gd name="adj" fmla="val 10000"/>
+          </a:avLst>
+        </a:prstGeom>
+        <a:solidFill>
+          <a:schemeClr val="accent1">
+            <a:hueOff val="0"/>
+            <a:satOff val="0"/>
+            <a:lumOff val="0"/>
+            <a:alphaOff val="0"/>
+          </a:schemeClr>
+        </a:solidFill>
+        <a:ln w="19050" cap="rnd" cmpd="sng" algn="ctr">
+          <a:solidFill>
+            <a:schemeClr val="lt1">
+              <a:hueOff val="0"/>
+              <a:satOff val="0"/>
+              <a:lumOff val="0"/>
+              <a:alphaOff val="0"/>
+            </a:schemeClr>
+          </a:solidFill>
+          <a:prstDash val="solid"/>
+        </a:ln>
+        <a:effectLst/>
+      </dsp:spPr>
+      <dsp:style>
+        <a:lnRef idx="2">
+          <a:scrgbClr r="0" g="0" b="0"/>
+        </a:lnRef>
+        <a:fillRef idx="1">
+          <a:scrgbClr r="0" g="0" b="0"/>
+        </a:fillRef>
+        <a:effectRef idx="0">
+          <a:scrgbClr r="0" g="0" b="0"/>
+        </a:effectRef>
+        <a:fontRef idx="minor">
+          <a:schemeClr val="lt1"/>
+        </a:fontRef>
+      </dsp:style>
+      <dsp:txBody>
+        <a:bodyPr spcFirstLastPara="0" vert="horz" wrap="square" lIns="99568" tIns="99568" rIns="99568" bIns="53340" numCol="1" spcCol="1270" anchor="t" anchorCtr="0">
+          <a:noAutofit/>
+        </a:bodyPr>
+        <a:lstStyle/>
+        <a:p>
+          <a:pPr marL="0" lvl="0" indent="0" algn="l" defTabSz="622300">
+            <a:lnSpc>
+              <a:spcPct val="90000"/>
+            </a:lnSpc>
+            <a:spcBef>
+              <a:spcPct val="0"/>
+            </a:spcBef>
+            <a:spcAft>
+              <a:spcPct val="35000"/>
+            </a:spcAft>
+            <a:buNone/>
+          </a:pPr>
+          <a:r>
+            <a:rPr lang="en-US" sz="1400" kern="1200" dirty="0"/>
+            <a:t>Obama [7198]</a:t>
+          </a:r>
+          <a:br>
+            <a:rPr lang="en-US" sz="1400" kern="1200" dirty="0"/>
+          </a:br>
+          <a:r>
+            <a:rPr lang="en-US" sz="1400" kern="1200" dirty="0"/>
+            <a:t>Romney [7200]</a:t>
+          </a:r>
+        </a:p>
+      </dsp:txBody>
+      <dsp:txXfrm>
+        <a:off x="3414" y="1108034"/>
+        <a:ext cx="1552438" cy="546115"/>
+      </dsp:txXfrm>
+    </dsp:sp>
+    <dsp:sp modelId="{9A97EF04-B94A-41E1-942D-AE1128BFA2C6}">
+      <dsp:nvSpPr>
+        <dsp:cNvPr id="0" name=""/>
+        <dsp:cNvSpPr/>
+      </dsp:nvSpPr>
+      <dsp:spPr>
+        <a:xfrm>
+          <a:off x="321383" y="1654150"/>
+          <a:ext cx="1552438" cy="806400"/>
+        </a:xfrm>
+        <a:prstGeom prst="roundRect">
+          <a:avLst>
+            <a:gd name="adj" fmla="val 10000"/>
+          </a:avLst>
+        </a:prstGeom>
+        <a:solidFill>
+          <a:schemeClr val="lt1">
+            <a:alpha val="90000"/>
+            <a:hueOff val="0"/>
+            <a:satOff val="0"/>
+            <a:lumOff val="0"/>
+            <a:alphaOff val="0"/>
+          </a:schemeClr>
+        </a:solidFill>
+        <a:ln w="19050" cap="rnd" cmpd="sng" algn="ctr">
+          <a:solidFill>
+            <a:schemeClr val="accent1">
+              <a:hueOff val="0"/>
+              <a:satOff val="0"/>
+              <a:lumOff val="0"/>
+              <a:alphaOff val="0"/>
+            </a:schemeClr>
+          </a:solidFill>
+          <a:prstDash val="solid"/>
+        </a:ln>
+        <a:effectLst/>
+      </dsp:spPr>
+      <dsp:style>
+        <a:lnRef idx="2">
+          <a:scrgbClr r="0" g="0" b="0"/>
+        </a:lnRef>
+        <a:fillRef idx="1">
+          <a:scrgbClr r="0" g="0" b="0"/>
+        </a:fillRef>
+        <a:effectRef idx="0">
+          <a:scrgbClr r="0" g="0" b="0"/>
+        </a:effectRef>
+        <a:fontRef idx="minor"/>
+      </dsp:style>
+    </dsp:sp>
+    <dsp:sp modelId="{3BD54D01-6E2A-459C-8065-3410443A61DF}">
+      <dsp:nvSpPr>
+        <dsp:cNvPr id="0" name=""/>
+        <dsp:cNvSpPr/>
+      </dsp:nvSpPr>
+      <dsp:spPr>
+        <a:xfrm>
+          <a:off x="1791196" y="1187836"/>
+          <a:ext cx="498929" cy="386512"/>
+        </a:xfrm>
+        <a:prstGeom prst="rightArrow">
+          <a:avLst>
+            <a:gd name="adj1" fmla="val 60000"/>
+            <a:gd name="adj2" fmla="val 50000"/>
+          </a:avLst>
+        </a:prstGeom>
+        <a:solidFill>
+          <a:schemeClr val="accent1">
+            <a:tint val="60000"/>
+            <a:hueOff val="0"/>
+            <a:satOff val="0"/>
+            <a:lumOff val="0"/>
+            <a:alphaOff val="0"/>
+          </a:schemeClr>
+        </a:solidFill>
+        <a:ln>
+          <a:noFill/>
+        </a:ln>
+        <a:effectLst/>
+      </dsp:spPr>
+      <dsp:style>
+        <a:lnRef idx="0">
+          <a:scrgbClr r="0" g="0" b="0"/>
+        </a:lnRef>
+        <a:fillRef idx="1">
+          <a:scrgbClr r="0" g="0" b="0"/>
+        </a:fillRef>
+        <a:effectRef idx="0">
+          <a:scrgbClr r="0" g="0" b="0"/>
+        </a:effectRef>
+        <a:fontRef idx="minor">
+          <a:schemeClr val="lt1"/>
+        </a:fontRef>
+      </dsp:style>
+      <dsp:txBody>
+        <a:bodyPr spcFirstLastPara="0" vert="horz" wrap="square" lIns="0" tIns="0" rIns="0" bIns="0" numCol="1" spcCol="1270" anchor="ctr" anchorCtr="0">
+          <a:noAutofit/>
+        </a:bodyPr>
+        <a:lstStyle/>
+        <a:p>
+          <a:pPr marL="0" lvl="0" indent="0" algn="ctr" defTabSz="488950">
+            <a:lnSpc>
+              <a:spcPct val="90000"/>
+            </a:lnSpc>
+            <a:spcBef>
+              <a:spcPct val="0"/>
+            </a:spcBef>
+            <a:spcAft>
+              <a:spcPct val="35000"/>
+            </a:spcAft>
+            <a:buNone/>
+          </a:pPr>
+          <a:endParaRPr lang="en-US" sz="1100" kern="1200"/>
+        </a:p>
+      </dsp:txBody>
+      <dsp:txXfrm>
+        <a:off x="1791196" y="1265138"/>
+        <a:ext cx="382975" cy="231908"/>
+      </dsp:txXfrm>
+    </dsp:sp>
+    <dsp:sp modelId="{593213D4-8D55-4809-B960-070754C23366}">
+      <dsp:nvSpPr>
+        <dsp:cNvPr id="0" name=""/>
+        <dsp:cNvSpPr/>
+      </dsp:nvSpPr>
+      <dsp:spPr>
+        <a:xfrm>
+          <a:off x="2497229" y="1108034"/>
+          <a:ext cx="1552438" cy="819172"/>
+        </a:xfrm>
+        <a:prstGeom prst="roundRect">
+          <a:avLst>
+            <a:gd name="adj" fmla="val 10000"/>
+          </a:avLst>
+        </a:prstGeom>
+        <a:solidFill>
+          <a:schemeClr val="accent1">
+            <a:hueOff val="0"/>
+            <a:satOff val="0"/>
+            <a:lumOff val="0"/>
+            <a:alphaOff val="0"/>
+          </a:schemeClr>
+        </a:solidFill>
+        <a:ln w="19050" cap="rnd" cmpd="sng" algn="ctr">
+          <a:solidFill>
+            <a:schemeClr val="lt1">
+              <a:hueOff val="0"/>
+              <a:satOff val="0"/>
+              <a:lumOff val="0"/>
+              <a:alphaOff val="0"/>
+            </a:schemeClr>
+          </a:solidFill>
+          <a:prstDash val="solid"/>
+        </a:ln>
+        <a:effectLst/>
+      </dsp:spPr>
+      <dsp:style>
+        <a:lnRef idx="2">
+          <a:scrgbClr r="0" g="0" b="0"/>
+        </a:lnRef>
+        <a:fillRef idx="1">
+          <a:scrgbClr r="0" g="0" b="0"/>
+        </a:fillRef>
+        <a:effectRef idx="0">
+          <a:scrgbClr r="0" g="0" b="0"/>
+        </a:effectRef>
+        <a:fontRef idx="minor">
+          <a:schemeClr val="lt1"/>
+        </a:fontRef>
+      </dsp:style>
+      <dsp:txBody>
+        <a:bodyPr spcFirstLastPara="0" vert="horz" wrap="square" lIns="99568" tIns="99568" rIns="99568" bIns="53340" numCol="1" spcCol="1270" anchor="t" anchorCtr="0">
+          <a:noAutofit/>
+        </a:bodyPr>
+        <a:lstStyle/>
+        <a:p>
+          <a:pPr marL="0" lvl="0" indent="0" algn="l" defTabSz="622300">
+            <a:lnSpc>
+              <a:spcPct val="90000"/>
+            </a:lnSpc>
+            <a:spcBef>
+              <a:spcPct val="0"/>
+            </a:spcBef>
+            <a:spcAft>
+              <a:spcPct val="35000"/>
+            </a:spcAft>
+            <a:buNone/>
+          </a:pPr>
+          <a:r>
+            <a:rPr lang="en-US" sz="1400" kern="1200" dirty="0"/>
+            <a:t>Obama [5624]</a:t>
+          </a:r>
+          <a:br>
+            <a:rPr lang="en-US" sz="1400" kern="1200" dirty="0"/>
+          </a:br>
+          <a:r>
+            <a:rPr lang="en-US" sz="1400" kern="1200" dirty="0"/>
+            <a:t>Romney [5657]</a:t>
+          </a:r>
+        </a:p>
+      </dsp:txBody>
+      <dsp:txXfrm>
+        <a:off x="2497229" y="1108034"/>
+        <a:ext cx="1552438" cy="546115"/>
+      </dsp:txXfrm>
+    </dsp:sp>
+    <dsp:sp modelId="{496FD8CA-A16A-4C5A-AAC2-02E243043BBA}">
+      <dsp:nvSpPr>
+        <dsp:cNvPr id="0" name=""/>
+        <dsp:cNvSpPr/>
+      </dsp:nvSpPr>
+      <dsp:spPr>
+        <a:xfrm>
+          <a:off x="2815198" y="1654150"/>
+          <a:ext cx="1552438" cy="806400"/>
+        </a:xfrm>
+        <a:prstGeom prst="roundRect">
+          <a:avLst>
+            <a:gd name="adj" fmla="val 10000"/>
+          </a:avLst>
+        </a:prstGeom>
+        <a:solidFill>
+          <a:schemeClr val="lt1">
+            <a:alpha val="90000"/>
+            <a:hueOff val="0"/>
+            <a:satOff val="0"/>
+            <a:lumOff val="0"/>
+            <a:alphaOff val="0"/>
+          </a:schemeClr>
+        </a:solidFill>
+        <a:ln w="19050" cap="rnd" cmpd="sng" algn="ctr">
+          <a:solidFill>
+            <a:schemeClr val="accent1">
+              <a:hueOff val="0"/>
+              <a:satOff val="0"/>
+              <a:lumOff val="0"/>
+              <a:alphaOff val="0"/>
+            </a:schemeClr>
+          </a:solidFill>
+          <a:prstDash val="solid"/>
+        </a:ln>
+        <a:effectLst/>
+      </dsp:spPr>
+      <dsp:style>
+        <a:lnRef idx="2">
+          <a:scrgbClr r="0" g="0" b="0"/>
+        </a:lnRef>
+        <a:fillRef idx="1">
+          <a:scrgbClr r="0" g="0" b="0"/>
+        </a:fillRef>
+        <a:effectRef idx="0">
+          <a:scrgbClr r="0" g="0" b="0"/>
+        </a:effectRef>
+        <a:fontRef idx="minor"/>
+      </dsp:style>
+    </dsp:sp>
+    <dsp:sp modelId="{D5EE5AB4-A215-4CF0-8A04-E64D9D3EEF42}">
+      <dsp:nvSpPr>
+        <dsp:cNvPr id="0" name=""/>
+        <dsp:cNvSpPr/>
+      </dsp:nvSpPr>
+      <dsp:spPr>
+        <a:xfrm>
+          <a:off x="4285011" y="1187836"/>
+          <a:ext cx="498929" cy="386512"/>
+        </a:xfrm>
+        <a:prstGeom prst="rightArrow">
+          <a:avLst>
+            <a:gd name="adj1" fmla="val 60000"/>
+            <a:gd name="adj2" fmla="val 50000"/>
+          </a:avLst>
+        </a:prstGeom>
+        <a:solidFill>
+          <a:schemeClr val="accent1">
+            <a:tint val="60000"/>
+            <a:hueOff val="0"/>
+            <a:satOff val="0"/>
+            <a:lumOff val="0"/>
+            <a:alphaOff val="0"/>
+          </a:schemeClr>
+        </a:solidFill>
+        <a:ln>
+          <a:noFill/>
+        </a:ln>
+        <a:effectLst/>
+      </dsp:spPr>
+      <dsp:style>
+        <a:lnRef idx="0">
+          <a:scrgbClr r="0" g="0" b="0"/>
+        </a:lnRef>
+        <a:fillRef idx="1">
+          <a:scrgbClr r="0" g="0" b="0"/>
+        </a:fillRef>
+        <a:effectRef idx="0">
+          <a:scrgbClr r="0" g="0" b="0"/>
+        </a:effectRef>
+        <a:fontRef idx="minor">
+          <a:schemeClr val="lt1"/>
+        </a:fontRef>
+      </dsp:style>
+      <dsp:txBody>
+        <a:bodyPr spcFirstLastPara="0" vert="horz" wrap="square" lIns="0" tIns="0" rIns="0" bIns="0" numCol="1" spcCol="1270" anchor="ctr" anchorCtr="0">
+          <a:noAutofit/>
+        </a:bodyPr>
+        <a:lstStyle/>
+        <a:p>
+          <a:pPr marL="0" lvl="0" indent="0" algn="ctr" defTabSz="488950">
+            <a:lnSpc>
+              <a:spcPct val="90000"/>
+            </a:lnSpc>
+            <a:spcBef>
+              <a:spcPct val="0"/>
+            </a:spcBef>
+            <a:spcAft>
+              <a:spcPct val="35000"/>
+            </a:spcAft>
+            <a:buNone/>
+          </a:pPr>
+          <a:endParaRPr lang="en-US" sz="1100" kern="1200"/>
+        </a:p>
+      </dsp:txBody>
+      <dsp:txXfrm>
+        <a:off x="4285011" y="1265138"/>
+        <a:ext cx="382975" cy="231908"/>
+      </dsp:txXfrm>
+    </dsp:sp>
+    <dsp:sp modelId="{0F5E11F4-EED4-43D1-8543-55227FF71419}">
+      <dsp:nvSpPr>
+        <dsp:cNvPr id="0" name=""/>
+        <dsp:cNvSpPr/>
+      </dsp:nvSpPr>
+      <dsp:spPr>
+        <a:xfrm>
+          <a:off x="4991043" y="1108034"/>
+          <a:ext cx="1552438" cy="819172"/>
+        </a:xfrm>
+        <a:prstGeom prst="roundRect">
+          <a:avLst>
+            <a:gd name="adj" fmla="val 10000"/>
+          </a:avLst>
+        </a:prstGeom>
+        <a:solidFill>
+          <a:schemeClr val="accent1">
+            <a:hueOff val="0"/>
+            <a:satOff val="0"/>
+            <a:lumOff val="0"/>
+            <a:alphaOff val="0"/>
+          </a:schemeClr>
+        </a:solidFill>
+        <a:ln w="19050" cap="rnd" cmpd="sng" algn="ctr">
+          <a:solidFill>
+            <a:schemeClr val="lt1">
+              <a:hueOff val="0"/>
+              <a:satOff val="0"/>
+              <a:lumOff val="0"/>
+              <a:alphaOff val="0"/>
+            </a:schemeClr>
+          </a:solidFill>
+          <a:prstDash val="solid"/>
+        </a:ln>
+        <a:effectLst/>
+      </dsp:spPr>
+      <dsp:style>
+        <a:lnRef idx="2">
+          <a:scrgbClr r="0" g="0" b="0"/>
+        </a:lnRef>
+        <a:fillRef idx="1">
+          <a:scrgbClr r="0" g="0" b="0"/>
+        </a:fillRef>
+        <a:effectRef idx="0">
+          <a:scrgbClr r="0" g="0" b="0"/>
+        </a:effectRef>
+        <a:fontRef idx="minor">
+          <a:schemeClr val="lt1"/>
+        </a:fontRef>
+      </dsp:style>
+      <dsp:txBody>
+        <a:bodyPr spcFirstLastPara="0" vert="horz" wrap="square" lIns="99568" tIns="99568" rIns="99568" bIns="53340" numCol="1" spcCol="1270" anchor="t" anchorCtr="0">
+          <a:noAutofit/>
+        </a:bodyPr>
+        <a:lstStyle/>
+        <a:p>
+          <a:pPr marL="0" lvl="0" indent="0" algn="l" defTabSz="622300">
+            <a:lnSpc>
+              <a:spcPct val="90000"/>
+            </a:lnSpc>
+            <a:spcBef>
+              <a:spcPct val="0"/>
+            </a:spcBef>
+            <a:spcAft>
+              <a:spcPct val="35000"/>
+            </a:spcAft>
+            <a:buNone/>
+          </a:pPr>
+          <a:r>
+            <a:rPr lang="en-US" sz="1400" kern="1200" dirty="0"/>
+            <a:t>Obama [5189]</a:t>
+          </a:r>
+          <a:br>
+            <a:rPr lang="en-US" sz="1400" kern="1200" dirty="0"/>
+          </a:br>
+          <a:r>
+            <a:rPr lang="en-US" sz="1400" kern="1200" dirty="0"/>
+            <a:t>Romney [5270]</a:t>
+          </a:r>
+        </a:p>
+      </dsp:txBody>
+      <dsp:txXfrm>
+        <a:off x="4991043" y="1108034"/>
+        <a:ext cx="1552438" cy="546115"/>
+      </dsp:txXfrm>
+    </dsp:sp>
+    <dsp:sp modelId="{1C0F89DE-F069-449D-828A-179EFE292046}">
+      <dsp:nvSpPr>
+        <dsp:cNvPr id="0" name=""/>
+        <dsp:cNvSpPr/>
+      </dsp:nvSpPr>
+      <dsp:spPr>
+        <a:xfrm>
+          <a:off x="5309013" y="1654150"/>
+          <a:ext cx="1552438" cy="806400"/>
+        </a:xfrm>
+        <a:prstGeom prst="roundRect">
+          <a:avLst>
+            <a:gd name="adj" fmla="val 10000"/>
+          </a:avLst>
+        </a:prstGeom>
+        <a:solidFill>
+          <a:schemeClr val="lt1">
+            <a:alpha val="90000"/>
+            <a:hueOff val="0"/>
+            <a:satOff val="0"/>
+            <a:lumOff val="0"/>
+            <a:alphaOff val="0"/>
+          </a:schemeClr>
+        </a:solidFill>
+        <a:ln w="19050" cap="rnd" cmpd="sng" algn="ctr">
+          <a:solidFill>
+            <a:schemeClr val="accent1">
+              <a:hueOff val="0"/>
+              <a:satOff val="0"/>
+              <a:lumOff val="0"/>
+              <a:alphaOff val="0"/>
+            </a:schemeClr>
+          </a:solidFill>
+          <a:prstDash val="solid"/>
+        </a:ln>
+        <a:effectLst/>
+      </dsp:spPr>
+      <dsp:style>
+        <a:lnRef idx="2">
+          <a:scrgbClr r="0" g="0" b="0"/>
+        </a:lnRef>
+        <a:fillRef idx="1">
+          <a:scrgbClr r="0" g="0" b="0"/>
+        </a:fillRef>
+        <a:effectRef idx="0">
+          <a:scrgbClr r="0" g="0" b="0"/>
+        </a:effectRef>
+        <a:fontRef idx="minor"/>
+      </dsp:style>
+    </dsp:sp>
+  </dsp:spTree>
+</dsp:drawing>
+</file>
+
+<file path=ppt/diagrams/layout1.xml><?xml version="1.0" encoding="utf-8"?>
+<dgm:layoutDef xmlns:dgm="http://schemas.openxmlformats.org/drawingml/2006/diagram" xmlns:a="http://schemas.openxmlformats.org/drawingml/2006/main" uniqueId="urn:microsoft.com/office/officeart/2005/8/layout/process3">
+  <dgm:title val=""/>
+  <dgm:desc val=""/>
+  <dgm:catLst>
+    <dgm:cat type="process" pri="2000"/>
+  </dgm:catLst>
+  <dgm:sampData>
+    <dgm:dataModel>
+      <dgm:ptLst>
+        <dgm:pt modelId="0" type="doc"/>
+        <dgm:pt modelId="1">
+          <dgm:prSet phldr="1"/>
+        </dgm:pt>
+        <dgm:pt modelId="11">
+          <dgm:prSet phldr="1"/>
+        </dgm:pt>
+        <dgm:pt modelId="2">
+          <dgm:prSet phldr="1"/>
+        </dgm:pt>
+        <dgm:pt modelId="21">
+          <dgm:prSet phldr="1"/>
+        </dgm:pt>
+        <dgm:pt modelId="3">
+          <dgm:prSet phldr="1"/>
+        </dgm:pt>
+        <dgm:pt modelId="31">
+          <dgm:prSet phldr="1"/>
+        </dgm:pt>
+      </dgm:ptLst>
+      <dgm:cxnLst>
+        <dgm:cxn modelId="4" srcId="0" destId="1" srcOrd="0" destOrd="0"/>
+        <dgm:cxn modelId="5" srcId="0" destId="2" srcOrd="1" destOrd="0"/>
+        <dgm:cxn modelId="6" srcId="0" destId="3" srcOrd="3" destOrd="0"/>
+        <dgm:cxn modelId="12" srcId="1" destId="11" srcOrd="0" destOrd="0"/>
+        <dgm:cxn modelId="23" srcId="2" destId="21" srcOrd="0" destOrd="0"/>
+        <dgm:cxn modelId="34" srcId="3" destId="31" srcOrd="0" destOrd="0"/>
+      </dgm:cxnLst>
+      <dgm:bg/>
+      <dgm:whole/>
+    </dgm:dataModel>
+  </dgm:sampData>
+  <dgm:styleData>
+    <dgm:dataModel>
+      <dgm:ptLst>
+        <dgm:pt modelId="0" type="doc"/>
+        <dgm:pt modelId="1">
+          <dgm:prSet phldr="1"/>
+        </dgm:pt>
+        <dgm:pt modelId="11">
+          <dgm:prSet phldr="1"/>
+        </dgm:pt>
+        <dgm:pt modelId="2">
+          <dgm:prSet phldr="1"/>
+        </dgm:pt>
+        <dgm:pt modelId="21">
+          <dgm:prSet phldr="1"/>
+        </dgm:pt>
+      </dgm:ptLst>
+      <dgm:cxnLst>
+        <dgm:cxn modelId="4" srcId="0" destId="1" srcOrd="0" destOrd="0"/>
+        <dgm:cxn modelId="5" srcId="0" destId="2" srcOrd="1" destOrd="0"/>
+        <dgm:cxn modelId="13" srcId="1" destId="11" srcOrd="0" destOrd="0"/>
+        <dgm:cxn modelId="23" srcId="2" destId="21" srcOrd="0" destOrd="0"/>
+      </dgm:cxnLst>
+      <dgm:bg/>
+      <dgm:whole/>
+    </dgm:dataModel>
+  </dgm:styleData>
+  <dgm:clrData>
+    <dgm:dataModel>
+      <dgm:ptLst>
+        <dgm:pt modelId="0" type="doc"/>
+        <dgm:pt modelId="1">
+          <dgm:prSet phldr="1"/>
+        </dgm:pt>
+        <dgm:pt modelId="11">
+          <dgm:prSet phldr="1"/>
+        </dgm:pt>
+        <dgm:pt modelId="2">
+          <dgm:prSet phldr="1"/>
+        </dgm:pt>
+        <dgm:pt modelId="21">
+          <dgm:prSet phldr="1"/>
+        </dgm:pt>
+        <dgm:pt modelId="3">
+          <dgm:prSet phldr="1"/>
+        </dgm:pt>
+        <dgm:pt modelId="31">
+          <dgm:prSet phldr="1"/>
+        </dgm:pt>
+        <dgm:pt modelId="4">
+          <dgm:prSet phldr="1"/>
+        </dgm:pt>
+        <dgm:pt modelId="41">
+          <dgm:prSet phldr="1"/>
+        </dgm:pt>
+      </dgm:ptLst>
+      <dgm:cxnLst>
+        <dgm:cxn modelId="5" srcId="0" destId="1" srcOrd="0" destOrd="0"/>
+        <dgm:cxn modelId="6" srcId="0" destId="2" srcOrd="1" destOrd="0"/>
+        <dgm:cxn modelId="7" srcId="0" destId="3" srcOrd="2" destOrd="0"/>
+        <dgm:cxn modelId="8" srcId="0" destId="4" srcOrd="3" destOrd="0"/>
+        <dgm:cxn modelId="13" srcId="1" destId="11" srcOrd="0" destOrd="0"/>
+        <dgm:cxn modelId="23" srcId="2" destId="21" srcOrd="0" destOrd="0"/>
+        <dgm:cxn modelId="33" srcId="3" destId="31" srcOrd="0" destOrd="0"/>
+        <dgm:cxn modelId="43" srcId="4" destId="41" srcOrd="0" destOrd="0"/>
+      </dgm:cxnLst>
+      <dgm:bg/>
+      <dgm:whole/>
+    </dgm:dataModel>
+  </dgm:clrData>
+  <dgm:layoutNode name="linearFlow">
+    <dgm:varLst>
+      <dgm:dir/>
+      <dgm:animLvl val="lvl"/>
+      <dgm:resizeHandles val="exact"/>
+    </dgm:varLst>
+    <dgm:choose name="Name0">
+      <dgm:if name="Name1" func="var" arg="dir" op="equ" val="norm">
+        <dgm:alg type="lin"/>
+      </dgm:if>
+      <dgm:else name="Name2">
+        <dgm:alg type="lin">
+          <dgm:param type="linDir" val="fromR"/>
+        </dgm:alg>
+      </dgm:else>
+    </dgm:choose>
+    <dgm:shape xmlns:r="http://schemas.openxmlformats.org/officeDocument/2006/relationships" r:blip="">
+      <dgm:adjLst/>
+    </dgm:shape>
+    <dgm:presOf/>
+    <dgm:constrLst>
+      <dgm:constr type="w" for="ch" forName="composite" refType="w"/>
+      <dgm:constr type="w" for="ch" ptType="sibTrans" refType="w" refFor="ch" refForName="composite" fact="0.3333"/>
+      <dgm:constr type="w" for="des" forName="parTx"/>
+      <dgm:constr type="h" for="des" forName="parTx" op="equ"/>
+      <dgm:constr type="h" for="des" forName="parSh" op="equ"/>
+      <dgm:constr type="w" for="des" forName="desTx"/>
+      <dgm:constr type="h" for="des" forName="desTx" op="equ"/>
+      <dgm:constr type="w" for="des" forName="parSh"/>
+      <dgm:constr type="primFontSz" for="des" forName="parTx" val="65"/>
+      <dgm:constr type="secFontSz" for="des" forName="desTx" refType="primFontSz" refFor="des" refForName="parTx" op="equ"/>
+      <dgm:constr type="primFontSz" for="des" forName="connTx" refType="primFontSz" refFor="des" refForName="parTx" fact="0.8"/>
+      <dgm:constr type="primFontSz" for="des" forName="connTx" refType="primFontSz" refFor="des" refForName="parTx" op="lte" fact="0.8"/>
+      <dgm:constr type="h" for="des" forName="parTx" refType="primFontSz" refFor="des" refForName="parTx" fact="0.8"/>
+      <dgm:constr type="h" for="des" forName="parSh" refType="primFontSz" refFor="des" refForName="parTx" fact="1.2"/>
+      <dgm:constr type="h" for="des" forName="desTx" refType="primFontSz" refFor="des" refForName="parTx" fact="1.6"/>
+      <dgm:constr type="h" for="des" forName="parSh" refType="h" refFor="des" refForName="parTx" op="lte" fact="1.5"/>
+      <dgm:constr type="h" for="des" forName="parSh" refType="h" refFor="des" refForName="parTx" op="gte" fact="1.5"/>
+    </dgm:constrLst>
+    <dgm:ruleLst>
+      <dgm:rule type="w" for="ch" forName="composite" val="0" fact="NaN" max="NaN"/>
+      <dgm:rule type="primFontSz" for="des" forName="parTx" val="5" fact="NaN" max="NaN"/>
+    </dgm:ruleLst>
+    <dgm:forEach name="Name3" axis="ch" ptType="node">
+      <dgm:layoutNode name="composite">
+        <dgm:alg type="composite"/>
+        <dgm:shape xmlns:r="http://schemas.openxmlformats.org/officeDocument/2006/relationships" r:blip="">
+          <dgm:adjLst/>
+        </dgm:shape>
+        <dgm:presOf/>
+        <dgm:choose name="Name4">
+          <dgm:if name="Name5" func="var" arg="dir" op="equ" val="norm">
+            <dgm:constrLst>
+              <dgm:constr type="h" refType="w" fact="1000"/>
+              <dgm:constr type="l" for="ch" forName="parTx"/>
+              <dgm:constr type="w" for="ch" forName="parTx" refType="w" fact="0.83"/>
+              <dgm:constr type="t" for="ch" forName="parTx"/>
+              <dgm:constr type="l" for="ch" forName="parSh"/>
+              <dgm:constr type="w" for="ch" forName="parSh" refType="w" refFor="ch" refForName="parTx"/>
+              <dgm:constr type="t" for="ch" forName="parSh"/>
+              <dgm:constr type="l" for="ch" forName="desTx" refType="w" fact="0.17"/>
+              <dgm:constr type="w" for="ch" forName="desTx" refType="w" refFor="ch" refForName="parTx"/>
+              <dgm:constr type="t" for="ch" forName="desTx" refType="h" refFor="ch" refForName="parTx"/>
+            </dgm:constrLst>
+          </dgm:if>
+          <dgm:else name="Name6">
+            <dgm:constrLst>
+              <dgm:constr type="h" refType="w" fact="1000"/>
+              <dgm:constr type="l" for="ch" forName="parTx" refType="w" fact="0.17"/>
+              <dgm:constr type="w" for="ch" forName="parTx" refType="w" fact="0.83"/>
+              <dgm:constr type="t" for="ch" forName="parTx"/>
+              <dgm:constr type="l" for="ch" forName="parSh" refType="w" fact="0.15"/>
+              <dgm:constr type="w" for="ch" forName="parSh" refType="w" refFor="ch" refForName="parTx"/>
+              <dgm:constr type="t" for="ch" forName="parSh"/>
+              <dgm:constr type="l" for="ch" forName="desTx"/>
+              <dgm:constr type="w" for="ch" forName="desTx" refType="w" refFor="ch" refForName="parTx"/>
+              <dgm:constr type="t" for="ch" forName="desTx" refType="h" refFor="ch" refForName="parTx"/>
+            </dgm:constrLst>
+          </dgm:else>
+        </dgm:choose>
+        <dgm:ruleLst>
+          <dgm:rule type="h" val="INF" fact="NaN" max="NaN"/>
+        </dgm:ruleLst>
+        <dgm:layoutNode name="parTx">
+          <dgm:varLst>
+            <dgm:chMax val="0"/>
+            <dgm:chPref val="0"/>
+            <dgm:bulletEnabled val="1"/>
+          </dgm:varLst>
+          <dgm:alg type="tx">
+            <dgm:param type="parTxLTRAlign" val="l"/>
+            <dgm:param type="parTxRTLAlign" val="r"/>
+            <dgm:param type="txAnchorVert" val="t"/>
+          </dgm:alg>
+          <dgm:shape xmlns:r="http://schemas.openxmlformats.org/officeDocument/2006/relationships" type="rect" r:blip="" zOrderOff="1" hideGeom="1">
+            <dgm:adjLst>
+              <dgm:adj idx="1" val="0.1"/>
+            </dgm:adjLst>
+          </dgm:shape>
+          <dgm:presOf axis="self" ptType="node"/>
+          <dgm:constrLst>
+            <dgm:constr type="h" refType="w" op="lte" fact="0.4"/>
+            <dgm:constr type="bMarg" refType="primFontSz" fact="0.3"/>
+            <dgm:constr type="h"/>
+          </dgm:constrLst>
+          <dgm:ruleLst>
+            <dgm:rule type="h" val="INF" fact="NaN" max="NaN"/>
+          </dgm:ruleLst>
+        </dgm:layoutNode>
+        <dgm:layoutNode name="parSh">
+          <dgm:alg type="sp"/>
+          <dgm:shape xmlns:r="http://schemas.openxmlformats.org/officeDocument/2006/relationships" type="roundRect" r:blip="">
+            <dgm:adjLst>
+              <dgm:adj idx="1" val="0.1"/>
+            </dgm:adjLst>
+          </dgm:shape>
+          <dgm:presOf axis="self" ptType="node"/>
+          <dgm:constrLst>
+            <dgm:constr type="h"/>
+          </dgm:constrLst>
+          <dgm:ruleLst/>
+        </dgm:layoutNode>
+        <dgm:layoutNode name="desTx" styleLbl="fgAcc1">
+          <dgm:varLst>
+            <dgm:bulletEnabled val="1"/>
+          </dgm:varLst>
+          <dgm:alg type="tx">
+            <dgm:param type="stBulletLvl" val="1"/>
+          </dgm:alg>
+          <dgm:shape xmlns:r="http://schemas.openxmlformats.org/officeDocument/2006/relationships" type="roundRect" r:blip="">
+            <dgm:adjLst>
+              <dgm:adj idx="1" val="0.1"/>
+            </dgm:adjLst>
+          </dgm:shape>
+          <dgm:presOf axis="des" ptType="node"/>
+          <dgm:constrLst>
+            <dgm:constr type="secFontSz" val="65"/>
+            <dgm:constr type="primFontSz" refType="secFontSz"/>
+            <dgm:constr type="h"/>
+          </dgm:constrLst>
+          <dgm:ruleLst>
+            <dgm:rule type="h" val="INF" fact="NaN" max="NaN"/>
+          </dgm:ruleLst>
+        </dgm:layoutNode>
+      </dgm:layoutNode>
+      <dgm:forEach name="sibTransForEach" axis="followSib" ptType="sibTrans" cnt="1">
+        <dgm:layoutNode name="sibTrans">
+          <dgm:alg type="conn">
+            <dgm:param type="begPts" val="auto"/>
+            <dgm:param type="endPts" val="auto"/>
+            <dgm:param type="srcNode" val="parTx"/>
+            <dgm:param type="dstNode" val="parTx"/>
+          </dgm:alg>
+          <dgm:shape xmlns:r="http://schemas.openxmlformats.org/officeDocument/2006/relationships" type="conn" r:blip="">
+            <dgm:adjLst/>
+          </dgm:shape>
+          <dgm:presOf axis="self"/>
+          <dgm:constrLst>
+            <dgm:constr type="h" refType="w" fact="0.62"/>
+            <dgm:constr type="connDist"/>
+            <dgm:constr type="begPad" refType="connDist" fact="0.25"/>
+            <dgm:constr type="endPad" refType="connDist" fact="0.22"/>
+          </dgm:constrLst>
+          <dgm:ruleLst/>
+          <dgm:layoutNode name="connTx">
+            <dgm:alg type="tx">
+              <dgm:param type="autoTxRot" val="grav"/>
+            </dgm:alg>
+            <dgm:shape xmlns:r="http://schemas.openxmlformats.org/officeDocument/2006/relationships" type="conn" r:blip="" hideGeom="1">
+              <dgm:adjLst/>
+            </dgm:shape>
+            <dgm:presOf axis="self"/>
+            <dgm:constrLst>
+              <dgm:constr type="lMarg"/>
+              <dgm:constr type="rMarg"/>
+              <dgm:constr type="tMarg"/>
+              <dgm:constr type="bMarg"/>
+            </dgm:constrLst>
+            <dgm:ruleLst>
+              <dgm:rule type="primFontSz" val="5" fact="NaN" max="NaN"/>
+            </dgm:ruleLst>
+          </dgm:layoutNode>
+        </dgm:layoutNode>
+      </dgm:forEach>
+    </dgm:forEach>
+  </dgm:layoutNode>
+</dgm:layoutDef>
+</file>
+
+<file path=ppt/diagrams/quickStyle1.xml><?xml version="1.0" encoding="utf-8"?>
+<dgm:styleDef xmlns:dgm="http://schemas.openxmlformats.org/drawingml/2006/diagram" xmlns:a="http://schemas.openxmlformats.org/drawingml/2006/main" uniqueId="urn:microsoft.com/office/officeart/2005/8/quickstyle/simple1">
+  <dgm:title val=""/>
+  <dgm:desc val=""/>
+  <dgm:catLst>
+    <dgm:cat type="simple" pri="10100"/>
+  </dgm:catLst>
+  <dgm:scene3d>
+    <a:camera prst="orthographicFront"/>
+    <a:lightRig rig="threePt" dir="t"/>
+  </dgm:scene3d>
+  <dgm:styleLbl name="node0">
+    <dgm:scene3d>
+      <a:camera prst="orthographicFront"/>
+      <a:lightRig rig="threePt" dir="t"/>
+    </dgm:scene3d>
+    <dgm:sp3d/>
+    <dgm:txPr/>
+    <dgm:style>
+      <a:lnRef idx="2">
+        <a:scrgbClr r="0" g="0" b="0"/>
+      </a:lnRef>
+      <a:fillRef idx="1">
+        <a:scrgbClr r="0" g="0" b="0"/>
+      </a:fillRef>
+      <a:effectRef idx="0">
+        <a:scrgbClr r="0" g="0" b="0"/>
+      </a:effectRef>
+      <a:fontRef idx="minor">
+        <a:schemeClr val="lt1"/>
+      </a:fontRef>
+    </dgm:style>
+  </dgm:styleLbl>
+  <dgm:styleLbl name="lnNode1">
+    <dgm:scene3d>
+      <a:camera prst="orthographicFront"/>
+      <a:lightRig rig="threePt" dir="t"/>
+    </dgm:scene3d>
+    <dgm:sp3d/>
+    <dgm:txPr/>
+    <dgm:style>
+      <a:lnRef idx="2">
+        <a:scrgbClr r="0" g="0" b="0"/>
+      </a:lnRef>
+      <a:fillRef idx="1">
+        <a:scrgbClr r="0" g="0" b="0"/>
+      </a:fillRef>
+      <a:effectRef idx="0">
+        <a:scrgbClr r="0" g="0" b="0"/>
+      </a:effectRef>
+      <a:fontRef idx="minor">
+        <a:schemeClr val="lt1"/>
+      </a:fontRef>
+    </dgm:style>
+  </dgm:styleLbl>
+  <dgm:styleLbl name="vennNode1">
+    <dgm:scene3d>
+      <a:camera prst="orthographicFront"/>
+      <a:lightRig rig="threePt" dir="t"/>
+    </dgm:scene3d>
+    <dgm:sp3d/>
+    <dgm:txPr/>
+    <dgm:style>
+      <a:lnRef idx="2">
+        <a:scrgbClr r="0" g="0" b="0"/>
+      </a:lnRef>
+      <a:fillRef idx="1">
+        <a:scrgbClr r="0" g="0" b="0"/>
+      </a:fillRef>
+      <a:effectRef idx="0">
+        <a:scrgbClr r="0" g="0" b="0"/>
+      </a:effectRef>
+      <a:fontRef idx="minor">
+        <a:schemeClr val="tx1"/>
+      </a:fontRef>
+    </dgm:style>
+  </dgm:styleLbl>
+  <dgm:styleLbl name="alignNode1">
+    <dgm:scene3d>
+      <a:camera prst="orthographicFront"/>
+      <a:lightRig rig="threePt" dir="t"/>
+    </dgm:scene3d>
+    <dgm:sp3d/>
+    <dgm:txPr/>
+    <dgm:style>
+      <a:lnRef idx="2">
+        <a:scrgbClr r="0" g="0" b="0"/>
+      </a:lnRef>
+      <a:fillRef idx="1">
+        <a:scrgbClr r="0" g="0" b="0"/>
+      </a:fillRef>
+      <a:effectRef idx="0">
+        <a:scrgbClr r="0" g="0" b="0"/>
+      </a:effectRef>
+      <a:fontRef idx="minor">
+        <a:schemeClr val="lt1"/>
+      </a:fontRef>
+    </dgm:style>
+  </dgm:styleLbl>
+  <dgm:styleLbl name="node1">
+    <dgm:scene3d>
+      <a:camera prst="orthographicFront"/>
+      <a:lightRig rig="threePt" dir="t"/>
+    </dgm:scene3d>
+    <dgm:sp3d/>
+    <dgm:txPr/>
+    <dgm:style>
+      <a:lnRef idx="2">
+        <a:scrgbClr r="0" g="0" b="0"/>
+      </a:lnRef>
+      <a:fillRef idx="1">
+        <a:scrgbClr r="0" g="0" b="0"/>
+      </a:fillRef>
+      <a:effectRef idx="0">
+        <a:scrgbClr r="0" g="0" b="0"/>
+      </a:effectRef>
+      <a:fontRef idx="minor">
+        <a:schemeClr val="lt1"/>
+      </a:fontRef>
+    </dgm:style>
+  </dgm:styleLbl>
+  <dgm:styleLbl name="node2">
+    <dgm:scene3d>
+      <a:camera prst="orthographicFront"/>
+      <a:lightRig rig="threePt" dir="t"/>
+    </dgm:scene3d>
+    <dgm:sp3d/>
+    <dgm:txPr/>
+    <dgm:style>
+      <a:lnRef idx="2">
+        <a:scrgbClr r="0" g="0" b="0"/>
+      </a:lnRef>
+      <a:fillRef idx="1">
+        <a:scrgbClr r="0" g="0" b="0"/>
+      </a:fillRef>
+      <a:effectRef idx="0">
+        <a:scrgbClr r="0" g="0" b="0"/>
+      </a:effectRef>
+      <a:fontRef idx="minor">
+        <a:schemeClr val="lt1"/>
+      </a:fontRef>
+    </dgm:style>
+  </dgm:styleLbl>
+  <dgm:styleLbl name="node3">
+    <dgm:scene3d>
+      <a:camera prst="orthographicFront"/>
+      <a:lightRig rig="threePt" dir="t"/>
+    </dgm:scene3d>
+    <dgm:sp3d/>
+    <dgm:txPr/>
+    <dgm:style>
+      <a:lnRef idx="2">
+        <a:scrgbClr r="0" g="0" b="0"/>
+      </a:lnRef>
+      <a:fillRef idx="1">
+        <a:scrgbClr r="0" g="0" b="0"/>
+      </a:fillRef>
+      <a:effectRef idx="0">
+        <a:scrgbClr r="0" g="0" b="0"/>
+      </a:effectRef>
+      <a:fontRef idx="minor">
+        <a:schemeClr val="lt1"/>
+      </a:fontRef>
+    </dgm:style>
+  </dgm:styleLbl>
+  <dgm:styleLbl name="node4">
+    <dgm:scene3d>
+      <a:camera prst="orthographicFront"/>
+      <a:lightRig rig="threePt" dir="t"/>
+    </dgm:scene3d>
+    <dgm:sp3d/>
+    <dgm:txPr/>
+    <dgm:style>
+      <a:lnRef idx="2">
+        <a:scrgbClr r="0" g="0" b="0"/>
+      </a:lnRef>
+      <a:fillRef idx="1">
+        <a:scrgbClr r="0" g="0" b="0"/>
+      </a:fillRef>
+      <a:effectRef idx="0">
+        <a:scrgbClr r="0" g="0" b="0"/>
+      </a:effectRef>
+      <a:fontRef idx="minor">
+        <a:schemeClr val="lt1"/>
+      </a:fontRef>
+    </dgm:style>
+  </dgm:styleLbl>
+  <dgm:styleLbl name="fgImgPlace1">
+    <dgm:scene3d>
+      <a:camera prst="orthographicFront"/>
+      <a:lightRig rig="threePt" dir="t"/>
+    </dgm:scene3d>
+    <dgm:sp3d/>
+    <dgm:txPr/>
+    <dgm:style>
+      <a:lnRef idx="2">
+        <a:scrgbClr r="0" g="0" b="0"/>
+      </a:lnRef>
+      <a:fillRef idx="1">
+        <a:scrgbClr r="0" g="0" b="0"/>
+      </a:fillRef>
+      <a:effectRef idx="0">
+        <a:scrgbClr r="0" g="0" b="0"/>
+      </a:effectRef>
+      <a:fontRef idx="minor"/>
+    </dgm:style>
+  </dgm:styleLbl>
+  <dgm:styleLbl name="alignImgPlace1">
+    <dgm:scene3d>
+      <a:camera prst="orthographicFront"/>
+      <a:lightRig rig="threePt" dir="t"/>
+    </dgm:scene3d>
+    <dgm:sp3d/>
+    <dgm:txPr/>
+    <dgm:style>
+      <a:lnRef idx="2">
+        <a:scrgbClr r="0" g="0" b="0"/>
+      </a:lnRef>
+      <a:fillRef idx="1">
+        <a:scrgbClr r="0" g="0" b="0"/>
+      </a:fillRef>
+      <a:effectRef idx="0">
+        <a:scrgbClr r="0" g="0" b="0"/>
+      </a:effectRef>
+      <a:fontRef idx="minor"/>
+    </dgm:style>
+  </dgm:styleLbl>
+  <dgm:styleLbl name="bgImgPlace1">
+    <dgm:scene3d>
+      <a:camera prst="orthographicFront"/>
+      <a:lightRig rig="threePt" dir="t"/>
+    </dgm:scene3d>
+    <dgm:sp3d/>
+    <dgm:txPr/>
+    <dgm:style>
+      <a:lnRef idx="2">
+        <a:scrgbClr r="0" g="0" b="0"/>
+      </a:lnRef>
+      <a:fillRef idx="1">
+        <a:scrgbClr r="0" g="0" b="0"/>
+      </a:fillRef>
+      <a:effectRef idx="0">
+        <a:scrgbClr r="0" g="0" b="0"/>
+      </a:effectRef>
+      <a:fontRef idx="minor"/>
+    </dgm:style>
+  </dgm:styleLbl>
+  <dgm:styleLbl name="sibTrans2D1">
+    <dgm:scene3d>
+      <a:camera prst="orthographicFront"/>
+      <a:lightRig rig="threePt" dir="t"/>
+    </dgm:scene3d>
+    <dgm:sp3d/>
+    <dgm:txPr/>
+    <dgm:style>
+      <a:lnRef idx="0">
+        <a:scrgbClr r="0" g="0" b="0"/>
+      </a:lnRef>
+      <a:fillRef idx="1">
+        <a:scrgbClr r="0" g="0" b="0"/>
+      </a:fillRef>
+      <a:effectRef idx="0">
+        <a:scrgbClr r="0" g="0" b="0"/>
+      </a:effectRef>
+      <a:fontRef idx="minor">
+        <a:schemeClr val="lt1"/>
+      </a:fontRef>
+    </dgm:style>
+  </dgm:styleLbl>
+  <dgm:styleLbl name="fgSibTrans2D1">
+    <dgm:scene3d>
+      <a:camera prst="orthographicFront"/>
+      <a:lightRig rig="threePt" dir="t"/>
+    </dgm:scene3d>
+    <dgm:sp3d/>
+    <dgm:txPr/>
+    <dgm:style>
+      <a:lnRef idx="0">
+        <a:scrgbClr r="0" g="0" b="0"/>
+      </a:lnRef>
+      <a:fillRef idx="1">
+        <a:scrgbClr r="0" g="0" b="0"/>
+      </a:fillRef>
+      <a:effectRef idx="0">
+        <a:scrgbClr r="0" g="0" b="0"/>
+      </a:effectRef>
+      <a:fontRef idx="minor">
+        <a:schemeClr val="lt1"/>
+      </a:fontRef>
+    </dgm:style>
+  </dgm:styleLbl>
+  <dgm:styleLbl name="bgSibTrans2D1">
+    <dgm:scene3d>
+      <a:camera prst="orthographicFront"/>
+      <a:lightRig rig="threePt" dir="t"/>
+    </dgm:scene3d>
+    <dgm:sp3d/>
+    <dgm:txPr/>
+    <dgm:style>
+      <a:lnRef idx="0">
+        <a:scrgbClr r="0" g="0" b="0"/>
+      </a:lnRef>
+      <a:fillRef idx="1">
+        <a:scrgbClr r="0" g="0" b="0"/>
+      </a:fillRef>
+      <a:effectRef idx="0">
+        <a:scrgbClr r="0" g="0" b="0"/>
+      </a:effectRef>
+      <a:fontRef idx="minor">
+        <a:schemeClr val="lt1"/>
+      </a:fontRef>
+    </dgm:style>
+  </dgm:styleLbl>
+  <dgm:styleLbl name="sibTrans1D1">
+    <dgm:scene3d>
+      <a:camera prst="orthographicFront"/>
+      <a:lightRig rig="threePt" dir="t"/>
+    </dgm:scene3d>
+    <dgm:sp3d/>
+    <dgm:txPr/>
+    <dgm:style>
+      <a:lnRef idx="1">
+        <a:scrgbClr r="0" g="0" b="0"/>
+      </a:lnRef>
+      <a:fillRef idx="0">
+        <a:scrgbClr r="0" g="0" b="0"/>
+      </a:fillRef>
+      <a:effectRef idx="0">
+        <a:scrgbClr r="0" g="0" b="0"/>
+      </a:effectRef>
+      <a:fontRef idx="minor"/>
+    </dgm:style>
+  </dgm:styleLbl>
+  <dgm:styleLbl name="callout">
+    <dgm:scene3d>
+      <a:camera prst="orthographicFront"/>
+      <a:lightRig rig="threePt" dir="t"/>
+    </dgm:scene3d>
+    <dgm:sp3d/>
+    <dgm:txPr/>
+    <dgm:style>
+      <a:lnRef idx="2">
+        <a:scrgbClr r="0" g="0" b="0"/>
+      </a:lnRef>
+      <a:fillRef idx="1">
+        <a:scrgbClr r="0" g="0" b="0"/>
+      </a:fillRef>
+      <a:effectRef idx="0">
+        <a:scrgbClr r="0" g="0" b="0"/>
+      </a:effectRef>
+      <a:fontRef idx="minor"/>
+    </dgm:style>
+  </dgm:styleLbl>
+  <dgm:styleLbl name="asst0">
+    <dgm:scene3d>
+      <a:camera prst="orthographicFront"/>
+      <a:lightRig rig="threePt" dir="t"/>
+    </dgm:scene3d>
+    <dgm:sp3d/>
+    <dgm:txPr/>
+    <dgm:style>
+      <a:lnRef idx="2">
+        <a:scrgbClr r="0" g="0" b="0"/>
+      </a:lnRef>
+      <a:fillRef idx="1">
+        <a:scrgbClr r="0" g="0" b="0"/>
+      </a:fillRef>
+      <a:effectRef idx="0">
+        <a:scrgbClr r="0" g="0" b="0"/>
+      </a:effectRef>
+      <a:fontRef idx="minor">
+        <a:schemeClr val="lt1"/>
+      </a:fontRef>
+    </dgm:style>
+  </dgm:styleLbl>
+  <dgm:styleLbl name="asst1">
+    <dgm:scene3d>
+      <a:camera prst="orthographicFront"/>
+      <a:lightRig rig="threePt" dir="t"/>
+    </dgm:scene3d>
+    <dgm:sp3d/>
+    <dgm:txPr/>
+    <dgm:style>
+      <a:lnRef idx="2">
+        <a:scrgbClr r="0" g="0" b="0"/>
+      </a:lnRef>
+      <a:fillRef idx="1">
+        <a:scrgbClr r="0" g="0" b="0"/>
+      </a:fillRef>
+      <a:effectRef idx="0">
+        <a:scrgbClr r="0" g="0" b="0"/>
+      </a:effectRef>
+      <a:fontRef idx="minor">
+        <a:schemeClr val="lt1"/>
+      </a:fontRef>
+    </dgm:style>
+  </dgm:styleLbl>
+  <dgm:styleLbl name="asst2">
+    <dgm:scene3d>
+      <a:camera prst="orthographicFront"/>
+      <a:lightRig rig="threePt" dir="t"/>
+    </dgm:scene3d>
+    <dgm:sp3d/>
+    <dgm:txPr/>
+    <dgm:style>
+      <a:lnRef idx="2">
+        <a:scrgbClr r="0" g="0" b="0"/>
+      </a:lnRef>
+      <a:fillRef idx="1">
+        <a:scrgbClr r="0" g="0" b="0"/>
+      </a:fillRef>
+      <a:effectRef idx="0">
+        <a:scrgbClr r="0" g="0" b="0"/>
+      </a:effectRef>
+      <a:fontRef idx="minor">
+        <a:schemeClr val="lt1"/>
+      </a:fontRef>
+    </dgm:style>
+  </dgm:styleLbl>
+  <dgm:styleLbl name="asst3">
+    <dgm:scene3d>
+      <a:camera prst="orthographicFront"/>
+      <a:lightRig rig="threePt" dir="t"/>
+    </dgm:scene3d>
+    <dgm:sp3d/>
+    <dgm:txPr/>
+    <dgm:style>
+      <a:lnRef idx="2">
+        <a:scrgbClr r="0" g="0" b="0"/>
+      </a:lnRef>
+      <a:fillRef idx="1">
+        <a:scrgbClr r="0" g="0" b="0"/>
+      </a:fillRef>
+      <a:effectRef idx="0">
+        <a:scrgbClr r="0" g="0" b="0"/>
+      </a:effectRef>
+      <a:fontRef idx="minor">
+        <a:schemeClr val="lt1"/>
+      </a:fontRef>
+    </dgm:style>
+  </dgm:styleLbl>
+  <dgm:styleLbl name="asst4">
+    <dgm:scene3d>
+      <a:camera prst="orthographicFront"/>
+      <a:lightRig rig="threePt" dir="t"/>
+    </dgm:scene3d>
+    <dgm:sp3d/>
+    <dgm:txPr/>
+    <dgm:style>
+      <a:lnRef idx="2">
+        <a:scrgbClr r="0" g="0" b="0"/>
+      </a:lnRef>
+      <a:fillRef idx="1">
+        <a:scrgbClr r="0" g="0" b="0"/>
+      </a:fillRef>
+      <a:effectRef idx="0">
+        <a:scrgbClr r="0" g="0" b="0"/>
+      </a:effectRef>
+      <a:fontRef idx="minor">
+        <a:schemeClr val="lt1"/>
+      </a:fontRef>
+    </dgm:style>
+  </dgm:styleLbl>
+  <dgm:styleLbl name="parChTrans2D1">
+    <dgm:scene3d>
+      <a:camera prst="orthographicFront"/>
+      <a:lightRig rig="threePt" dir="t"/>
+    </dgm:scene3d>
+    <dgm:sp3d/>
+    <dgm:txPr/>
+    <dgm:style>
+      <a:lnRef idx="2">
+        <a:scrgbClr r="0" g="0" b="0"/>
+      </a:lnRef>
+      <a:fillRef idx="1">
+        <a:scrgbClr r="0" g="0" b="0"/>
+      </a:fillRef>
+      <a:effectRef idx="0">
+        <a:scrgbClr r="0" g="0" b="0"/>
+      </a:effectRef>
+      <a:fontRef idx="minor">
+        <a:schemeClr val="lt1"/>
+      </a:fontRef>
+    </dgm:style>
+  </dgm:styleLbl>
+  <dgm:styleLbl name="parChTrans2D2">
+    <dgm:scene3d>
+      <a:camera prst="orthographicFront"/>
+      <a:lightRig rig="threePt" dir="t"/>
+    </dgm:scene3d>
+    <dgm:sp3d/>
+    <dgm:txPr/>
+    <dgm:style>
+      <a:lnRef idx="2">
+        <a:scrgbClr r="0" g="0" b="0"/>
+      </a:lnRef>
+      <a:fillRef idx="1">
+        <a:scrgbClr r="0" g="0" b="0"/>
+      </a:fillRef>
+      <a:effectRef idx="0">
+        <a:scrgbClr r="0" g="0" b="0"/>
+      </a:effectRef>
+      <a:fontRef idx="minor">
+        <a:schemeClr val="lt1"/>
+      </a:fontRef>
+    </dgm:style>
+  </dgm:styleLbl>
+  <dgm:styleLbl name="parChTrans2D3">
+    <dgm:scene3d>
+      <a:camera prst="orthographicFront"/>
+      <a:lightRig rig="threePt" dir="t"/>
+    </dgm:scene3d>
+    <dgm:sp3d/>
+    <dgm:txPr/>
+    <dgm:style>
+      <a:lnRef idx="2">
+        <a:scrgbClr r="0" g="0" b="0"/>
+      </a:lnRef>
+      <a:fillRef idx="1">
+        <a:scrgbClr r="0" g="0" b="0"/>
+      </a:fillRef>
+      <a:effectRef idx="0">
+        <a:scrgbClr r="0" g="0" b="0"/>
+      </a:effectRef>
+      <a:fontRef idx="minor">
+        <a:schemeClr val="lt1"/>
+      </a:fontRef>
+    </dgm:style>
+  </dgm:styleLbl>
+  <dgm:styleLbl name="parChTrans2D4">
+    <dgm:scene3d>
+      <a:camera prst="orthographicFront"/>
+      <a:lightRig rig="threePt" dir="t"/>
+    </dgm:scene3d>
+    <dgm:sp3d/>
+    <dgm:txPr/>
+    <dgm:style>
+      <a:lnRef idx="2">
+        <a:scrgbClr r="0" g="0" b="0"/>
+      </a:lnRef>
+      <a:fillRef idx="1">
+        <a:scrgbClr r="0" g="0" b="0"/>
+      </a:fillRef>
+      <a:effectRef idx="0">
+        <a:scrgbClr r="0" g="0" b="0"/>
+      </a:effectRef>
+      <a:fontRef idx="minor">
+        <a:schemeClr val="lt1"/>
+      </a:fontRef>
+    </dgm:style>
+  </dgm:styleLbl>
+  <dgm:styleLbl name="parChTrans1D1">
+    <dgm:scene3d>
+      <a:camera prst="orthographicFront"/>
+      <a:lightRig rig="threePt" dir="t"/>
+    </dgm:scene3d>
+    <dgm:sp3d/>
+    <dgm:txPr/>
+    <dgm:style>
+      <a:lnRef idx="2">
+        <a:scrgbClr r="0" g="0" b="0"/>
+      </a:lnRef>
+      <a:fillRef idx="0">
+        <a:scrgbClr r="0" g="0" b="0"/>
+      </a:fillRef>
+      <a:effectRef idx="0">
+        <a:scrgbClr r="0" g="0" b="0"/>
+      </a:effectRef>
+      <a:fontRef idx="minor"/>
+    </dgm:style>
+  </dgm:styleLbl>
+  <dgm:styleLbl name="parChTrans1D2">
+    <dgm:scene3d>
+      <a:camera prst="orthographicFront"/>
+      <a:lightRig rig="threePt" dir="t"/>
+    </dgm:scene3d>
+    <dgm:sp3d/>
+    <dgm:txPr/>
+    <dgm:style>
+      <a:lnRef idx="2">
+        <a:scrgbClr r="0" g="0" b="0"/>
+      </a:lnRef>
+      <a:fillRef idx="0">
+        <a:scrgbClr r="0" g="0" b="0"/>
+      </a:fillRef>
+      <a:effectRef idx="0">
+        <a:scrgbClr r="0" g="0" b="0"/>
+      </a:effectRef>
+      <a:fontRef idx="minor"/>
+    </dgm:style>
+  </dgm:styleLbl>
+  <dgm:styleLbl name="parChTrans1D3">
+    <dgm:scene3d>
+      <a:camera prst="orthographicFront"/>
+      <a:lightRig rig="threePt" dir="t"/>
+    </dgm:scene3d>
+    <dgm:sp3d/>
+    <dgm:txPr/>
+    <dgm:style>
+      <a:lnRef idx="2">
+        <a:scrgbClr r="0" g="0" b="0"/>
+      </a:lnRef>
+      <a:fillRef idx="0">
+        <a:scrgbClr r="0" g="0" b="0"/>
+      </a:fillRef>
+      <a:effectRef idx="0">
+        <a:scrgbClr r="0" g="0" b="0"/>
+      </a:effectRef>
+      <a:fontRef idx="minor"/>
+    </dgm:style>
+  </dgm:styleLbl>
+  <dgm:styleLbl name="parChTrans1D4">
+    <dgm:scene3d>
+      <a:camera prst="orthographicFront"/>
+      <a:lightRig rig="threePt" dir="t"/>
+    </dgm:scene3d>
+    <dgm:sp3d/>
+    <dgm:txPr/>
+    <dgm:style>
+      <a:lnRef idx="2">
+        <a:scrgbClr r="0" g="0" b="0"/>
+      </a:lnRef>
+      <a:fillRef idx="0">
+        <a:scrgbClr r="0" g="0" b="0"/>
+      </a:fillRef>
+      <a:effectRef idx="0">
+        <a:scrgbClr r="0" g="0" b="0"/>
+      </a:effectRef>
+      <a:fontRef idx="minor"/>
+    </dgm:style>
+  </dgm:styleLbl>
+  <dgm:styleLbl name="fgAcc1">
+    <dgm:scene3d>
+      <a:camera prst="orthographicFront"/>
+      <a:lightRig rig="threePt" dir="t"/>
+    </dgm:scene3d>
+    <dgm:sp3d/>
+    <dgm:txPr/>
+    <dgm:style>
+      <a:lnRef idx="2">
+        <a:scrgbClr r="0" g="0" b="0"/>
+      </a:lnRef>
+      <a:fillRef idx="1">
+        <a:scrgbClr r="0" g="0" b="0"/>
+      </a:fillRef>
+      <a:effectRef idx="0">
+        <a:scrgbClr r="0" g="0" b="0"/>
+      </a:effectRef>
+      <a:fontRef idx="minor"/>
+    </dgm:style>
+  </dgm:styleLbl>
+  <dgm:styleLbl name="conFgAcc1">
+    <dgm:scene3d>
+      <a:camera prst="orthographicFront"/>
+      <a:lightRig rig="threePt" dir="t"/>
+    </dgm:scene3d>
+    <dgm:sp3d/>
+    <dgm:txPr/>
+    <dgm:style>
+      <a:lnRef idx="2">
+        <a:scrgbClr r="0" g="0" b="0"/>
+      </a:lnRef>
+      <a:fillRef idx="1">
+        <a:scrgbClr r="0" g="0" b="0"/>
+      </a:fillRef>
+      <a:effectRef idx="0">
+        <a:scrgbClr r="0" g="0" b="0"/>
+      </a:effectRef>
+      <a:fontRef idx="minor"/>
+    </dgm:style>
+  </dgm:styleLbl>
+  <dgm:styleLbl name="alignAcc1">
+    <dgm:scene3d>
+      <a:camera prst="orthographicFront"/>
+      <a:lightRig rig="threePt" dir="t"/>
+    </dgm:scene3d>
+    <dgm:sp3d/>
+    <dgm:txPr/>
+    <dgm:style>
+      <a:lnRef idx="2">
+        <a:scrgbClr r="0" g="0" b="0"/>
+      </a:lnRef>
+      <a:fillRef idx="1">
+        <a:scrgbClr r="0" g="0" b="0"/>
+      </a:fillRef>
+      <a:effectRef idx="0">
+        <a:scrgbClr r="0" g="0" b="0"/>
+      </a:effectRef>
+      <a:fontRef idx="minor"/>
+    </dgm:style>
+  </dgm:styleLbl>
+  <dgm:styleLbl name="trAlignAcc1">
+    <dgm:scene3d>
+      <a:camera prst="orthographicFront"/>
+      <a:lightRig rig="threePt" dir="t"/>
+    </dgm:scene3d>
+    <dgm:sp3d/>
+    <dgm:txPr/>
+    <dgm:style>
+      <a:lnRef idx="1">
+        <a:scrgbClr r="0" g="0" b="0"/>
+      </a:lnRef>
+      <a:fillRef idx="1">
+        <a:scrgbClr r="0" g="0" b="0"/>
+      </a:fillRef>
+      <a:effectRef idx="0">
+        <a:scrgbClr r="0" g="0" b="0"/>
+      </a:effectRef>
+      <a:fontRef idx="minor"/>
+    </dgm:style>
+  </dgm:styleLbl>
+  <dgm:styleLbl name="bgAcc1">
+    <dgm:scene3d>
+      <a:camera prst="orthographicFront"/>
+      <a:lightRig rig="threePt" dir="t"/>
+    </dgm:scene3d>
+    <dgm:sp3d/>
+    <dgm:txPr/>
+    <dgm:style>
+      <a:lnRef idx="2">
+        <a:scrgbClr r="0" g="0" b="0"/>
+      </a:lnRef>
+      <a:fillRef idx="1">
+        <a:scrgbClr r="0" g="0" b="0"/>
+      </a:fillRef>
+      <a:effectRef idx="0">
+        <a:scrgbClr r="0" g="0" b="0"/>
+      </a:effectRef>
+      <a:fontRef idx="minor"/>
+    </dgm:style>
+  </dgm:styleLbl>
+  <dgm:styleLbl name="solidFgAcc1">
+    <dgm:scene3d>
+      <a:camera prst="orthographicFront"/>
+      <a:lightRig rig="threePt" dir="t"/>
+    </dgm:scene3d>
+    <dgm:sp3d/>
+    <dgm:txPr/>
+    <dgm:style>
+      <a:lnRef idx="2">
+        <a:scrgbClr r="0" g="0" b="0"/>
+      </a:lnRef>
+      <a:fillRef idx="1">
+        <a:scrgbClr r="0" g="0" b="0"/>
+      </a:fillRef>
+      <a:effectRef idx="0">
+        <a:scrgbClr r="0" g="0" b="0"/>
+      </a:effectRef>
+      <a:fontRef idx="minor"/>
+    </dgm:style>
+  </dgm:styleLbl>
+  <dgm:styleLbl name="solidAlignAcc1">
+    <dgm:scene3d>
+      <a:camera prst="orthographicFront"/>
+      <a:lightRig rig="threePt" dir="t"/>
+    </dgm:scene3d>
+    <dgm:sp3d/>
+    <dgm:txPr/>
+    <dgm:style>
+      <a:lnRef idx="2">
+        <a:scrgbClr r="0" g="0" b="0"/>
+      </a:lnRef>
+      <a:fillRef idx="1">
+        <a:scrgbClr r="0" g="0" b="0"/>
+      </a:fillRef>
+      <a:effectRef idx="0">
+        <a:scrgbClr r="0" g="0" b="0"/>
+      </a:effectRef>
+      <a:fontRef idx="minor"/>
+    </dgm:style>
+  </dgm:styleLbl>
+  <dgm:styleLbl name="solidBgAcc1">
+    <dgm:scene3d>
+      <a:camera prst="orthographicFront"/>
+      <a:lightRig rig="threePt" dir="t"/>
+    </dgm:scene3d>
+    <dgm:sp3d/>
+    <dgm:txPr/>
+    <dgm:style>
+      <a:lnRef idx="2">
+        <a:scrgbClr r="0" g="0" b="0"/>
+      </a:lnRef>
+      <a:fillRef idx="1">
+        <a:scrgbClr r="0" g="0" b="0"/>
+      </a:fillRef>
+      <a:effectRef idx="0">
+        <a:scrgbClr r="0" g="0" b="0"/>
+      </a:effectRef>
+      <a:fontRef idx="minor"/>
+    </dgm:style>
+  </dgm:styleLbl>
+  <dgm:styleLbl name="fgAccFollowNode1">
+    <dgm:scene3d>
+      <a:camera prst="orthographicFront"/>
+      <a:lightRig rig="threePt" dir="t"/>
+    </dgm:scene3d>
+    <dgm:sp3d/>
+    <dgm:txPr/>
+    <dgm:style>
+      <a:lnRef idx="2">
+        <a:scrgbClr r="0" g="0" b="0"/>
+      </a:lnRef>
+      <a:fillRef idx="1">
+        <a:scrgbClr r="0" g="0" b="0"/>
+      </a:fillRef>
+      <a:effectRef idx="0">
+        <a:scrgbClr r="0" g="0" b="0"/>
+      </a:effectRef>
+      <a:fontRef idx="minor"/>
+    </dgm:style>
+  </dgm:styleLbl>
+  <dgm:styleLbl name="alignAccFollowNode1">
+    <dgm:scene3d>
+      <a:camera prst="orthographicFront"/>
+      <a:lightRig rig="threePt" dir="t"/>
+    </dgm:scene3d>
+    <dgm:sp3d/>
+    <dgm:txPr/>
+    <dgm:style>
+      <a:lnRef idx="2">
+        <a:scrgbClr r="0" g="0" b="0"/>
+      </a:lnRef>
+      <a:fillRef idx="1">
+        <a:scrgbClr r="0" g="0" b="0"/>
+      </a:fillRef>
+      <a:effectRef idx="0">
+        <a:scrgbClr r="0" g="0" b="0"/>
+      </a:effectRef>
+      <a:fontRef idx="minor"/>
+    </dgm:style>
+  </dgm:styleLbl>
+  <dgm:styleLbl name="bgAccFollowNode1">
+    <dgm:scene3d>
+      <a:camera prst="orthographicFront"/>
+      <a:lightRig rig="threePt" dir="t"/>
+    </dgm:scene3d>
+    <dgm:sp3d/>
+    <dgm:txPr/>
+    <dgm:style>
+      <a:lnRef idx="2">
+        <a:scrgbClr r="0" g="0" b="0"/>
+      </a:lnRef>
+      <a:fillRef idx="1">
+        <a:scrgbClr r="0" g="0" b="0"/>
+      </a:fillRef>
+      <a:effectRef idx="0">
+        <a:scrgbClr r="0" g="0" b="0"/>
+      </a:effectRef>
+      <a:fontRef idx="minor"/>
+    </dgm:style>
+  </dgm:styleLbl>
+  <dgm:styleLbl name="fgAcc0">
+    <dgm:scene3d>
+      <a:camera prst="orthographicFront"/>
+      <a:lightRig rig="threePt" dir="t"/>
+    </dgm:scene3d>
+    <dgm:sp3d/>
+    <dgm:txPr/>
+    <dgm:style>
+      <a:lnRef idx="2">
+        <a:scrgbClr r="0" g="0" b="0"/>
+      </a:lnRef>
+      <a:fillRef idx="1">
+        <a:scrgbClr r="0" g="0" b="0"/>
+      </a:fillRef>
+      <a:effectRef idx="0">
+        <a:scrgbClr r="0" g="0" b="0"/>
+      </a:effectRef>
+      <a:fontRef idx="minor"/>
+    </dgm:style>
+  </dgm:styleLbl>
+  <dgm:styleLbl name="fgAcc2">
+    <dgm:scene3d>
+      <a:camera prst="orthographicFront"/>
+      <a:lightRig rig="threePt" dir="t"/>
+    </dgm:scene3d>
+    <dgm:sp3d/>
+    <dgm:txPr/>
+    <dgm:style>
+      <a:lnRef idx="2">
+        <a:scrgbClr r="0" g="0" b="0"/>
+      </a:lnRef>
+      <a:fillRef idx="1">
+        <a:scrgbClr r="0" g="0" b="0"/>
+      </a:fillRef>
+      <a:effectRef idx="0">
+        <a:scrgbClr r="0" g="0" b="0"/>
+      </a:effectRef>
+      <a:fontRef idx="minor"/>
+    </dgm:style>
+  </dgm:styleLbl>
+  <dgm:styleLbl name="fgAcc3">
+    <dgm:scene3d>
+      <a:camera prst="orthographicFront"/>
+      <a:lightRig rig="threePt" dir="t"/>
+    </dgm:scene3d>
+    <dgm:sp3d/>
+    <dgm:txPr/>
+    <dgm:style>
+      <a:lnRef idx="2">
+        <a:scrgbClr r="0" g="0" b="0"/>
+      </a:lnRef>
+      <a:fillRef idx="1">
+        <a:scrgbClr r="0" g="0" b="0"/>
+      </a:fillRef>
+      <a:effectRef idx="0">
+        <a:scrgbClr r="0" g="0" b="0"/>
+      </a:effectRef>
+      <a:fontRef idx="minor"/>
+    </dgm:style>
+  </dgm:styleLbl>
+  <dgm:styleLbl name="fgAcc4">
+    <dgm:scene3d>
+      <a:camera prst="orthographicFront"/>
+      <a:lightRig rig="threePt" dir="t"/>
+    </dgm:scene3d>
+    <dgm:sp3d/>
+    <dgm:txPr/>
+    <dgm:style>
+      <a:lnRef idx="2">
+        <a:scrgbClr r="0" g="0" b="0"/>
+      </a:lnRef>
+      <a:fillRef idx="1">
+        <a:scrgbClr r="0" g="0" b="0"/>
+      </a:fillRef>
+      <a:effectRef idx="0">
+        <a:scrgbClr r="0" g="0" b="0"/>
+      </a:effectRef>
+      <a:fontRef idx="minor"/>
+    </dgm:style>
+  </dgm:styleLbl>
+  <dgm:styleLbl name="bgShp">
+    <dgm:scene3d>
+      <a:camera prst="orthographicFront"/>
+      <a:lightRig rig="threePt" dir="t"/>
+    </dgm:scene3d>
+    <dgm:sp3d/>
+    <dgm:txPr/>
+    <dgm:style>
+      <a:lnRef idx="0">
+        <a:scrgbClr r="0" g="0" b="0"/>
+      </a:lnRef>
+      <a:fillRef idx="1">
+        <a:scrgbClr r="0" g="0" b="0"/>
+      </a:fillRef>
+      <a:effectRef idx="0">
+        <a:scrgbClr r="0" g="0" b="0"/>
+      </a:effectRef>
+      <a:fontRef idx="minor"/>
+    </dgm:style>
+  </dgm:styleLbl>
+  <dgm:styleLbl name="dkBgShp">
+    <dgm:scene3d>
+      <a:camera prst="orthographicFront"/>
+      <a:lightRig rig="threePt" dir="t"/>
+    </dgm:scene3d>
+    <dgm:sp3d/>
+    <dgm:txPr/>
+    <dgm:style>
+      <a:lnRef idx="0">
+        <a:scrgbClr r="0" g="0" b="0"/>
+      </a:lnRef>
+      <a:fillRef idx="1">
+        <a:scrgbClr r="0" g="0" b="0"/>
+      </a:fillRef>
+      <a:effectRef idx="0">
+        <a:scrgbClr r="0" g="0" b="0"/>
+      </a:effectRef>
+      <a:fontRef idx="minor"/>
+    </dgm:style>
+  </dgm:styleLbl>
+  <dgm:styleLbl name="trBgShp">
+    <dgm:scene3d>
+      <a:camera prst="orthographicFront"/>
+      <a:lightRig rig="threePt" dir="t"/>
+    </dgm:scene3d>
+    <dgm:sp3d/>
+    <dgm:txPr/>
+    <dgm:style>
+      <a:lnRef idx="0">
+        <a:scrgbClr r="0" g="0" b="0"/>
+      </a:lnRef>
+      <a:fillRef idx="1">
+        <a:scrgbClr r="0" g="0" b="0"/>
+      </a:fillRef>
+      <a:effectRef idx="0">
+        <a:scrgbClr r="0" g="0" b="0"/>
+      </a:effectRef>
+      <a:fontRef idx="minor"/>
+    </dgm:style>
+  </dgm:styleLbl>
+  <dgm:styleLbl name="fgShp">
+    <dgm:scene3d>
+      <a:camera prst="orthographicFront"/>
+      <a:lightRig rig="threePt" dir="t"/>
+    </dgm:scene3d>
+    <dgm:sp3d/>
+    <dgm:txPr/>
+    <dgm:style>
+      <a:lnRef idx="2">
+        <a:scrgbClr r="0" g="0" b="0"/>
+      </a:lnRef>
+      <a:fillRef idx="1">
+        <a:scrgbClr r="0" g="0" b="0"/>
+      </a:fillRef>
+      <a:effectRef idx="0">
+        <a:scrgbClr r="0" g="0" b="0"/>
+      </a:effectRef>
+      <a:fontRef idx="minor"/>
+    </dgm:style>
+  </dgm:styleLbl>
+  <dgm:styleLbl name="revTx">
+    <dgm:scene3d>
+      <a:camera prst="orthographicFront"/>
+      <a:lightRig rig="threePt" dir="t"/>
+    </dgm:scene3d>
+    <dgm:sp3d/>
+    <dgm:txPr/>
+    <dgm:style>
+      <a:lnRef idx="0">
+        <a:scrgbClr r="0" g="0" b="0"/>
+      </a:lnRef>
+      <a:fillRef idx="0">
+        <a:scrgbClr r="0" g="0" b="0"/>
+      </a:fillRef>
+      <a:effectRef idx="0">
+        <a:scrgbClr r="0" g="0" b="0"/>
+      </a:effectRef>
+      <a:fontRef idx="minor"/>
+    </dgm:style>
+  </dgm:styleLbl>
+</dgm:styleDef>
 </file>
 
 <file path=ppt/slideLayouts/slideLayout1.xml><?xml version="1.0" encoding="utf-8"?>
@@ -296,7 +3226,7 @@
           <a:p>
             <a:fld id="{4AAD347D-5ACD-4C99-B74B-A9C85AD731AF}" type="datetimeFigureOut">
               <a:rPr lang="en-US" dirty="0"/>
-              <a:t>4/4/2017</a:t>
+              <a:t>4/5/2017</a:t>
             </a:fld>
             <a:endParaRPr lang="en-US" dirty="0"/>
           </a:p>
@@ -566,7 +3496,7 @@
           <a:p>
             <a:fld id="{4509A250-FF31-4206-8172-F9D3106AACB1}" type="datetimeFigureOut">
               <a:rPr lang="en-US" dirty="0"/>
-              <a:t>4/4/2017</a:t>
+              <a:t>4/5/2017</a:t>
             </a:fld>
             <a:endParaRPr lang="en-US" dirty="0"/>
           </a:p>
@@ -755,7 +3685,7 @@
           <a:p>
             <a:fld id="{4509A250-FF31-4206-8172-F9D3106AACB1}" type="datetimeFigureOut">
               <a:rPr lang="en-US" dirty="0"/>
-              <a:t>4/4/2017</a:t>
+              <a:t>4/5/2017</a:t>
             </a:fld>
             <a:endParaRPr lang="en-US" dirty="0"/>
           </a:p>
@@ -1023,7 +3953,7 @@
           <a:p>
             <a:fld id="{4509A250-FF31-4206-8172-F9D3106AACB1}" type="datetimeFigureOut">
               <a:rPr lang="en-US" dirty="0"/>
-              <a:t>4/4/2017</a:t>
+              <a:t>4/5/2017</a:t>
             </a:fld>
             <a:endParaRPr lang="en-US" dirty="0"/>
           </a:p>
@@ -1359,7 +4289,7 @@
           <a:p>
             <a:fld id="{4509A250-FF31-4206-8172-F9D3106AACB1}" type="datetimeFigureOut">
               <a:rPr lang="en-US" dirty="0"/>
-              <a:t>4/4/2017</a:t>
+              <a:t>4/5/2017</a:t>
             </a:fld>
             <a:endParaRPr lang="en-US" dirty="0"/>
           </a:p>
@@ -1977,7 +4907,7 @@
           <a:p>
             <a:fld id="{4509A250-FF31-4206-8172-F9D3106AACB1}" type="datetimeFigureOut">
               <a:rPr lang="en-US" dirty="0"/>
-              <a:t>4/4/2017</a:t>
+              <a:t>4/5/2017</a:t>
             </a:fld>
             <a:endParaRPr lang="en-US" dirty="0"/>
           </a:p>
@@ -2832,7 +5762,7 @@
           <a:p>
             <a:fld id="{4509A250-FF31-4206-8172-F9D3106AACB1}" type="datetimeFigureOut">
               <a:rPr lang="en-US" dirty="0"/>
-              <a:t>4/4/2017</a:t>
+              <a:t>4/5/2017</a:t>
             </a:fld>
             <a:endParaRPr lang="en-US" dirty="0"/>
           </a:p>
@@ -2997,7 +5927,7 @@
           <a:p>
             <a:fld id="{4509A250-FF31-4206-8172-F9D3106AACB1}" type="datetimeFigureOut">
               <a:rPr lang="en-US" dirty="0"/>
-              <a:t>4/4/2017</a:t>
+              <a:t>4/5/2017</a:t>
             </a:fld>
             <a:endParaRPr lang="en-US" dirty="0"/>
           </a:p>
@@ -3172,7 +6102,7 @@
           <a:p>
             <a:fld id="{4509A250-FF31-4206-8172-F9D3106AACB1}" type="datetimeFigureOut">
               <a:rPr lang="en-US" dirty="0"/>
-              <a:t>4/4/2017</a:t>
+              <a:t>4/5/2017</a:t>
             </a:fld>
             <a:endParaRPr lang="en-US" dirty="0"/>
           </a:p>
@@ -3337,7 +6267,7 @@
           <a:p>
             <a:fld id="{4509A250-FF31-4206-8172-F9D3106AACB1}" type="datetimeFigureOut">
               <a:rPr lang="en-US" dirty="0"/>
-              <a:t>4/4/2017</a:t>
+              <a:t>4/5/2017</a:t>
             </a:fld>
             <a:endParaRPr lang="en-US" dirty="0"/>
           </a:p>
@@ -3579,7 +6509,7 @@
           <a:p>
             <a:fld id="{9796027F-7875-4030-9381-8BD8C4F21935}" type="datetimeFigureOut">
               <a:rPr lang="en-US" dirty="0"/>
-              <a:t>4/4/2017</a:t>
+              <a:t>4/5/2017</a:t>
             </a:fld>
             <a:endParaRPr lang="en-US" dirty="0"/>
           </a:p>
@@ -3866,7 +6796,7 @@
           <a:p>
             <a:fld id="{9796027F-7875-4030-9381-8BD8C4F21935}" type="datetimeFigureOut">
               <a:rPr lang="en-US" dirty="0"/>
-              <a:t>4/4/2017</a:t>
+              <a:t>4/5/2017</a:t>
             </a:fld>
             <a:endParaRPr lang="en-US" dirty="0"/>
           </a:p>
@@ -4305,7 +7235,7 @@
           <a:p>
             <a:fld id="{9796027F-7875-4030-9381-8BD8C4F21935}" type="datetimeFigureOut">
               <a:rPr lang="en-US" dirty="0"/>
-              <a:t>4/4/2017</a:t>
+              <a:t>4/5/2017</a:t>
             </a:fld>
             <a:endParaRPr lang="en-US" dirty="0"/>
           </a:p>
@@ -4418,7 +7348,7 @@
           <a:p>
             <a:fld id="{4509A250-FF31-4206-8172-F9D3106AACB1}" type="datetimeFigureOut">
               <a:rPr lang="en-US" dirty="0"/>
-              <a:t>4/4/2017</a:t>
+              <a:t>4/5/2017</a:t>
             </a:fld>
             <a:endParaRPr lang="en-US" dirty="0"/>
           </a:p>
@@ -4508,7 +7438,7 @@
           <a:p>
             <a:fld id="{4509A250-FF31-4206-8172-F9D3106AACB1}" type="datetimeFigureOut">
               <a:rPr lang="en-US" dirty="0"/>
-              <a:t>4/4/2017</a:t>
+              <a:t>4/5/2017</a:t>
             </a:fld>
             <a:endParaRPr lang="en-US" dirty="0"/>
           </a:p>
@@ -4782,7 +7712,7 @@
           <a:p>
             <a:fld id="{4509A250-FF31-4206-8172-F9D3106AACB1}" type="datetimeFigureOut">
               <a:rPr lang="en-US" dirty="0"/>
-              <a:t>4/4/2017</a:t>
+              <a:t>4/5/2017</a:t>
             </a:fld>
             <a:endParaRPr lang="en-US" dirty="0"/>
           </a:p>
@@ -5052,7 +7982,7 @@
           <a:p>
             <a:fld id="{4509A250-FF31-4206-8172-F9D3106AACB1}" type="datetimeFigureOut">
               <a:rPr lang="en-US" dirty="0"/>
-              <a:t>4/4/2017</a:t>
+              <a:t>4/5/2017</a:t>
             </a:fld>
             <a:endParaRPr lang="en-US" dirty="0"/>
           </a:p>
@@ -5476,7 +8406,7 @@
           <a:p>
             <a:fld id="{4AAD347D-5ACD-4C99-B74B-A9C85AD731AF}" type="datetimeFigureOut">
               <a:rPr lang="en-US" dirty="0"/>
-              <a:t>4/4/2017</a:t>
+              <a:t>4/5/2017</a:t>
             </a:fld>
             <a:endParaRPr lang="en-US" dirty="0"/>
           </a:p>
@@ -6114,7 +9044,7 @@
         </p:nvSpPr>
         <p:spPr>
           <a:xfrm>
-            <a:off x="947352" y="1624551"/>
+            <a:off x="963827" y="1539799"/>
             <a:ext cx="9168714" cy="4195481"/>
           </a:xfrm>
         </p:spPr>
@@ -6125,7 +9055,7 @@
             <a:pPr algn="just"/>
             <a:r>
               <a:rPr lang="en-US" dirty="0"/>
-              <a:t>Initial excel sheet is converted to csv file by removing rows with class values ‘2’, ‘IR’, ‘Irrelevant’, ‘!!!!’ and columns Date and Time where removed.</a:t>
+              <a:t>Initial excel sheet is converted to csv file by removing rows with class values ‘2’, ‘IR’, ‘Irrelevant’, ‘!!!!’. Also Date and Time columns where removed.</a:t>
             </a:r>
           </a:p>
           <a:p>
@@ -6146,14 +9076,7 @@
             <a:pPr algn="just"/>
             <a:r>
               <a:rPr lang="en-US" dirty="0"/>
-              <a:t>Removed hyperlinks and html tags.</a:t>
-            </a:r>
-          </a:p>
-          <a:p>
-            <a:pPr algn="just"/>
-            <a:r>
-              <a:rPr lang="en-US" dirty="0"/>
-              <a:t>Stripped the text which removes extra spaces at the beginning and end of the text.</a:t>
+              <a:t>Removed hyperlinks and html tags and stripped the text which removes extra spaces at the beginning and end of the text.</a:t>
             </a:r>
           </a:p>
           <a:p>
@@ -6170,6 +9093,127 @@
           <a:p>
             <a:pPr algn="just"/>
             <a:endParaRPr lang="en-US" dirty="0"/>
+          </a:p>
+        </p:txBody>
+      </p:sp>
+      <p:graphicFrame>
+        <p:nvGraphicFramePr>
+          <p:cNvPr id="4" name="Diagram 3"/>
+          <p:cNvGraphicFramePr/>
+          <p:nvPr>
+            <p:extLst>
+              <p:ext uri="{D42A27DB-BD31-4B8C-83A1-F6EECF244321}">
+                <p14:modId xmlns:p14="http://schemas.microsoft.com/office/powerpoint/2010/main" val="901823187"/>
+              </p:ext>
+            </p:extLst>
+          </p:nvPr>
+        </p:nvGraphicFramePr>
+        <p:xfrm>
+          <a:off x="2353275" y="4035739"/>
+          <a:ext cx="6864866" cy="3568585"/>
+        </p:xfrm>
+        <a:graphic>
+          <a:graphicData uri="http://schemas.openxmlformats.org/drawingml/2006/diagram">
+            <dgm:relIds xmlns:dgm="http://schemas.openxmlformats.org/drawingml/2006/diagram" xmlns:r="http://schemas.openxmlformats.org/officeDocument/2006/relationships" r:dm="rId2" r:lo="rId3" r:qs="rId4" r:cs="rId5"/>
+          </a:graphicData>
+        </a:graphic>
+      </p:graphicFrame>
+      <p:sp>
+        <p:nvSpPr>
+          <p:cNvPr id="5" name="TextBox 4"/>
+          <p:cNvSpPr txBox="1"/>
+          <p:nvPr/>
+        </p:nvSpPr>
+        <p:spPr>
+          <a:xfrm>
+            <a:off x="2759676" y="5820031"/>
+            <a:ext cx="1342767" cy="523220"/>
+          </a:xfrm>
+          <a:prstGeom prst="rect">
+            <a:avLst/>
+          </a:prstGeom>
+          <a:noFill/>
+        </p:spPr>
+        <p:txBody>
+          <a:bodyPr wrap="square" rtlCol="0">
+            <a:spAutoFit/>
+          </a:bodyPr>
+          <a:lstStyle/>
+          <a:p>
+            <a:r>
+              <a:rPr lang="en-US" sz="1400" dirty="0">
+                <a:solidFill>
+                  <a:schemeClr val="bg1"/>
+                </a:solidFill>
+              </a:rPr>
+              <a:t>Initial Dataset</a:t>
+            </a:r>
+          </a:p>
+        </p:txBody>
+      </p:sp>
+      <p:sp>
+        <p:nvSpPr>
+          <p:cNvPr id="6" name="TextBox 5"/>
+          <p:cNvSpPr txBox="1"/>
+          <p:nvPr/>
+        </p:nvSpPr>
+        <p:spPr>
+          <a:xfrm>
+            <a:off x="5246475" y="5773864"/>
+            <a:ext cx="1342767" cy="523220"/>
+          </a:xfrm>
+          <a:prstGeom prst="rect">
+            <a:avLst/>
+          </a:prstGeom>
+          <a:noFill/>
+        </p:spPr>
+        <p:txBody>
+          <a:bodyPr wrap="square" rtlCol="0">
+            <a:spAutoFit/>
+          </a:bodyPr>
+          <a:lstStyle/>
+          <a:p>
+            <a:r>
+              <a:rPr lang="en-US" sz="1400" dirty="0">
+                <a:solidFill>
+                  <a:schemeClr val="bg1"/>
+                </a:solidFill>
+              </a:rPr>
+              <a:t>After initial cleanup</a:t>
+            </a:r>
+          </a:p>
+        </p:txBody>
+      </p:sp>
+      <p:sp>
+        <p:nvSpPr>
+          <p:cNvPr id="7" name="TextBox 6"/>
+          <p:cNvSpPr txBox="1"/>
+          <p:nvPr/>
+        </p:nvSpPr>
+        <p:spPr>
+          <a:xfrm>
+            <a:off x="7733274" y="5773864"/>
+            <a:ext cx="1418964" cy="523220"/>
+          </a:xfrm>
+          <a:prstGeom prst="rect">
+            <a:avLst/>
+          </a:prstGeom>
+          <a:noFill/>
+        </p:spPr>
+        <p:txBody>
+          <a:bodyPr wrap="square" rtlCol="0">
+            <a:spAutoFit/>
+          </a:bodyPr>
+          <a:lstStyle/>
+          <a:p>
+            <a:r>
+              <a:rPr lang="en-US" sz="1400" dirty="0">
+                <a:solidFill>
+                  <a:schemeClr val="bg1"/>
+                </a:solidFill>
+              </a:rPr>
+              <a:t>After preprocessing</a:t>
+            </a:r>
           </a:p>
         </p:txBody>
       </p:sp>
@@ -6259,7 +9303,7 @@
           <a:p>
             <a:r>
               <a:rPr lang="en-US" dirty="0"/>
-              <a:t>Multinomial NB</a:t>
+              <a:t>Multinomial Naïve Bayes</a:t>
             </a:r>
           </a:p>
           <a:p>

</xml_diff>

<commit_message>
Changes ppt and excel
</commit_message>
<xml_diff>
--- a/docs/Presentation.pptx
+++ b/docs/Presentation.pptx
@@ -6388,7 +6388,7 @@
           <p:nvPr>
             <p:extLst>
               <p:ext uri="{D42A27DB-BD31-4B8C-83A1-F6EECF244321}">
-                <p14:modId xmlns:p14="http://schemas.microsoft.com/office/powerpoint/2010/main" val="2010094969"/>
+                <p14:modId xmlns:p14="http://schemas.microsoft.com/office/powerpoint/2010/main" val="1880624859"/>
               </p:ext>
             </p:extLst>
           </p:nvPr>
@@ -6878,18 +6878,15 @@
                     <a:p>
                       <a:pPr algn="ctr" fontAlgn="ctr"/>
                       <a:r>
-                        <a:rPr lang="en-US" sz="1100" u="none" strike="noStrike">
+                        <a:rPr lang="en-US" sz="1100" b="0" i="0" u="none" strike="noStrike" dirty="0">
+                          <a:solidFill>
+                            <a:schemeClr val="tx1"/>
+                          </a:solidFill>
                           <a:effectLst/>
+                          <a:latin typeface="Calibri" panose="020F0502020204030204" pitchFamily="34" charset="0"/>
                         </a:rPr>
-                        <a:t>57.2</a:t>
+                        <a:t>0.57</a:t>
                       </a:r>
-                      <a:endParaRPr lang="en-US" sz="1100" b="0" i="0" u="none" strike="noStrike">
-                        <a:solidFill>
-                          <a:srgbClr val="000000"/>
-                        </a:solidFill>
-                        <a:effectLst/>
-                        <a:latin typeface="Calibri" panose="020F0502020204030204" pitchFamily="34" charset="0"/>
-                      </a:endParaRPr>
                     </a:p>
                   </a:txBody>
                   <a:tcPr marL="9525" marR="9525" marT="9525" marB="0" anchor="ctr">
@@ -6907,18 +6904,15 @@
                     <a:p>
                       <a:pPr algn="ctr" fontAlgn="ctr"/>
                       <a:r>
-                        <a:rPr lang="en-US" sz="1100" u="none" strike="noStrike">
+                        <a:rPr lang="en-US" sz="1100" b="0" i="0" u="none" strike="noStrike" dirty="0">
+                          <a:solidFill>
+                            <a:schemeClr val="tx1"/>
+                          </a:solidFill>
                           <a:effectLst/>
+                          <a:latin typeface="Calibri" panose="020F0502020204030204" pitchFamily="34" charset="0"/>
                         </a:rPr>
-                        <a:t>68.2</a:t>
+                        <a:t>0.68</a:t>
                       </a:r>
-                      <a:endParaRPr lang="en-US" sz="1100" b="0" i="0" u="none" strike="noStrike">
-                        <a:solidFill>
-                          <a:srgbClr val="000000"/>
-                        </a:solidFill>
-                        <a:effectLst/>
-                        <a:latin typeface="Calibri" panose="020F0502020204030204" pitchFamily="34" charset="0"/>
-                      </a:endParaRPr>
                     </a:p>
                   </a:txBody>
                   <a:tcPr marL="9525" marR="9525" marT="9525" marB="0" anchor="ctr">
@@ -6936,18 +6930,15 @@
                     <a:p>
                       <a:pPr algn="ctr" fontAlgn="ctr"/>
                       <a:r>
-                        <a:rPr lang="en-US" sz="1100" u="none" strike="noStrike">
+                        <a:rPr lang="en-US" sz="1100" b="0" i="0" u="none" strike="noStrike" dirty="0">
+                          <a:solidFill>
+                            <a:schemeClr val="tx1"/>
+                          </a:solidFill>
                           <a:effectLst/>
+                          <a:latin typeface="Calibri" panose="020F0502020204030204" pitchFamily="34" charset="0"/>
                         </a:rPr>
-                        <a:t>60.9</a:t>
+                        <a:t>0.61</a:t>
                       </a:r>
-                      <a:endParaRPr lang="en-US" sz="1100" b="0" i="0" u="none" strike="noStrike">
-                        <a:solidFill>
-                          <a:srgbClr val="000000"/>
-                        </a:solidFill>
-                        <a:effectLst/>
-                        <a:latin typeface="Calibri" panose="020F0502020204030204" pitchFamily="34" charset="0"/>
-                      </a:endParaRPr>
                     </a:p>
                   </a:txBody>
                   <a:tcPr marL="9525" marR="9525" marT="9525" marB="0" anchor="ctr">
@@ -6965,18 +6956,15 @@
                     <a:p>
                       <a:pPr algn="ctr" fontAlgn="ctr"/>
                       <a:r>
-                        <a:rPr lang="en-US" sz="1100" u="none" strike="noStrike">
+                        <a:rPr lang="en-US" sz="1100" b="0" i="0" u="none" strike="noStrike" dirty="0">
+                          <a:solidFill>
+                            <a:schemeClr val="tx1"/>
+                          </a:solidFill>
                           <a:effectLst/>
+                          <a:latin typeface="Calibri" panose="020F0502020204030204" pitchFamily="34" charset="0"/>
                         </a:rPr>
-                        <a:t>63.9</a:t>
+                        <a:t>0.64</a:t>
                       </a:r>
-                      <a:endParaRPr lang="en-US" sz="1100" b="0" i="0" u="none" strike="noStrike">
-                        <a:solidFill>
-                          <a:srgbClr val="000000"/>
-                        </a:solidFill>
-                        <a:effectLst/>
-                        <a:latin typeface="Calibri" panose="020F0502020204030204" pitchFamily="34" charset="0"/>
-                      </a:endParaRPr>
                     </a:p>
                   </a:txBody>
                   <a:tcPr marL="9525" marR="9525" marT="9525" marB="0" anchor="ctr">
@@ -6994,18 +6982,15 @@
                     <a:p>
                       <a:pPr algn="ctr" fontAlgn="ctr"/>
                       <a:r>
-                        <a:rPr lang="en-US" sz="1100" u="none" strike="noStrike" dirty="0">
+                        <a:rPr lang="en-US" sz="1100" b="0" i="0" u="none" strike="noStrike" dirty="0">
+                          <a:solidFill>
+                            <a:schemeClr val="tx1"/>
+                          </a:solidFill>
                           <a:effectLst/>
+                          <a:latin typeface="Calibri" panose="020F0502020204030204" pitchFamily="34" charset="0"/>
                         </a:rPr>
-                        <a:t>57.9</a:t>
+                        <a:t>0.58</a:t>
                       </a:r>
-                      <a:endParaRPr lang="en-US" sz="1100" b="0" i="0" u="none" strike="noStrike" dirty="0">
-                        <a:solidFill>
-                          <a:srgbClr val="000000"/>
-                        </a:solidFill>
-                        <a:effectLst/>
-                        <a:latin typeface="Calibri" panose="020F0502020204030204" pitchFamily="34" charset="0"/>
-                      </a:endParaRPr>
                     </a:p>
                   </a:txBody>
                   <a:tcPr marL="9525" marR="9525" marT="9525" marB="0" anchor="ctr">
@@ -7023,18 +7008,15 @@
                     <a:p>
                       <a:pPr algn="ctr" fontAlgn="ctr"/>
                       <a:r>
-                        <a:rPr lang="en-US" sz="1100" u="none" strike="noStrike">
+                        <a:rPr lang="en-US" sz="1100" b="0" i="0" u="none" strike="noStrike" dirty="0">
+                          <a:solidFill>
+                            <a:schemeClr val="tx1"/>
+                          </a:solidFill>
                           <a:effectLst/>
+                          <a:latin typeface="Calibri" panose="020F0502020204030204" pitchFamily="34" charset="0"/>
                         </a:rPr>
-                        <a:t>60.5</a:t>
+                        <a:t>0.61</a:t>
                       </a:r>
-                      <a:endParaRPr lang="en-US" sz="1100" b="0" i="0" u="none" strike="noStrike">
-                        <a:solidFill>
-                          <a:srgbClr val="000000"/>
-                        </a:solidFill>
-                        <a:effectLst/>
-                        <a:latin typeface="Calibri" panose="020F0502020204030204" pitchFamily="34" charset="0"/>
-                      </a:endParaRPr>
                     </a:p>
                   </a:txBody>
                   <a:tcPr marL="9525" marR="9525" marT="9525" marB="0" anchor="ctr">
@@ -7113,18 +7095,15 @@
                     <a:p>
                       <a:pPr algn="ctr" fontAlgn="ctr"/>
                       <a:r>
-                        <a:rPr lang="en-US" sz="1100" u="none" strike="noStrike">
+                        <a:rPr lang="en-US" sz="1100" b="0" i="0" u="none" strike="noStrike" dirty="0">
+                          <a:solidFill>
+                            <a:schemeClr val="tx1"/>
+                          </a:solidFill>
                           <a:effectLst/>
+                          <a:latin typeface="Calibri" panose="020F0502020204030204" pitchFamily="34" charset="0"/>
                         </a:rPr>
-                        <a:t>52.8</a:t>
+                        <a:t>0.53</a:t>
                       </a:r>
-                      <a:endParaRPr lang="en-US" sz="1100" b="0" i="0" u="none" strike="noStrike">
-                        <a:solidFill>
-                          <a:srgbClr val="000000"/>
-                        </a:solidFill>
-                        <a:effectLst/>
-                        <a:latin typeface="Calibri" panose="020F0502020204030204" pitchFamily="34" charset="0"/>
-                      </a:endParaRPr>
                     </a:p>
                   </a:txBody>
                   <a:tcPr marL="9525" marR="9525" marT="9525" marB="0" anchor="ctr">
@@ -7142,18 +7121,15 @@
                     <a:p>
                       <a:pPr algn="ctr" fontAlgn="ctr"/>
                       <a:r>
-                        <a:rPr lang="en-US" sz="1100" u="none" strike="noStrike" dirty="0">
+                        <a:rPr lang="en-US" sz="1100" b="0" i="0" u="none" strike="noStrike" dirty="0">
+                          <a:solidFill>
+                            <a:schemeClr val="tx1"/>
+                          </a:solidFill>
                           <a:effectLst/>
+                          <a:latin typeface="Calibri" panose="020F0502020204030204" pitchFamily="34" charset="0"/>
                         </a:rPr>
-                        <a:t>79.4</a:t>
+                        <a:t>0.79</a:t>
                       </a:r>
-                      <a:endParaRPr lang="en-US" sz="1100" b="0" i="0" u="none" strike="noStrike" dirty="0">
-                        <a:solidFill>
-                          <a:srgbClr val="000000"/>
-                        </a:solidFill>
-                        <a:effectLst/>
-                        <a:latin typeface="Calibri" panose="020F0502020204030204" pitchFamily="34" charset="0"/>
-                      </a:endParaRPr>
                     </a:p>
                   </a:txBody>
                   <a:tcPr marL="9525" marR="9525" marT="9525" marB="0" anchor="ctr">
@@ -7171,18 +7147,15 @@
                     <a:p>
                       <a:pPr algn="ctr" fontAlgn="ctr"/>
                       <a:r>
-                        <a:rPr lang="en-US" sz="1100" u="none" strike="noStrike">
+                        <a:rPr lang="en-US" sz="1100" b="0" i="0" u="none" strike="noStrike" dirty="0">
+                          <a:solidFill>
+                            <a:schemeClr val="tx1"/>
+                          </a:solidFill>
                           <a:effectLst/>
+                          <a:latin typeface="Calibri" panose="020F0502020204030204" pitchFamily="34" charset="0"/>
                         </a:rPr>
-                        <a:t>61.8</a:t>
+                        <a:t>0.62</a:t>
                       </a:r>
-                      <a:endParaRPr lang="en-US" sz="1100" b="0" i="0" u="none" strike="noStrike">
-                        <a:solidFill>
-                          <a:srgbClr val="000000"/>
-                        </a:solidFill>
-                        <a:effectLst/>
-                        <a:latin typeface="Calibri" panose="020F0502020204030204" pitchFamily="34" charset="0"/>
-                      </a:endParaRPr>
                     </a:p>
                   </a:txBody>
                   <a:tcPr marL="9525" marR="9525" marT="9525" marB="0" anchor="ctr">
@@ -7200,18 +7173,15 @@
                     <a:p>
                       <a:pPr algn="ctr" fontAlgn="ctr"/>
                       <a:r>
-                        <a:rPr lang="en-US" sz="1100" u="none" strike="noStrike" dirty="0">
+                        <a:rPr lang="en-US" sz="1100" b="0" i="0" u="none" strike="noStrike" dirty="0">
+                          <a:solidFill>
+                            <a:schemeClr val="tx1"/>
+                          </a:solidFill>
                           <a:effectLst/>
+                          <a:latin typeface="Calibri" panose="020F0502020204030204" pitchFamily="34" charset="0"/>
                         </a:rPr>
-                        <a:t>67.1</a:t>
+                        <a:t>0.67</a:t>
                       </a:r>
-                      <a:endParaRPr lang="en-US" sz="1100" b="0" i="0" u="none" strike="noStrike" dirty="0">
-                        <a:solidFill>
-                          <a:srgbClr val="000000"/>
-                        </a:solidFill>
-                        <a:effectLst/>
-                        <a:latin typeface="Calibri" panose="020F0502020204030204" pitchFamily="34" charset="0"/>
-                      </a:endParaRPr>
                     </a:p>
                   </a:txBody>
                   <a:tcPr marL="9525" marR="9525" marT="9525" marB="0" anchor="ctr">
@@ -7229,18 +7199,15 @@
                     <a:p>
                       <a:pPr algn="ctr" fontAlgn="ctr"/>
                       <a:r>
-                        <a:rPr lang="en-US" sz="1100" u="none" strike="noStrike" dirty="0">
+                        <a:rPr lang="en-US" sz="1100" b="0" i="0" u="none" strike="noStrike" dirty="0">
+                          <a:solidFill>
+                            <a:schemeClr val="tx1"/>
+                          </a:solidFill>
                           <a:effectLst/>
+                          <a:latin typeface="Calibri" panose="020F0502020204030204" pitchFamily="34" charset="0"/>
                         </a:rPr>
-                        <a:t>54.1</a:t>
+                        <a:t>0.54</a:t>
                       </a:r>
-                      <a:endParaRPr lang="en-US" sz="1100" b="0" i="0" u="none" strike="noStrike" dirty="0">
-                        <a:solidFill>
-                          <a:srgbClr val="000000"/>
-                        </a:solidFill>
-                        <a:effectLst/>
-                        <a:latin typeface="Calibri" panose="020F0502020204030204" pitchFamily="34" charset="0"/>
-                      </a:endParaRPr>
                     </a:p>
                   </a:txBody>
                   <a:tcPr marL="9525" marR="9525" marT="9525" marB="0" anchor="ctr">
@@ -7258,18 +7225,15 @@
                     <a:p>
                       <a:pPr algn="ctr" fontAlgn="ctr"/>
                       <a:r>
-                        <a:rPr lang="en-US" sz="1100" u="none" strike="noStrike">
+                        <a:rPr lang="en-US" sz="1100" b="0" i="0" u="none" strike="noStrike" dirty="0">
+                          <a:solidFill>
+                            <a:schemeClr val="tx1"/>
+                          </a:solidFill>
                           <a:effectLst/>
+                          <a:latin typeface="Calibri" panose="020F0502020204030204" pitchFamily="34" charset="0"/>
                         </a:rPr>
-                        <a:t>58.8</a:t>
+                        <a:t>0.59</a:t>
                       </a:r>
-                      <a:endParaRPr lang="en-US" sz="1100" b="0" i="0" u="none" strike="noStrike">
-                        <a:solidFill>
-                          <a:srgbClr val="000000"/>
-                        </a:solidFill>
-                        <a:effectLst/>
-                        <a:latin typeface="Calibri" panose="020F0502020204030204" pitchFamily="34" charset="0"/>
-                      </a:endParaRPr>
                     </a:p>
                   </a:txBody>
                   <a:tcPr marL="9525" marR="9525" marT="9525" marB="0" anchor="ctr">
@@ -7348,21 +7312,18 @@
                     <a:p>
                       <a:pPr algn="ctr" fontAlgn="ctr"/>
                       <a:r>
-                        <a:rPr lang="en-US" sz="1100" u="none" strike="noStrike">
+                        <a:rPr lang="en-US" sz="1100" b="0" i="0" u="none" strike="noStrike" dirty="0">
+                          <a:solidFill>
+                            <a:schemeClr val="tx1"/>
+                          </a:solidFill>
                           <a:effectLst/>
+                          <a:latin typeface="Calibri" panose="020F0502020204030204" pitchFamily="34" charset="0"/>
                         </a:rPr>
-                        <a:t>65.5</a:t>
+                        <a:t>0.66</a:t>
                       </a:r>
-                      <a:endParaRPr lang="en-US" sz="1100" b="0" i="0" u="none" strike="noStrike">
-                        <a:solidFill>
-                          <a:srgbClr val="000000"/>
-                        </a:solidFill>
-                        <a:effectLst/>
-                        <a:latin typeface="Calibri" panose="020F0502020204030204" pitchFamily="34" charset="0"/>
-                      </a:endParaRPr>
-                    </a:p>
-                  </a:txBody>
-                  <a:tcPr marL="9525" marR="9525" marT="19050" marB="19050" anchor="ctr">
+                    </a:p>
+                  </a:txBody>
+                  <a:tcPr marL="9525" marR="9525" marT="9525" marB="0" anchor="ctr">
                     <a:solidFill>
                       <a:schemeClr val="bg2">
                         <a:lumMod val="75000"/>
@@ -7377,21 +7338,18 @@
                     <a:p>
                       <a:pPr algn="ctr" fontAlgn="ctr"/>
                       <a:r>
-                        <a:rPr lang="en-US" sz="1100" u="none" strike="noStrike" dirty="0">
+                        <a:rPr lang="en-US" sz="1100" b="0" i="0" u="none" strike="noStrike" dirty="0">
+                          <a:solidFill>
+                            <a:schemeClr val="tx1"/>
+                          </a:solidFill>
                           <a:effectLst/>
+                          <a:latin typeface="Calibri" panose="020F0502020204030204" pitchFamily="34" charset="0"/>
                         </a:rPr>
-                        <a:t>28.8</a:t>
+                        <a:t>0.29</a:t>
                       </a:r>
-                      <a:endParaRPr lang="en-US" sz="1100" b="0" i="0" u="none" strike="noStrike" dirty="0">
-                        <a:solidFill>
-                          <a:srgbClr val="000000"/>
-                        </a:solidFill>
-                        <a:effectLst/>
-                        <a:latin typeface="Calibri" panose="020F0502020204030204" pitchFamily="34" charset="0"/>
-                      </a:endParaRPr>
-                    </a:p>
-                  </a:txBody>
-                  <a:tcPr marL="9525" marR="9525" marT="19050" marB="19050" anchor="ctr">
+                    </a:p>
+                  </a:txBody>
+                  <a:tcPr marL="9525" marR="9525" marT="9525" marB="0" anchor="ctr">
                     <a:solidFill>
                       <a:schemeClr val="bg2">
                         <a:lumMod val="75000"/>
@@ -7406,21 +7364,18 @@
                     <a:p>
                       <a:pPr algn="ctr" fontAlgn="ctr"/>
                       <a:r>
-                        <a:rPr lang="en-US" sz="1100" u="none" strike="noStrike">
+                        <a:rPr lang="en-US" sz="1100" b="0" i="0" u="none" strike="noStrike" dirty="0">
+                          <a:solidFill>
+                            <a:schemeClr val="tx1"/>
+                          </a:solidFill>
                           <a:effectLst/>
+                          <a:latin typeface="Calibri" panose="020F0502020204030204" pitchFamily="34" charset="0"/>
                         </a:rPr>
-                        <a:t>36.6</a:t>
+                        <a:t>0.37</a:t>
                       </a:r>
-                      <a:endParaRPr lang="en-US" sz="1100" b="0" i="0" u="none" strike="noStrike">
-                        <a:solidFill>
-                          <a:srgbClr val="000000"/>
-                        </a:solidFill>
-                        <a:effectLst/>
-                        <a:latin typeface="Calibri" panose="020F0502020204030204" pitchFamily="34" charset="0"/>
-                      </a:endParaRPr>
-                    </a:p>
-                  </a:txBody>
-                  <a:tcPr marL="9525" marR="9525" marT="19050" marB="19050" anchor="ctr">
+                    </a:p>
+                  </a:txBody>
+                  <a:tcPr marL="9525" marR="9525" marT="9525" marB="0" anchor="ctr">
                     <a:solidFill>
                       <a:schemeClr val="bg2">
                         <a:lumMod val="75000"/>
@@ -7435,21 +7390,18 @@
                     <a:p>
                       <a:pPr algn="ctr" fontAlgn="ctr"/>
                       <a:r>
-                        <a:rPr lang="en-US" sz="1100" u="none" strike="noStrike">
+                        <a:rPr lang="en-US" sz="1100" b="0" i="0" u="none" strike="noStrike" dirty="0">
+                          <a:solidFill>
+                            <a:schemeClr val="tx1"/>
+                          </a:solidFill>
                           <a:effectLst/>
+                          <a:latin typeface="Calibri" panose="020F0502020204030204" pitchFamily="34" charset="0"/>
                         </a:rPr>
-                        <a:t>58.6</a:t>
+                        <a:t>0.59</a:t>
                       </a:r>
-                      <a:endParaRPr lang="en-US" sz="1100" b="0" i="0" u="none" strike="noStrike">
-                        <a:solidFill>
-                          <a:srgbClr val="000000"/>
-                        </a:solidFill>
-                        <a:effectLst/>
-                        <a:latin typeface="Calibri" panose="020F0502020204030204" pitchFamily="34" charset="0"/>
-                      </a:endParaRPr>
-                    </a:p>
-                  </a:txBody>
-                  <a:tcPr marL="9525" marR="9525" marT="19050" marB="19050" anchor="ctr">
+                    </a:p>
+                  </a:txBody>
+                  <a:tcPr marL="9525" marR="9525" marT="9525" marB="0" anchor="ctr">
                     <a:solidFill>
                       <a:schemeClr val="accent3">
                         <a:lumMod val="50000"/>
@@ -7464,21 +7416,18 @@
                     <a:p>
                       <a:pPr algn="ctr" fontAlgn="ctr"/>
                       <a:r>
-                        <a:rPr lang="en-US" sz="1100" u="none" strike="noStrike" dirty="0">
+                        <a:rPr lang="en-US" sz="1100" b="0" i="0" u="none" strike="noStrike" dirty="0">
+                          <a:solidFill>
+                            <a:schemeClr val="tx1"/>
+                          </a:solidFill>
                           <a:effectLst/>
+                          <a:latin typeface="Calibri" panose="020F0502020204030204" pitchFamily="34" charset="0"/>
                         </a:rPr>
-                        <a:t>50</a:t>
+                        <a:t>0.50</a:t>
                       </a:r>
-                      <a:endParaRPr lang="en-US" sz="1100" b="0" i="0" u="none" strike="noStrike" dirty="0">
-                        <a:solidFill>
-                          <a:srgbClr val="000000"/>
-                        </a:solidFill>
-                        <a:effectLst/>
-                        <a:latin typeface="Calibri" panose="020F0502020204030204" pitchFamily="34" charset="0"/>
-                      </a:endParaRPr>
-                    </a:p>
-                  </a:txBody>
-                  <a:tcPr marL="9525" marR="9525" marT="19050" marB="19050" anchor="ctr">
+                    </a:p>
+                  </a:txBody>
+                  <a:tcPr marL="9525" marR="9525" marT="9525" marB="0" anchor="ctr">
                     <a:solidFill>
                       <a:schemeClr val="accent3">
                         <a:lumMod val="50000"/>
@@ -7493,21 +7442,18 @@
                     <a:p>
                       <a:pPr algn="ctr" fontAlgn="ctr"/>
                       <a:r>
-                        <a:rPr lang="en-US" sz="1100" u="none" strike="noStrike" dirty="0">
+                        <a:rPr lang="en-US" sz="1100" b="0" i="0" u="none" strike="noStrike" dirty="0">
+                          <a:solidFill>
+                            <a:schemeClr val="tx1"/>
+                          </a:solidFill>
                           <a:effectLst/>
+                          <a:latin typeface="Calibri" panose="020F0502020204030204" pitchFamily="34" charset="0"/>
                         </a:rPr>
-                        <a:t>52.3</a:t>
+                        <a:t>0.52</a:t>
                       </a:r>
-                      <a:endParaRPr lang="en-US" sz="1100" b="0" i="0" u="none" strike="noStrike" dirty="0">
-                        <a:solidFill>
-                          <a:srgbClr val="000000"/>
-                        </a:solidFill>
-                        <a:effectLst/>
-                        <a:latin typeface="Calibri" panose="020F0502020204030204" pitchFamily="34" charset="0"/>
-                      </a:endParaRPr>
-                    </a:p>
-                  </a:txBody>
-                  <a:tcPr marL="9525" marR="9525" marT="19050" marB="19050" anchor="ctr">
+                    </a:p>
+                  </a:txBody>
+                  <a:tcPr marL="9525" marR="9525" marT="9525" marB="0" anchor="ctr">
                     <a:solidFill>
                       <a:schemeClr val="accent3">
                         <a:lumMod val="50000"/>
@@ -7583,18 +7529,15 @@
                     <a:p>
                       <a:pPr algn="ctr" fontAlgn="ctr"/>
                       <a:r>
-                        <a:rPr lang="en-US" sz="1100" u="none" strike="noStrike">
+                        <a:rPr lang="en-US" sz="1100" b="0" i="0" u="none" strike="noStrike" dirty="0">
+                          <a:solidFill>
+                            <a:schemeClr val="tx1"/>
+                          </a:solidFill>
                           <a:effectLst/>
+                          <a:latin typeface="Calibri" panose="020F0502020204030204" pitchFamily="34" charset="0"/>
                         </a:rPr>
-                        <a:t>49.3</a:t>
+                        <a:t>0.49</a:t>
                       </a:r>
-                      <a:endParaRPr lang="en-US" sz="1100" b="0" i="0" u="none" strike="noStrike">
-                        <a:solidFill>
-                          <a:srgbClr val="000000"/>
-                        </a:solidFill>
-                        <a:effectLst/>
-                        <a:latin typeface="Calibri" panose="020F0502020204030204" pitchFamily="34" charset="0"/>
-                      </a:endParaRPr>
                     </a:p>
                   </a:txBody>
                   <a:tcPr marL="9525" marR="9525" marT="9525" marB="0" anchor="ctr">
@@ -7612,18 +7555,15 @@
                     <a:p>
                       <a:pPr algn="ctr" fontAlgn="ctr"/>
                       <a:r>
-                        <a:rPr lang="en-US" sz="1100" u="none" strike="noStrike" dirty="0">
+                        <a:rPr lang="en-US" sz="1100" b="0" i="0" u="none" strike="noStrike" dirty="0">
+                          <a:solidFill>
+                            <a:schemeClr val="tx1"/>
+                          </a:solidFill>
                           <a:effectLst/>
+                          <a:latin typeface="Calibri" panose="020F0502020204030204" pitchFamily="34" charset="0"/>
                         </a:rPr>
-                        <a:t>44.5</a:t>
+                        <a:t>0.45</a:t>
                       </a:r>
-                      <a:endParaRPr lang="en-US" sz="1100" b="0" i="0" u="none" strike="noStrike" dirty="0">
-                        <a:solidFill>
-                          <a:srgbClr val="000000"/>
-                        </a:solidFill>
-                        <a:effectLst/>
-                        <a:latin typeface="Calibri" panose="020F0502020204030204" pitchFamily="34" charset="0"/>
-                      </a:endParaRPr>
                     </a:p>
                   </a:txBody>
                   <a:tcPr marL="9525" marR="9525" marT="9525" marB="0" anchor="ctr">
@@ -7641,18 +7581,15 @@
                     <a:p>
                       <a:pPr algn="ctr" fontAlgn="ctr"/>
                       <a:r>
-                        <a:rPr lang="en-US" sz="1100" u="none" strike="noStrike" dirty="0">
+                        <a:rPr lang="en-US" sz="1100" b="0" i="0" u="none" strike="noStrike" dirty="0">
+                          <a:solidFill>
+                            <a:schemeClr val="tx1"/>
+                          </a:solidFill>
                           <a:effectLst/>
+                          <a:latin typeface="Calibri" panose="020F0502020204030204" pitchFamily="34" charset="0"/>
                         </a:rPr>
-                        <a:t>45.5</a:t>
+                        <a:t>0.46</a:t>
                       </a:r>
-                      <a:endParaRPr lang="en-US" sz="1100" b="0" i="0" u="none" strike="noStrike" dirty="0">
-                        <a:solidFill>
-                          <a:srgbClr val="000000"/>
-                        </a:solidFill>
-                        <a:effectLst/>
-                        <a:latin typeface="Calibri" panose="020F0502020204030204" pitchFamily="34" charset="0"/>
-                      </a:endParaRPr>
                     </a:p>
                   </a:txBody>
                   <a:tcPr marL="9525" marR="9525" marT="9525" marB="0" anchor="ctr">
@@ -7670,18 +7607,15 @@
                     <a:p>
                       <a:pPr algn="ctr" fontAlgn="ctr"/>
                       <a:r>
-                        <a:rPr lang="en-US" sz="1100" u="none" strike="noStrike">
+                        <a:rPr lang="en-US" sz="1100" b="0" i="0" u="none" strike="noStrike" dirty="0">
+                          <a:solidFill>
+                            <a:schemeClr val="tx1"/>
+                          </a:solidFill>
                           <a:effectLst/>
+                          <a:latin typeface="Calibri" panose="020F0502020204030204" pitchFamily="34" charset="0"/>
                         </a:rPr>
-                        <a:t>45.1</a:t>
+                        <a:t>0.45</a:t>
                       </a:r>
-                      <a:endParaRPr lang="en-US" sz="1100" b="0" i="0" u="none" strike="noStrike">
-                        <a:solidFill>
-                          <a:srgbClr val="000000"/>
-                        </a:solidFill>
-                        <a:effectLst/>
-                        <a:latin typeface="Calibri" panose="020F0502020204030204" pitchFamily="34" charset="0"/>
-                      </a:endParaRPr>
                     </a:p>
                   </a:txBody>
                   <a:tcPr marL="9525" marR="9525" marT="9525" marB="0" anchor="ctr">
@@ -7699,18 +7633,15 @@
                     <a:p>
                       <a:pPr algn="ctr" fontAlgn="ctr"/>
                       <a:r>
-                        <a:rPr lang="en-US" sz="1100" u="none" strike="noStrike" dirty="0">
+                        <a:rPr lang="en-US" sz="1100" b="0" i="0" u="none" strike="noStrike" dirty="0">
+                          <a:solidFill>
+                            <a:schemeClr val="tx1"/>
+                          </a:solidFill>
                           <a:effectLst/>
+                          <a:latin typeface="Calibri" panose="020F0502020204030204" pitchFamily="34" charset="0"/>
                         </a:rPr>
-                        <a:t>48.5</a:t>
+                        <a:t>0.49</a:t>
                       </a:r>
-                      <a:endParaRPr lang="en-US" sz="1100" b="0" i="0" u="none" strike="noStrike" dirty="0">
-                        <a:solidFill>
-                          <a:srgbClr val="000000"/>
-                        </a:solidFill>
-                        <a:effectLst/>
-                        <a:latin typeface="Calibri" panose="020F0502020204030204" pitchFamily="34" charset="0"/>
-                      </a:endParaRPr>
                     </a:p>
                   </a:txBody>
                   <a:tcPr marL="9525" marR="9525" marT="9525" marB="0" anchor="ctr">
@@ -7728,18 +7659,15 @@
                     <a:p>
                       <a:pPr algn="ctr" fontAlgn="ctr"/>
                       <a:r>
-                        <a:rPr lang="en-US" sz="1100" u="none" strike="noStrike" dirty="0">
+                        <a:rPr lang="en-US" sz="1100" b="0" i="0" u="none" strike="noStrike" dirty="0">
+                          <a:solidFill>
+                            <a:schemeClr val="tx1"/>
+                          </a:solidFill>
                           <a:effectLst/>
+                          <a:latin typeface="Calibri" panose="020F0502020204030204" pitchFamily="34" charset="0"/>
                         </a:rPr>
-                        <a:t>46.5</a:t>
+                        <a:t>0.47</a:t>
                       </a:r>
-                      <a:endParaRPr lang="en-US" sz="1100" b="0" i="0" u="none" strike="noStrike" dirty="0">
-                        <a:solidFill>
-                          <a:srgbClr val="000000"/>
-                        </a:solidFill>
-                        <a:effectLst/>
-                        <a:latin typeface="Calibri" panose="020F0502020204030204" pitchFamily="34" charset="0"/>
-                      </a:endParaRPr>
                     </a:p>
                   </a:txBody>
                   <a:tcPr marL="9525" marR="9525" marT="9525" marB="0" anchor="ctr">
@@ -7796,7 +7724,7 @@
           <p:nvPr>
             <p:extLst>
               <p:ext uri="{D42A27DB-BD31-4B8C-83A1-F6EECF244321}">
-                <p14:modId xmlns:p14="http://schemas.microsoft.com/office/powerpoint/2010/main" val="1248249606"/>
+                <p14:modId xmlns:p14="http://schemas.microsoft.com/office/powerpoint/2010/main" val="2723394180"/>
               </p:ext>
             </p:extLst>
           </p:nvPr>
@@ -8286,18 +8214,15 @@
                     <a:p>
                       <a:pPr algn="ctr" fontAlgn="ctr"/>
                       <a:r>
-                        <a:rPr lang="en-US" sz="1100" u="none" strike="noStrike">
+                        <a:rPr lang="en-US" sz="1100" b="0" i="0" u="none" strike="noStrike" dirty="0">
+                          <a:solidFill>
+                            <a:schemeClr val="tx1"/>
+                          </a:solidFill>
                           <a:effectLst/>
+                          <a:latin typeface="Calibri" panose="020F0502020204030204" pitchFamily="34" charset="0"/>
                         </a:rPr>
-                        <a:t>59</a:t>
+                        <a:t>0.59</a:t>
                       </a:r>
-                      <a:endParaRPr lang="en-US" sz="1100" b="0" i="0" u="none" strike="noStrike">
-                        <a:solidFill>
-                          <a:srgbClr val="000000"/>
-                        </a:solidFill>
-                        <a:effectLst/>
-                        <a:latin typeface="Calibri" panose="020F0502020204030204" pitchFamily="34" charset="0"/>
-                      </a:endParaRPr>
                     </a:p>
                   </a:txBody>
                   <a:tcPr marL="9525" marR="9525" marT="9525" marB="0" anchor="ctr">
@@ -8315,18 +8240,15 @@
                     <a:p>
                       <a:pPr algn="ctr" fontAlgn="ctr"/>
                       <a:r>
-                        <a:rPr lang="en-US" sz="1100" u="none" strike="noStrike" dirty="0">
+                        <a:rPr lang="en-US" sz="1100" b="0" i="0" u="none" strike="noStrike" dirty="0">
+                          <a:solidFill>
+                            <a:schemeClr val="tx1"/>
+                          </a:solidFill>
                           <a:effectLst/>
+                          <a:latin typeface="Calibri" panose="020F0502020204030204" pitchFamily="34" charset="0"/>
                         </a:rPr>
-                        <a:t>88.3</a:t>
+                        <a:t>0.88</a:t>
                       </a:r>
-                      <a:endParaRPr lang="en-US" sz="1100" b="0" i="0" u="none" strike="noStrike" dirty="0">
-                        <a:solidFill>
-                          <a:srgbClr val="000000"/>
-                        </a:solidFill>
-                        <a:effectLst/>
-                        <a:latin typeface="Calibri" panose="020F0502020204030204" pitchFamily="34" charset="0"/>
-                      </a:endParaRPr>
                     </a:p>
                   </a:txBody>
                   <a:tcPr marL="9525" marR="9525" marT="9525" marB="0" anchor="ctr">
@@ -8344,18 +8266,15 @@
                     <a:p>
                       <a:pPr algn="ctr" fontAlgn="ctr"/>
                       <a:r>
-                        <a:rPr lang="en-US" sz="1100" u="none" strike="noStrike" dirty="0">
+                        <a:rPr lang="en-US" sz="1100" b="0" i="0" u="none" strike="noStrike" dirty="0">
+                          <a:solidFill>
+                            <a:schemeClr val="tx1"/>
+                          </a:solidFill>
                           <a:effectLst/>
+                          <a:latin typeface="Calibri" panose="020F0502020204030204" pitchFamily="34" charset="0"/>
                         </a:rPr>
-                        <a:t>69.4</a:t>
+                        <a:t>0.69</a:t>
                       </a:r>
-                      <a:endParaRPr lang="en-US" sz="1100" b="0" i="0" u="none" strike="noStrike" dirty="0">
-                        <a:solidFill>
-                          <a:srgbClr val="000000"/>
-                        </a:solidFill>
-                        <a:effectLst/>
-                        <a:latin typeface="Calibri" panose="020F0502020204030204" pitchFamily="34" charset="0"/>
-                      </a:endParaRPr>
                     </a:p>
                   </a:txBody>
                   <a:tcPr marL="9525" marR="9525" marT="9525" marB="0" anchor="ctr">
@@ -8373,18 +8292,15 @@
                     <a:p>
                       <a:pPr algn="ctr" fontAlgn="ctr"/>
                       <a:r>
-                        <a:rPr lang="en-US" sz="1100" u="none" strike="noStrike">
+                        <a:rPr lang="en-US" sz="1100" b="0" i="0" u="none" strike="noStrike" dirty="0">
+                          <a:solidFill>
+                            <a:schemeClr val="tx1"/>
+                          </a:solidFill>
                           <a:effectLst/>
+                          <a:latin typeface="Calibri" panose="020F0502020204030204" pitchFamily="34" charset="0"/>
                         </a:rPr>
-                        <a:t>63.9</a:t>
+                        <a:t>0.64</a:t>
                       </a:r>
-                      <a:endParaRPr lang="en-US" sz="1100" b="0" i="0" u="none" strike="noStrike">
-                        <a:solidFill>
-                          <a:srgbClr val="000000"/>
-                        </a:solidFill>
-                        <a:effectLst/>
-                        <a:latin typeface="Calibri" panose="020F0502020204030204" pitchFamily="34" charset="0"/>
-                      </a:endParaRPr>
                     </a:p>
                   </a:txBody>
                   <a:tcPr marL="9525" marR="9525" marT="9525" marB="0" anchor="ctr">
@@ -8402,18 +8318,15 @@
                     <a:p>
                       <a:pPr algn="ctr" fontAlgn="ctr"/>
                       <a:r>
-                        <a:rPr lang="en-US" sz="1100" u="none" strike="noStrike" dirty="0">
+                        <a:rPr lang="en-US" sz="1100" b="0" i="0" u="none" strike="noStrike" dirty="0">
+                          <a:solidFill>
+                            <a:schemeClr val="tx1"/>
+                          </a:solidFill>
                           <a:effectLst/>
+                          <a:latin typeface="Calibri" panose="020F0502020204030204" pitchFamily="34" charset="0"/>
                         </a:rPr>
-                        <a:t>28.3</a:t>
+                        <a:t>0.28</a:t>
                       </a:r>
-                      <a:endParaRPr lang="en-US" sz="1100" b="0" i="0" u="none" strike="noStrike" dirty="0">
-                        <a:solidFill>
-                          <a:srgbClr val="000000"/>
-                        </a:solidFill>
-                        <a:effectLst/>
-                        <a:latin typeface="Calibri" panose="020F0502020204030204" pitchFamily="34" charset="0"/>
-                      </a:endParaRPr>
                     </a:p>
                   </a:txBody>
                   <a:tcPr marL="9525" marR="9525" marT="9525" marB="0" anchor="ctr">
@@ -8431,18 +8344,15 @@
                     <a:p>
                       <a:pPr algn="ctr" fontAlgn="ctr"/>
                       <a:r>
-                        <a:rPr lang="en-US" sz="1100" u="none" strike="noStrike">
+                        <a:rPr lang="en-US" sz="1100" b="0" i="0" u="none" strike="noStrike" dirty="0">
+                          <a:solidFill>
+                            <a:schemeClr val="tx1"/>
+                          </a:solidFill>
                           <a:effectLst/>
+                          <a:latin typeface="Calibri" panose="020F0502020204030204" pitchFamily="34" charset="0"/>
                         </a:rPr>
-                        <a:t>38.5</a:t>
+                        <a:t>0.39</a:t>
                       </a:r>
-                      <a:endParaRPr lang="en-US" sz="1100" b="0" i="0" u="none" strike="noStrike">
-                        <a:solidFill>
-                          <a:srgbClr val="000000"/>
-                        </a:solidFill>
-                        <a:effectLst/>
-                        <a:latin typeface="Calibri" panose="020F0502020204030204" pitchFamily="34" charset="0"/>
-                      </a:endParaRPr>
                     </a:p>
                   </a:txBody>
                   <a:tcPr marL="9525" marR="9525" marT="9525" marB="0" anchor="ctr">
@@ -8521,18 +8431,15 @@
                     <a:p>
                       <a:pPr algn="ctr" fontAlgn="ctr"/>
                       <a:r>
-                        <a:rPr lang="en-US" sz="1100" u="none" strike="noStrike">
+                        <a:rPr lang="en-US" sz="1100" b="0" i="0" u="none" strike="noStrike" dirty="0">
+                          <a:solidFill>
+                            <a:schemeClr val="tx1"/>
+                          </a:solidFill>
                           <a:effectLst/>
+                          <a:latin typeface="Calibri" panose="020F0502020204030204" pitchFamily="34" charset="0"/>
                         </a:rPr>
-                        <a:t>53.7</a:t>
+                        <a:t>0.54</a:t>
                       </a:r>
-                      <a:endParaRPr lang="en-US" sz="1100" b="0" i="0" u="none" strike="noStrike">
-                        <a:solidFill>
-                          <a:srgbClr val="000000"/>
-                        </a:solidFill>
-                        <a:effectLst/>
-                        <a:latin typeface="Calibri" panose="020F0502020204030204" pitchFamily="34" charset="0"/>
-                      </a:endParaRPr>
                     </a:p>
                   </a:txBody>
                   <a:tcPr marL="9525" marR="9525" marT="9525" marB="0" anchor="ctr">
@@ -8550,18 +8457,15 @@
                     <a:p>
                       <a:pPr algn="ctr" fontAlgn="ctr"/>
                       <a:r>
-                        <a:rPr lang="en-US" sz="1100" u="none" strike="noStrike">
+                        <a:rPr lang="en-US" sz="1100" b="0" i="0" u="none" strike="noStrike" dirty="0">
+                          <a:solidFill>
+                            <a:schemeClr val="tx1"/>
+                          </a:solidFill>
                           <a:effectLst/>
+                          <a:latin typeface="Calibri" panose="020F0502020204030204" pitchFamily="34" charset="0"/>
                         </a:rPr>
-                        <a:t>98.5</a:t>
+                        <a:t>0.99</a:t>
                       </a:r>
-                      <a:endParaRPr lang="en-US" sz="1100" b="0" i="0" u="none" strike="noStrike">
-                        <a:solidFill>
-                          <a:srgbClr val="000000"/>
-                        </a:solidFill>
-                        <a:effectLst/>
-                        <a:latin typeface="Calibri" panose="020F0502020204030204" pitchFamily="34" charset="0"/>
-                      </a:endParaRPr>
                     </a:p>
                   </a:txBody>
                   <a:tcPr marL="9525" marR="9525" marT="9525" marB="0" anchor="ctr">
@@ -8579,18 +8483,15 @@
                     <a:p>
                       <a:pPr algn="ctr" fontAlgn="ctr"/>
                       <a:r>
-                        <a:rPr lang="en-US" sz="1100" u="none" strike="noStrike" dirty="0">
+                        <a:rPr lang="en-US" sz="1100" b="0" i="0" u="none" strike="noStrike" dirty="0">
+                          <a:solidFill>
+                            <a:schemeClr val="tx1"/>
+                          </a:solidFill>
                           <a:effectLst/>
+                          <a:latin typeface="Calibri" panose="020F0502020204030204" pitchFamily="34" charset="0"/>
                         </a:rPr>
-                        <a:t>68.1</a:t>
+                        <a:t>0.68</a:t>
                       </a:r>
-                      <a:endParaRPr lang="en-US" sz="1100" b="0" i="0" u="none" strike="noStrike" dirty="0">
-                        <a:solidFill>
-                          <a:srgbClr val="000000"/>
-                        </a:solidFill>
-                        <a:effectLst/>
-                        <a:latin typeface="Calibri" panose="020F0502020204030204" pitchFamily="34" charset="0"/>
-                      </a:endParaRPr>
                     </a:p>
                   </a:txBody>
                   <a:tcPr marL="9525" marR="9525" marT="9525" marB="0" anchor="ctr">
@@ -8608,18 +8509,15 @@
                     <a:p>
                       <a:pPr algn="ctr" fontAlgn="ctr"/>
                       <a:r>
-                        <a:rPr lang="en-US" sz="1100" u="none" strike="noStrike">
+                        <a:rPr lang="en-US" sz="1100" b="0" i="0" u="none" strike="noStrike" dirty="0">
+                          <a:solidFill>
+                            <a:schemeClr val="tx1"/>
+                          </a:solidFill>
                           <a:effectLst/>
+                          <a:latin typeface="Calibri" panose="020F0502020204030204" pitchFamily="34" charset="0"/>
                         </a:rPr>
-                        <a:t>75.6</a:t>
+                        <a:t>0.76</a:t>
                       </a:r>
-                      <a:endParaRPr lang="en-US" sz="1100" b="0" i="0" u="none" strike="noStrike">
-                        <a:solidFill>
-                          <a:srgbClr val="000000"/>
-                        </a:solidFill>
-                        <a:effectLst/>
-                        <a:latin typeface="Calibri" panose="020F0502020204030204" pitchFamily="34" charset="0"/>
-                      </a:endParaRPr>
                     </a:p>
                   </a:txBody>
                   <a:tcPr marL="9525" marR="9525" marT="9525" marB="0" anchor="ctr">
@@ -8637,18 +8535,15 @@
                     <a:p>
                       <a:pPr algn="ctr" fontAlgn="ctr"/>
                       <a:r>
-                        <a:rPr lang="en-US" sz="1100" u="none" strike="noStrike" dirty="0">
+                        <a:rPr lang="en-US" sz="1100" b="0" i="0" u="none" strike="noStrike" dirty="0">
+                          <a:solidFill>
+                            <a:schemeClr val="tx1"/>
+                          </a:solidFill>
                           <a:effectLst/>
+                          <a:latin typeface="Calibri" panose="020F0502020204030204" pitchFamily="34" charset="0"/>
                         </a:rPr>
-                        <a:t>9.2</a:t>
+                        <a:t>0.9</a:t>
                       </a:r>
-                      <a:endParaRPr lang="en-US" sz="1100" b="0" i="0" u="none" strike="noStrike" dirty="0">
-                        <a:solidFill>
-                          <a:srgbClr val="000000"/>
-                        </a:solidFill>
-                        <a:effectLst/>
-                        <a:latin typeface="Calibri" panose="020F0502020204030204" pitchFamily="34" charset="0"/>
-                      </a:endParaRPr>
                     </a:p>
                   </a:txBody>
                   <a:tcPr marL="9525" marR="9525" marT="9525" marB="0" anchor="ctr">
@@ -8666,18 +8561,15 @@
                     <a:p>
                       <a:pPr algn="ctr" fontAlgn="ctr"/>
                       <a:r>
-                        <a:rPr lang="en-US" sz="1100" u="none" strike="noStrike">
+                        <a:rPr lang="en-US" sz="1100" b="0" i="0" u="none" strike="noStrike" dirty="0">
+                          <a:solidFill>
+                            <a:schemeClr val="tx1"/>
+                          </a:solidFill>
                           <a:effectLst/>
+                          <a:latin typeface="Calibri" panose="020F0502020204030204" pitchFamily="34" charset="0"/>
                         </a:rPr>
-                        <a:t>15.8</a:t>
+                        <a:t>0.16</a:t>
                       </a:r>
-                      <a:endParaRPr lang="en-US" sz="1100" b="0" i="0" u="none" strike="noStrike">
-                        <a:solidFill>
-                          <a:srgbClr val="000000"/>
-                        </a:solidFill>
-                        <a:effectLst/>
-                        <a:latin typeface="Calibri" panose="020F0502020204030204" pitchFamily="34" charset="0"/>
-                      </a:endParaRPr>
                     </a:p>
                   </a:txBody>
                   <a:tcPr marL="9525" marR="9525" marT="9525" marB="0" anchor="ctr">
@@ -8756,21 +8648,18 @@
                     <a:p>
                       <a:pPr algn="ctr" fontAlgn="ctr"/>
                       <a:r>
-                        <a:rPr lang="en-US" sz="1100" u="none" strike="noStrike">
+                        <a:rPr lang="en-US" sz="1100" b="0" i="0" u="none" strike="noStrike" dirty="0">
+                          <a:solidFill>
+                            <a:schemeClr val="tx1"/>
+                          </a:solidFill>
                           <a:effectLst/>
+                          <a:latin typeface="Calibri" panose="020F0502020204030204" pitchFamily="34" charset="0"/>
                         </a:rPr>
-                        <a:t>53.1</a:t>
+                        <a:t>0.53</a:t>
                       </a:r>
-                      <a:endParaRPr lang="en-US" sz="1100" b="0" i="0" u="none" strike="noStrike">
-                        <a:solidFill>
-                          <a:srgbClr val="000000"/>
-                        </a:solidFill>
-                        <a:effectLst/>
-                        <a:latin typeface="Calibri" panose="020F0502020204030204" pitchFamily="34" charset="0"/>
-                      </a:endParaRPr>
-                    </a:p>
-                  </a:txBody>
-                  <a:tcPr marL="9525" marR="9525" marT="19050" marB="19050" anchor="ctr">
+                    </a:p>
+                  </a:txBody>
+                  <a:tcPr marL="9525" marR="9525" marT="9525" marB="0" anchor="ctr">
                     <a:solidFill>
                       <a:schemeClr val="bg2">
                         <a:lumMod val="75000"/>
@@ -8785,21 +8674,18 @@
                     <a:p>
                       <a:pPr algn="ctr" fontAlgn="ctr"/>
                       <a:r>
-                        <a:rPr lang="en-US" sz="1100" u="none" strike="noStrike">
+                        <a:rPr lang="en-US" sz="1100" b="0" i="0" u="none" strike="noStrike" dirty="0">
+                          <a:solidFill>
+                            <a:schemeClr val="tx1"/>
+                          </a:solidFill>
                           <a:effectLst/>
+                          <a:latin typeface="Calibri" panose="020F0502020204030204" pitchFamily="34" charset="0"/>
                         </a:rPr>
-                        <a:t>95.4</a:t>
+                        <a:t>0.95</a:t>
                       </a:r>
-                      <a:endParaRPr lang="en-US" sz="1100" b="0" i="0" u="none" strike="noStrike">
-                        <a:solidFill>
-                          <a:srgbClr val="000000"/>
-                        </a:solidFill>
-                        <a:effectLst/>
-                        <a:latin typeface="Calibri" panose="020F0502020204030204" pitchFamily="34" charset="0"/>
-                      </a:endParaRPr>
-                    </a:p>
-                  </a:txBody>
-                  <a:tcPr marL="9525" marR="9525" marT="19050" marB="19050" anchor="ctr">
+                    </a:p>
+                  </a:txBody>
+                  <a:tcPr marL="9525" marR="9525" marT="9525" marB="0" anchor="ctr">
                     <a:solidFill>
                       <a:schemeClr val="bg2">
                         <a:lumMod val="75000"/>
@@ -8814,21 +8700,18 @@
                     <a:p>
                       <a:pPr algn="ctr" fontAlgn="ctr"/>
                       <a:r>
-                        <a:rPr lang="en-US" sz="1100" u="none" strike="noStrike" dirty="0">
+                        <a:rPr lang="en-US" sz="1100" b="0" i="0" u="none" strike="noStrike" dirty="0">
+                          <a:solidFill>
+                            <a:schemeClr val="tx1"/>
+                          </a:solidFill>
                           <a:effectLst/>
+                          <a:latin typeface="Calibri" panose="020F0502020204030204" pitchFamily="34" charset="0"/>
                         </a:rPr>
-                        <a:t>67.1</a:t>
+                        <a:t>0.67</a:t>
                       </a:r>
-                      <a:endParaRPr lang="en-US" sz="1100" b="0" i="0" u="none" strike="noStrike" dirty="0">
-                        <a:solidFill>
-                          <a:srgbClr val="000000"/>
-                        </a:solidFill>
-                        <a:effectLst/>
-                        <a:latin typeface="Calibri" panose="020F0502020204030204" pitchFamily="34" charset="0"/>
-                      </a:endParaRPr>
-                    </a:p>
-                  </a:txBody>
-                  <a:tcPr marL="9525" marR="9525" marT="19050" marB="19050" anchor="ctr">
+                    </a:p>
+                  </a:txBody>
+                  <a:tcPr marL="9525" marR="9525" marT="9525" marB="0" anchor="ctr">
                     <a:solidFill>
                       <a:schemeClr val="bg2">
                         <a:lumMod val="75000"/>
@@ -8843,21 +8726,18 @@
                     <a:p>
                       <a:pPr algn="ctr" fontAlgn="ctr"/>
                       <a:r>
-                        <a:rPr lang="en-US" sz="1100" u="none" strike="noStrike">
+                        <a:rPr lang="en-US" sz="1100" b="0" i="0" u="none" strike="noStrike" dirty="0">
+                          <a:solidFill>
+                            <a:schemeClr val="tx1"/>
+                          </a:solidFill>
                           <a:effectLst/>
+                          <a:latin typeface="Calibri" panose="020F0502020204030204" pitchFamily="34" charset="0"/>
                         </a:rPr>
-                        <a:t>71.2</a:t>
+                        <a:t>0.71</a:t>
                       </a:r>
-                      <a:endParaRPr lang="en-US" sz="1100" b="0" i="0" u="none" strike="noStrike">
-                        <a:solidFill>
-                          <a:srgbClr val="000000"/>
-                        </a:solidFill>
-                        <a:effectLst/>
-                        <a:latin typeface="Calibri" panose="020F0502020204030204" pitchFamily="34" charset="0"/>
-                      </a:endParaRPr>
-                    </a:p>
-                  </a:txBody>
-                  <a:tcPr marL="9525" marR="9525" marT="19050" marB="19050" anchor="ctr">
+                    </a:p>
+                  </a:txBody>
+                  <a:tcPr marL="9525" marR="9525" marT="9525" marB="0" anchor="ctr">
                     <a:solidFill>
                       <a:schemeClr val="accent3">
                         <a:lumMod val="50000"/>
@@ -8872,21 +8752,18 @@
                     <a:p>
                       <a:pPr algn="ctr" fontAlgn="ctr"/>
                       <a:r>
-                        <a:rPr lang="en-US" sz="1100" u="none" strike="noStrike" dirty="0">
+                        <a:rPr lang="en-US" sz="1100" b="0" i="0" u="none" strike="noStrike" dirty="0">
+                          <a:solidFill>
+                            <a:schemeClr val="tx1"/>
+                          </a:solidFill>
                           <a:effectLst/>
+                          <a:latin typeface="Calibri" panose="020F0502020204030204" pitchFamily="34" charset="0"/>
                         </a:rPr>
-                        <a:t>5.2</a:t>
+                        <a:t>0.5</a:t>
                       </a:r>
-                      <a:endParaRPr lang="en-US" sz="1100" b="0" i="0" u="none" strike="noStrike" dirty="0">
-                        <a:solidFill>
-                          <a:srgbClr val="000000"/>
-                        </a:solidFill>
-                        <a:effectLst/>
-                        <a:latin typeface="Calibri" panose="020F0502020204030204" pitchFamily="34" charset="0"/>
-                      </a:endParaRPr>
-                    </a:p>
-                  </a:txBody>
-                  <a:tcPr marL="9525" marR="9525" marT="19050" marB="19050" anchor="ctr">
+                    </a:p>
+                  </a:txBody>
+                  <a:tcPr marL="9525" marR="9525" marT="9525" marB="0" anchor="ctr">
                     <a:solidFill>
                       <a:schemeClr val="accent3">
                         <a:lumMod val="50000"/>
@@ -8901,21 +8778,18 @@
                     <a:p>
                       <a:pPr algn="ctr" fontAlgn="ctr"/>
                       <a:r>
-                        <a:rPr lang="en-US" sz="1100" u="none" strike="noStrike">
+                        <a:rPr lang="en-US" sz="1100" b="0" i="0" u="none" strike="noStrike" dirty="0">
+                          <a:solidFill>
+                            <a:schemeClr val="tx1"/>
+                          </a:solidFill>
                           <a:effectLst/>
+                          <a:latin typeface="Calibri" panose="020F0502020204030204" pitchFamily="34" charset="0"/>
                         </a:rPr>
-                        <a:t>9.6</a:t>
+                        <a:t>0.10</a:t>
                       </a:r>
-                      <a:endParaRPr lang="en-US" sz="1100" b="0" i="0" u="none" strike="noStrike">
-                        <a:solidFill>
-                          <a:srgbClr val="000000"/>
-                        </a:solidFill>
-                        <a:effectLst/>
-                        <a:latin typeface="Calibri" panose="020F0502020204030204" pitchFamily="34" charset="0"/>
-                      </a:endParaRPr>
-                    </a:p>
-                  </a:txBody>
-                  <a:tcPr marL="9525" marR="9525" marT="19050" marB="19050" anchor="ctr">
+                    </a:p>
+                  </a:txBody>
+                  <a:tcPr marL="9525" marR="9525" marT="9525" marB="0" anchor="ctr">
                     <a:solidFill>
                       <a:schemeClr val="accent3">
                         <a:lumMod val="50000"/>
@@ -8991,18 +8865,15 @@
                     <a:p>
                       <a:pPr algn="ctr" fontAlgn="ctr"/>
                       <a:r>
-                        <a:rPr lang="en-US" sz="1100" u="none" strike="noStrike">
+                        <a:rPr lang="en-US" sz="1100" b="0" i="0" u="none" strike="noStrike" dirty="0">
+                          <a:solidFill>
+                            <a:schemeClr val="tx1"/>
+                          </a:solidFill>
                           <a:effectLst/>
+                          <a:latin typeface="Calibri" panose="020F0502020204030204" pitchFamily="34" charset="0"/>
                         </a:rPr>
-                        <a:t>58.2</a:t>
+                        <a:t>0.58</a:t>
                       </a:r>
-                      <a:endParaRPr lang="en-US" sz="1100" b="0" i="0" u="none" strike="noStrike">
-                        <a:solidFill>
-                          <a:srgbClr val="000000"/>
-                        </a:solidFill>
-                        <a:effectLst/>
-                        <a:latin typeface="Calibri" panose="020F0502020204030204" pitchFamily="34" charset="0"/>
-                      </a:endParaRPr>
                     </a:p>
                   </a:txBody>
                   <a:tcPr marL="9525" marR="9525" marT="9525" marB="0" anchor="ctr">
@@ -9020,18 +8891,15 @@
                     <a:p>
                       <a:pPr algn="ctr" fontAlgn="ctr"/>
                       <a:r>
-                        <a:rPr lang="en-US" sz="1100" u="none" strike="noStrike">
+                        <a:rPr lang="en-US" sz="1100" b="0" i="0" u="none" strike="noStrike" dirty="0">
+                          <a:solidFill>
+                            <a:schemeClr val="tx1"/>
+                          </a:solidFill>
                           <a:effectLst/>
+                          <a:latin typeface="Calibri" panose="020F0502020204030204" pitchFamily="34" charset="0"/>
                         </a:rPr>
-                        <a:t>61.3</a:t>
+                        <a:t>0.61</a:t>
                       </a:r>
-                      <a:endParaRPr lang="en-US" sz="1100" b="0" i="0" u="none" strike="noStrike">
-                        <a:solidFill>
-                          <a:srgbClr val="000000"/>
-                        </a:solidFill>
-                        <a:effectLst/>
-                        <a:latin typeface="Calibri" panose="020F0502020204030204" pitchFamily="34" charset="0"/>
-                      </a:endParaRPr>
                     </a:p>
                   </a:txBody>
                   <a:tcPr marL="9525" marR="9525" marT="9525" marB="0" anchor="ctr">
@@ -9049,18 +8917,15 @@
                     <a:p>
                       <a:pPr algn="ctr" fontAlgn="ctr"/>
                       <a:r>
-                        <a:rPr lang="en-US" sz="1100" u="none" strike="noStrike" dirty="0">
+                        <a:rPr lang="en-US" sz="1100" b="0" i="0" u="none" strike="noStrike" dirty="0">
+                          <a:solidFill>
+                            <a:schemeClr val="tx1"/>
+                          </a:solidFill>
                           <a:effectLst/>
+                          <a:latin typeface="Calibri" panose="020F0502020204030204" pitchFamily="34" charset="0"/>
                         </a:rPr>
-                        <a:t>58.4</a:t>
+                        <a:t>0.58</a:t>
                       </a:r>
-                      <a:endParaRPr lang="en-US" sz="1100" b="0" i="0" u="none" strike="noStrike" dirty="0">
-                        <a:solidFill>
-                          <a:srgbClr val="000000"/>
-                        </a:solidFill>
-                        <a:effectLst/>
-                        <a:latin typeface="Calibri" panose="020F0502020204030204" pitchFamily="34" charset="0"/>
-                      </a:endParaRPr>
                     </a:p>
                   </a:txBody>
                   <a:tcPr marL="9525" marR="9525" marT="9525" marB="0" anchor="ctr">
@@ -9078,18 +8943,15 @@
                     <a:p>
                       <a:pPr algn="ctr" fontAlgn="ctr"/>
                       <a:r>
-                        <a:rPr lang="en-US" sz="1100" u="none" strike="noStrike">
+                        <a:rPr lang="en-US" sz="1100" b="0" i="0" u="none" strike="noStrike" dirty="0">
+                          <a:solidFill>
+                            <a:schemeClr val="tx1"/>
+                          </a:solidFill>
                           <a:effectLst/>
+                          <a:latin typeface="Calibri" panose="020F0502020204030204" pitchFamily="34" charset="0"/>
                         </a:rPr>
-                        <a:t>36.1</a:t>
+                        <a:t>0.36</a:t>
                       </a:r>
-                      <a:endParaRPr lang="en-US" sz="1100" b="0" i="0" u="none" strike="noStrike">
-                        <a:solidFill>
-                          <a:srgbClr val="000000"/>
-                        </a:solidFill>
-                        <a:effectLst/>
-                        <a:latin typeface="Calibri" panose="020F0502020204030204" pitchFamily="34" charset="0"/>
-                      </a:endParaRPr>
                     </a:p>
                   </a:txBody>
                   <a:tcPr marL="9525" marR="9525" marT="9525" marB="0" anchor="ctr">
@@ -9107,18 +8969,15 @@
                     <a:p>
                       <a:pPr algn="ctr" fontAlgn="ctr"/>
                       <a:r>
-                        <a:rPr lang="en-US" sz="1100" u="none" strike="noStrike" dirty="0">
+                        <a:rPr lang="en-US" sz="1100" b="0" i="0" u="none" strike="noStrike" dirty="0">
+                          <a:solidFill>
+                            <a:schemeClr val="tx1"/>
+                          </a:solidFill>
                           <a:effectLst/>
+                          <a:latin typeface="Calibri" panose="020F0502020204030204" pitchFamily="34" charset="0"/>
                         </a:rPr>
-                        <a:t>32.1</a:t>
+                        <a:t>0.32</a:t>
                       </a:r>
-                      <a:endParaRPr lang="en-US" sz="1100" b="0" i="0" u="none" strike="noStrike" dirty="0">
-                        <a:solidFill>
-                          <a:srgbClr val="000000"/>
-                        </a:solidFill>
-                        <a:effectLst/>
-                        <a:latin typeface="Calibri" panose="020F0502020204030204" pitchFamily="34" charset="0"/>
-                      </a:endParaRPr>
                     </a:p>
                   </a:txBody>
                   <a:tcPr marL="9525" marR="9525" marT="9525" marB="0" anchor="ctr">
@@ -9136,18 +8995,15 @@
                     <a:p>
                       <a:pPr algn="ctr" fontAlgn="ctr"/>
                       <a:r>
-                        <a:rPr lang="en-US" sz="1100" u="none" strike="noStrike" dirty="0">
+                        <a:rPr lang="en-US" sz="1100" b="0" i="0" u="none" strike="noStrike" dirty="0">
+                          <a:solidFill>
+                            <a:schemeClr val="tx1"/>
+                          </a:solidFill>
                           <a:effectLst/>
+                          <a:latin typeface="Calibri" panose="020F0502020204030204" pitchFamily="34" charset="0"/>
                         </a:rPr>
-                        <a:t>33.5</a:t>
+                        <a:t>0.34</a:t>
                       </a:r>
-                      <a:endParaRPr lang="en-US" sz="1100" b="0" i="0" u="none" strike="noStrike" dirty="0">
-                        <a:solidFill>
-                          <a:srgbClr val="000000"/>
-                        </a:solidFill>
-                        <a:effectLst/>
-                        <a:latin typeface="Calibri" panose="020F0502020204030204" pitchFamily="34" charset="0"/>
-                      </a:endParaRPr>
                     </a:p>
                   </a:txBody>
                   <a:tcPr marL="9525" marR="9525" marT="9525" marB="0" anchor="ctr">

</xml_diff>